<commit_message>
Updating introduction and push-pull image
</commit_message>
<xml_diff>
--- a/coling2016/images/illustrations-all.pptx
+++ b/coling2016/images/illustrations-all.pptx
@@ -816,12 +816,12 @@
         </c:dLbls>
         <c:gapWidth val="150"/>
         <c:shape val="box"/>
-        <c:axId val="-2080409064"/>
-        <c:axId val="2031097016"/>
+        <c:axId val="-2111707832"/>
+        <c:axId val="2108632104"/>
         <c:axId val="0"/>
       </c:bar3DChart>
       <c:catAx>
-        <c:axId val="-2080409064"/>
+        <c:axId val="-2111707832"/>
         <c:scaling>
           <c:orientation val="minMax"/>
         </c:scaling>
@@ -831,7 +831,7 @@
         <c:majorTickMark val="out"/>
         <c:minorTickMark val="none"/>
         <c:tickLblPos val="nextTo"/>
-        <c:crossAx val="2031097016"/>
+        <c:crossAx val="2108632104"/>
         <c:crosses val="autoZero"/>
         <c:auto val="1"/>
         <c:lblAlgn val="ctr"/>
@@ -839,7 +839,7 @@
         <c:noMultiLvlLbl val="0"/>
       </c:catAx>
       <c:valAx>
-        <c:axId val="2031097016"/>
+        <c:axId val="2108632104"/>
         <c:scaling>
           <c:orientation val="minMax"/>
           <c:max val="1.505E7"/>
@@ -872,7 +872,7 @@
             <a:endParaRPr lang="en-US"/>
           </a:p>
         </c:txPr>
-        <c:crossAx val="-2080409064"/>
+        <c:crossAx val="-2111707832"/>
         <c:crosses val="autoZero"/>
         <c:crossBetween val="between"/>
         <c:majorUnit val="1.0E6"/>
@@ -1717,12 +1717,12 @@
         </c:dLbls>
         <c:gapWidth val="150"/>
         <c:shape val="box"/>
-        <c:axId val="2107107080"/>
-        <c:axId val="-2067440744"/>
+        <c:axId val="-2087354680"/>
+        <c:axId val="-2070903928"/>
         <c:axId val="0"/>
       </c:bar3DChart>
       <c:catAx>
-        <c:axId val="2107107080"/>
+        <c:axId val="-2087354680"/>
         <c:scaling>
           <c:orientation val="minMax"/>
         </c:scaling>
@@ -1731,7 +1731,7 @@
         <c:majorTickMark val="out"/>
         <c:minorTickMark val="none"/>
         <c:tickLblPos val="nextTo"/>
-        <c:crossAx val="-2067440744"/>
+        <c:crossAx val="-2070903928"/>
         <c:crosses val="autoZero"/>
         <c:auto val="1"/>
         <c:lblAlgn val="ctr"/>
@@ -1739,7 +1739,7 @@
         <c:noMultiLvlLbl val="0"/>
       </c:catAx>
       <c:valAx>
-        <c:axId val="-2067440744"/>
+        <c:axId val="-2070903928"/>
         <c:scaling>
           <c:orientation val="minMax"/>
           <c:min val="50000.0"/>
@@ -1767,7 +1767,7 @@
             </a:outerShdw>
           </a:effectLst>
         </c:spPr>
-        <c:crossAx val="2107107080"/>
+        <c:crossAx val="-2087354680"/>
         <c:crosses val="autoZero"/>
         <c:crossBetween val="between"/>
         <c:dispUnits>
@@ -1957,7 +1957,7 @@
                   <c:v>80.894</c:v>
                 </c:pt>
                 <c:pt idx="3">
-                  <c:v>81.67599999999992</c:v>
+                  <c:v>81.67599999999989</c:v>
                 </c:pt>
                 <c:pt idx="4">
                   <c:v>82.17799999999998</c:v>
@@ -2096,7 +2096,7 @@
                   <c:v>80.894</c:v>
                 </c:pt>
                 <c:pt idx="3">
-                  <c:v>81.67599999999992</c:v>
+                  <c:v>81.67599999999989</c:v>
                 </c:pt>
                 <c:pt idx="4">
                   <c:v>82.17799999999998</c:v>
@@ -2144,11 +2144,11 @@
           <c:showBubbleSize val="0"/>
         </c:dLbls>
         <c:gapWidth val="150"/>
-        <c:axId val="-2081254184"/>
-        <c:axId val="2140104376"/>
+        <c:axId val="-2111791544"/>
+        <c:axId val="-2087394968"/>
       </c:barChart>
       <c:catAx>
-        <c:axId val="-2081254184"/>
+        <c:axId val="-2111791544"/>
         <c:scaling>
           <c:orientation val="minMax"/>
         </c:scaling>
@@ -2191,7 +2191,7 @@
             <a:endParaRPr lang="en-US"/>
           </a:p>
         </c:txPr>
-        <c:crossAx val="2140104376"/>
+        <c:crossAx val="-2087394968"/>
         <c:crosses val="autoZero"/>
         <c:auto val="1"/>
         <c:lblAlgn val="ctr"/>
@@ -2199,7 +2199,7 @@
         <c:noMultiLvlLbl val="0"/>
       </c:catAx>
       <c:valAx>
-        <c:axId val="2140104376"/>
+        <c:axId val="-2087394968"/>
         <c:scaling>
           <c:orientation val="minMax"/>
           <c:max val="100.0"/>
@@ -2242,7 +2242,7 @@
             <a:endParaRPr lang="en-US"/>
           </a:p>
         </c:txPr>
-        <c:crossAx val="-2081254184"/>
+        <c:crossAx val="-2111791544"/>
         <c:crosses val="autoZero"/>
         <c:crossBetween val="between"/>
         <c:majorUnit val="5.0"/>
@@ -2470,11 +2470,11 @@
           <c:showBubbleSize val="0"/>
         </c:dLbls>
         <c:gapWidth val="150"/>
-        <c:axId val="-2067157304"/>
-        <c:axId val="-2067349048"/>
+        <c:axId val="-2069950808"/>
+        <c:axId val="-2111206552"/>
       </c:barChart>
       <c:catAx>
-        <c:axId val="-2067157304"/>
+        <c:axId val="-2069950808"/>
         <c:scaling>
           <c:orientation val="minMax"/>
         </c:scaling>
@@ -2483,7 +2483,7 @@
         <c:majorTickMark val="in"/>
         <c:minorTickMark val="none"/>
         <c:tickLblPos val="nextTo"/>
-        <c:crossAx val="-2067349048"/>
+        <c:crossAx val="-2111206552"/>
         <c:crosses val="autoZero"/>
         <c:auto val="1"/>
         <c:lblAlgn val="ctr"/>
@@ -2491,7 +2491,7 @@
         <c:noMultiLvlLbl val="0"/>
       </c:catAx>
       <c:valAx>
-        <c:axId val="-2067349048"/>
+        <c:axId val="-2111206552"/>
         <c:scaling>
           <c:orientation val="minMax"/>
           <c:max val="160.0"/>
@@ -2524,7 +2524,7 @@
             <a:endParaRPr lang="en-US"/>
           </a:p>
         </c:txPr>
-        <c:crossAx val="-2067157304"/>
+        <c:crossAx val="-2069950808"/>
         <c:crosses val="autoZero"/>
         <c:crossBetween val="between"/>
       </c:valAx>
@@ -2720,11 +2720,11 @@
           <c:showBubbleSize val="0"/>
         </c:dLbls>
         <c:gapWidth val="150"/>
-        <c:axId val="-2067589624"/>
-        <c:axId val="-2067586808"/>
+        <c:axId val="2108512888"/>
+        <c:axId val="-2087082152"/>
       </c:barChart>
       <c:catAx>
-        <c:axId val="-2067589624"/>
+        <c:axId val="2108512888"/>
         <c:scaling>
           <c:orientation val="minMax"/>
         </c:scaling>
@@ -2753,7 +2753,7 @@
             <a:endParaRPr lang="en-US"/>
           </a:p>
         </c:txPr>
-        <c:crossAx val="-2067586808"/>
+        <c:crossAx val="-2087082152"/>
         <c:crosses val="autoZero"/>
         <c:auto val="1"/>
         <c:lblAlgn val="ctr"/>
@@ -2761,7 +2761,7 @@
         <c:noMultiLvlLbl val="0"/>
       </c:catAx>
       <c:valAx>
-        <c:axId val="-2067586808"/>
+        <c:axId val="-2087082152"/>
         <c:scaling>
           <c:orientation val="minMax"/>
         </c:scaling>
@@ -2792,7 +2792,7 @@
             <a:endParaRPr lang="en-US"/>
           </a:p>
         </c:txPr>
-        <c:crossAx val="-2067589624"/>
+        <c:crossAx val="2108512888"/>
         <c:crosses val="autoZero"/>
         <c:crossBetween val="between"/>
       </c:valAx>
@@ -3035,11 +3035,11 @@
           <c:showBubbleSize val="0"/>
         </c:dLbls>
         <c:gapWidth val="150"/>
-        <c:axId val="-2067284888"/>
-        <c:axId val="2112763848"/>
+        <c:axId val="-2110499288"/>
+        <c:axId val="-2070808504"/>
       </c:barChart>
       <c:catAx>
-        <c:axId val="-2067284888"/>
+        <c:axId val="-2110499288"/>
         <c:scaling>
           <c:orientation val="minMax"/>
         </c:scaling>
@@ -3048,7 +3048,7 @@
         <c:majorTickMark val="in"/>
         <c:minorTickMark val="none"/>
         <c:tickLblPos val="nextTo"/>
-        <c:crossAx val="2112763848"/>
+        <c:crossAx val="-2070808504"/>
         <c:crosses val="autoZero"/>
         <c:auto val="1"/>
         <c:lblAlgn val="ctr"/>
@@ -3056,7 +3056,7 @@
         <c:noMultiLvlLbl val="0"/>
       </c:catAx>
       <c:valAx>
-        <c:axId val="2112763848"/>
+        <c:axId val="-2070808504"/>
         <c:scaling>
           <c:orientation val="minMax"/>
           <c:max val="2600.0"/>
@@ -3089,7 +3089,7 @@
             <a:endParaRPr lang="en-US"/>
           </a:p>
         </c:txPr>
-        <c:crossAx val="-2067284888"/>
+        <c:crossAx val="-2110499288"/>
         <c:crosses val="autoZero"/>
         <c:crossBetween val="between"/>
       </c:valAx>
@@ -3285,7 +3285,7 @@
                   <c:v>1.25504863089823</c:v>
                 </c:pt>
                 <c:pt idx="11">
-                  <c:v>5.655575245367744</c:v>
+                  <c:v>5.655575245367741</c:v>
                 </c:pt>
                 <c:pt idx="12">
                   <c:v>0.979500127210511</c:v>
@@ -3339,11 +3339,11 @@
           <c:showBubbleSize val="0"/>
         </c:dLbls>
         <c:gapWidth val="150"/>
-        <c:axId val="2030517576"/>
-        <c:axId val="2030818712"/>
+        <c:axId val="2140483128"/>
+        <c:axId val="-2070274760"/>
       </c:barChart>
       <c:catAx>
-        <c:axId val="2030517576"/>
+        <c:axId val="2140483128"/>
         <c:scaling>
           <c:orientation val="minMax"/>
         </c:scaling>
@@ -3372,7 +3372,7 @@
             <a:endParaRPr lang="en-US"/>
           </a:p>
         </c:txPr>
-        <c:crossAx val="2030818712"/>
+        <c:crossAx val="-2070274760"/>
         <c:crosses val="autoZero"/>
         <c:auto val="1"/>
         <c:lblAlgn val="ctr"/>
@@ -3380,7 +3380,7 @@
         <c:noMultiLvlLbl val="0"/>
       </c:catAx>
       <c:valAx>
-        <c:axId val="2030818712"/>
+        <c:axId val="-2070274760"/>
         <c:scaling>
           <c:orientation val="minMax"/>
         </c:scaling>
@@ -3411,7 +3411,7 @@
             <a:endParaRPr lang="en-US"/>
           </a:p>
         </c:txPr>
-        <c:crossAx val="2030517576"/>
+        <c:crossAx val="2140483128"/>
         <c:crosses val="autoZero"/>
         <c:crossBetween val="between"/>
       </c:valAx>
@@ -3602,11 +3602,11 @@
           <c:showBubbleSize val="0"/>
         </c:dLbls>
         <c:gapWidth val="150"/>
-        <c:axId val="2020373304"/>
-        <c:axId val="2030425160"/>
+        <c:axId val="2143570216"/>
+        <c:axId val="-2070691080"/>
       </c:barChart>
       <c:catAx>
-        <c:axId val="2020373304"/>
+        <c:axId val="2143570216"/>
         <c:scaling>
           <c:orientation val="minMax"/>
         </c:scaling>
@@ -3615,7 +3615,7 @@
         <c:majorTickMark val="in"/>
         <c:minorTickMark val="none"/>
         <c:tickLblPos val="nextTo"/>
-        <c:crossAx val="2030425160"/>
+        <c:crossAx val="-2070691080"/>
         <c:crosses val="autoZero"/>
         <c:auto val="1"/>
         <c:lblAlgn val="ctr"/>
@@ -3623,7 +3623,7 @@
         <c:noMultiLvlLbl val="0"/>
       </c:catAx>
       <c:valAx>
-        <c:axId val="2030425160"/>
+        <c:axId val="-2070691080"/>
         <c:scaling>
           <c:orientation val="minMax"/>
           <c:max val="80.0"/>
@@ -3656,7 +3656,7 @@
             <a:endParaRPr lang="en-US"/>
           </a:p>
         </c:txPr>
-        <c:crossAx val="2020373304"/>
+        <c:crossAx val="2143570216"/>
         <c:crosses val="autoZero"/>
         <c:crossBetween val="between"/>
       </c:valAx>
@@ -3846,11 +3846,11 @@
           <c:showBubbleSize val="0"/>
         </c:dLbls>
         <c:gapWidth val="150"/>
-        <c:axId val="2142809464"/>
-        <c:axId val="2143025928"/>
+        <c:axId val="-2111774728"/>
+        <c:axId val="-2070670920"/>
       </c:barChart>
       <c:catAx>
-        <c:axId val="2142809464"/>
+        <c:axId val="-2111774728"/>
         <c:scaling>
           <c:orientation val="minMax"/>
         </c:scaling>
@@ -3879,7 +3879,7 @@
             <a:endParaRPr lang="en-US"/>
           </a:p>
         </c:txPr>
-        <c:crossAx val="2143025928"/>
+        <c:crossAx val="-2070670920"/>
         <c:crosses val="autoZero"/>
         <c:auto val="1"/>
         <c:lblAlgn val="ctr"/>
@@ -3887,7 +3887,7 @@
         <c:noMultiLvlLbl val="0"/>
       </c:catAx>
       <c:valAx>
-        <c:axId val="2143025928"/>
+        <c:axId val="-2070670920"/>
         <c:scaling>
           <c:orientation val="minMax"/>
         </c:scaling>
@@ -3918,7 +3918,7 @@
             <a:endParaRPr lang="en-US"/>
           </a:p>
         </c:txPr>
-        <c:crossAx val="2142809464"/>
+        <c:crossAx val="-2111774728"/>
         <c:crosses val="autoZero"/>
         <c:crossBetween val="between"/>
       </c:valAx>
@@ -7715,15 +7715,15 @@
         <p:nvCxnSpPr>
           <p:cNvPr id="6" name="Straight Arrow Connector 5"/>
           <p:cNvCxnSpPr>
-            <a:stCxn id="8" idx="2"/>
+            <a:stCxn id="68" idx="0"/>
             <a:endCxn id="14" idx="0"/>
           </p:cNvCxnSpPr>
           <p:nvPr/>
         </p:nvCxnSpPr>
         <p:spPr>
           <a:xfrm>
-            <a:off x="5519297" y="2280774"/>
-            <a:ext cx="4117873" cy="288032"/>
+            <a:off x="9020356" y="1982229"/>
+            <a:ext cx="616814" cy="586577"/>
           </a:xfrm>
           <a:prstGeom prst="straightConnector1">
             <a:avLst/>
@@ -7750,45 +7750,6 @@
           </a:fontRef>
         </p:style>
       </p:cxnSp>
-      <p:cxnSp>
-        <p:nvCxnSpPr>
-          <p:cNvPr id="7" name="Straight Arrow Connector 6"/>
-          <p:cNvCxnSpPr>
-            <a:stCxn id="10" idx="0"/>
-            <a:endCxn id="8" idx="0"/>
-          </p:cNvCxnSpPr>
-          <p:nvPr/>
-        </p:nvCxnSpPr>
-        <p:spPr>
-          <a:xfrm>
-            <a:off x="5508771" y="1416678"/>
-            <a:ext cx="10526" cy="504056"/>
-          </a:xfrm>
-          <a:prstGeom prst="straightConnector1">
-            <a:avLst/>
-          </a:prstGeom>
-          <a:ln>
-            <a:solidFill>
-              <a:srgbClr val="958C06"/>
-            </a:solidFill>
-            <a:tailEnd type="arrow"/>
-          </a:ln>
-        </p:spPr>
-        <p:style>
-          <a:lnRef idx="2">
-            <a:schemeClr val="accent2"/>
-          </a:lnRef>
-          <a:fillRef idx="0">
-            <a:schemeClr val="accent2"/>
-          </a:fillRef>
-          <a:effectRef idx="1">
-            <a:schemeClr val="accent2"/>
-          </a:effectRef>
-          <a:fontRef idx="minor">
-            <a:schemeClr val="tx1"/>
-          </a:fontRef>
-        </p:style>
-      </p:cxnSp>
       <p:sp>
         <p:nvSpPr>
           <p:cNvPr id="8" name="Rounded Rectangle 7"/>
@@ -7797,7 +7758,7 @@
         </p:nvSpPr>
         <p:spPr>
           <a:xfrm>
-            <a:off x="4794011" y="1920734"/>
+            <a:off x="4039143" y="1976931"/>
             <a:ext cx="1450572" cy="360040"/>
           </a:xfrm>
           <a:prstGeom prst="roundRect">
@@ -7907,67 +7868,6 @@
       </p:sp>
       <p:sp>
         <p:nvSpPr>
-          <p:cNvPr id="10" name="Rounded Rectangle 9"/>
-          <p:cNvSpPr/>
-          <p:nvPr/>
-        </p:nvSpPr>
-        <p:spPr>
-          <a:xfrm>
-            <a:off x="4818062" y="1416678"/>
-            <a:ext cx="1381418" cy="360040"/>
-          </a:xfrm>
-          <a:prstGeom prst="roundRect">
-            <a:avLst/>
-          </a:prstGeom>
-          <a:solidFill>
-            <a:schemeClr val="accent3">
-              <a:lumMod val="40000"/>
-              <a:lumOff val="60000"/>
-            </a:schemeClr>
-          </a:solidFill>
-          <a:ln>
-            <a:solidFill>
-              <a:srgbClr val="FFFF00"/>
-            </a:solidFill>
-          </a:ln>
-        </p:spPr>
-        <p:style>
-          <a:lnRef idx="1">
-            <a:schemeClr val="accent6"/>
-          </a:lnRef>
-          <a:fillRef idx="3">
-            <a:schemeClr val="accent6"/>
-          </a:fillRef>
-          <a:effectRef idx="2">
-            <a:schemeClr val="accent6"/>
-          </a:effectRef>
-          <a:fontRef idx="minor">
-            <a:schemeClr val="lt1"/>
-          </a:fontRef>
-        </p:style>
-        <p:txBody>
-          <a:bodyPr rtlCol="0" anchor="ctr"/>
-          <a:lstStyle/>
-          <a:p>
-            <a:pPr algn="ctr"/>
-            <a:r>
-              <a:rPr lang="en-US" sz="1400" dirty="0" smtClean="0">
-                <a:solidFill>
-                  <a:srgbClr val="000000"/>
-                </a:solidFill>
-              </a:rPr>
-              <a:t>Shoes</a:t>
-            </a:r>
-            <a:endParaRPr lang="en-US" sz="1400" dirty="0">
-              <a:solidFill>
-                <a:srgbClr val="000000"/>
-              </a:solidFill>
-            </a:endParaRPr>
-          </a:p>
-        </p:txBody>
-      </p:sp>
-      <p:sp>
-        <p:nvSpPr>
           <p:cNvPr id="11" name="Rounded Rectangle 10"/>
           <p:cNvSpPr/>
           <p:nvPr/>
@@ -8181,8 +8081,8 @@
         </p:nvCxnSpPr>
         <p:spPr>
           <a:xfrm flipH="1">
-            <a:off x="3347491" y="2280774"/>
-            <a:ext cx="2171806" cy="288032"/>
+            <a:off x="3347491" y="2336971"/>
+            <a:ext cx="1416938" cy="231835"/>
           </a:xfrm>
           <a:prstGeom prst="straightConnector1">
             <a:avLst/>
@@ -8219,9 +8119,9 @@
           <p:nvPr/>
         </p:nvCxnSpPr>
         <p:spPr>
-          <a:xfrm flipH="1">
-            <a:off x="5342630" y="2280774"/>
-            <a:ext cx="176667" cy="288032"/>
+          <a:xfrm>
+            <a:off x="4764429" y="2336971"/>
+            <a:ext cx="578201" cy="231835"/>
           </a:xfrm>
           <a:prstGeom prst="straightConnector1">
             <a:avLst/>
@@ -8259,8 +8159,8 @@
         </p:nvCxnSpPr>
         <p:spPr>
           <a:xfrm>
-            <a:off x="5519297" y="2280774"/>
-            <a:ext cx="1222778" cy="288032"/>
+            <a:off x="4764429" y="2336971"/>
+            <a:ext cx="1977646" cy="231835"/>
           </a:xfrm>
           <a:prstGeom prst="straightConnector1">
             <a:avLst/>
@@ -8298,8 +8198,8 @@
         </p:nvCxnSpPr>
         <p:spPr>
           <a:xfrm>
-            <a:off x="5519297" y="2280774"/>
-            <a:ext cx="2940762" cy="288032"/>
+            <a:off x="4764429" y="2336971"/>
+            <a:ext cx="3695630" cy="231835"/>
           </a:xfrm>
           <a:prstGeom prst="straightConnector1">
             <a:avLst/>
@@ -9900,7 +9800,7 @@
         <p:spPr>
           <a:xfrm>
             <a:off x="10365847" y="3749699"/>
-            <a:ext cx="2194999" cy="307777"/>
+            <a:ext cx="2194999" cy="276999"/>
           </a:xfrm>
           <a:prstGeom prst="rect">
             <a:avLst/>
@@ -9918,18 +9818,27 @@
           </a:bodyPr>
           <a:lstStyle/>
           <a:p>
-            <a:pPr algn="ctr"/>
-            <a:r>
-              <a:rPr lang="en-US" sz="1400" b="1" dirty="0" smtClean="0">
+            <a:r>
+              <a:rPr lang="en-US" sz="1200" b="1" dirty="0" smtClean="0">
                 <a:solidFill>
                   <a:schemeClr val="accent1">
                     <a:lumMod val="75000"/>
                   </a:schemeClr>
                 </a:solidFill>
               </a:rPr>
-              <a:t>More in “Comfort” Shoes</a:t>
-            </a:r>
-            <a:endParaRPr lang="en-US" sz="1400" b="1" dirty="0">
+              <a:t>More Women’s Comfort </a:t>
+            </a:r>
+            <a:r>
+              <a:rPr lang="en-US" sz="1200" b="1" dirty="0" smtClean="0">
+                <a:solidFill>
+                  <a:schemeClr val="accent1">
+                    <a:lumMod val="75000"/>
+                  </a:schemeClr>
+                </a:solidFill>
+              </a:rPr>
+              <a:t>Shoes</a:t>
+            </a:r>
+            <a:endParaRPr lang="en-US" sz="1200" b="1" dirty="0">
               <a:solidFill>
                 <a:schemeClr val="accent1">
                   <a:lumMod val="75000"/>
@@ -9995,6 +9904,377 @@
               <a:t>A typical end user</a:t>
             </a:r>
             <a:endParaRPr lang="en-US" b="1" dirty="0"/>
+          </a:p>
+        </p:txBody>
+      </p:sp>
+      <p:sp>
+        <p:nvSpPr>
+          <p:cNvPr id="67" name="Rounded Rectangle 66"/>
+          <p:cNvSpPr/>
+          <p:nvPr/>
+        </p:nvSpPr>
+        <p:spPr>
+          <a:xfrm>
+            <a:off x="5950110" y="1997094"/>
+            <a:ext cx="1233629" cy="360040"/>
+          </a:xfrm>
+          <a:prstGeom prst="roundRect">
+            <a:avLst/>
+          </a:prstGeom>
+          <a:solidFill>
+            <a:srgbClr val="D7E4BD"/>
+          </a:solidFill>
+          <a:ln>
+            <a:solidFill>
+              <a:srgbClr val="FFFF00"/>
+            </a:solidFill>
+          </a:ln>
+        </p:spPr>
+        <p:style>
+          <a:lnRef idx="1">
+            <a:schemeClr val="accent6"/>
+          </a:lnRef>
+          <a:fillRef idx="3">
+            <a:schemeClr val="accent6"/>
+          </a:fillRef>
+          <a:effectRef idx="2">
+            <a:schemeClr val="accent6"/>
+          </a:effectRef>
+          <a:fontRef idx="minor">
+            <a:schemeClr val="lt1"/>
+          </a:fontRef>
+        </p:style>
+        <p:txBody>
+          <a:bodyPr rtlCol="0" anchor="ctr"/>
+          <a:lstStyle/>
+          <a:p>
+            <a:pPr algn="ctr"/>
+            <a:r>
+              <a:rPr lang="en-US" sz="1400" dirty="0">
+                <a:solidFill>
+                  <a:srgbClr val="000000"/>
+                </a:solidFill>
+              </a:rPr>
+              <a:t>M</a:t>
+            </a:r>
+            <a:r>
+              <a:rPr lang="en-US" sz="1400" dirty="0" smtClean="0">
+                <a:solidFill>
+                  <a:srgbClr val="000000"/>
+                </a:solidFill>
+              </a:rPr>
+              <a:t>en’s Shoes</a:t>
+            </a:r>
+            <a:endParaRPr lang="en-US" sz="1400" dirty="0">
+              <a:solidFill>
+                <a:srgbClr val="000000"/>
+              </a:solidFill>
+            </a:endParaRPr>
+          </a:p>
+        </p:txBody>
+      </p:sp>
+      <p:sp>
+        <p:nvSpPr>
+          <p:cNvPr id="68" name="Rounded Rectangle 67"/>
+          <p:cNvSpPr/>
+          <p:nvPr/>
+        </p:nvSpPr>
+        <p:spPr>
+          <a:xfrm>
+            <a:off x="8403541" y="1982229"/>
+            <a:ext cx="1233629" cy="360040"/>
+          </a:xfrm>
+          <a:prstGeom prst="roundRect">
+            <a:avLst/>
+          </a:prstGeom>
+          <a:solidFill>
+            <a:srgbClr val="D7E4BD"/>
+          </a:solidFill>
+          <a:ln>
+            <a:solidFill>
+              <a:srgbClr val="FFFF00"/>
+            </a:solidFill>
+          </a:ln>
+        </p:spPr>
+        <p:style>
+          <a:lnRef idx="1">
+            <a:schemeClr val="accent6"/>
+          </a:lnRef>
+          <a:fillRef idx="3">
+            <a:schemeClr val="accent6"/>
+          </a:fillRef>
+          <a:effectRef idx="2">
+            <a:schemeClr val="accent6"/>
+          </a:effectRef>
+          <a:fontRef idx="minor">
+            <a:schemeClr val="lt1"/>
+          </a:fontRef>
+        </p:style>
+        <p:txBody>
+          <a:bodyPr rtlCol="0" anchor="ctr"/>
+          <a:lstStyle/>
+          <a:p>
+            <a:pPr algn="ctr"/>
+            <a:r>
+              <a:rPr lang="en-US" sz="1400" dirty="0" smtClean="0">
+                <a:solidFill>
+                  <a:srgbClr val="000000"/>
+                </a:solidFill>
+              </a:rPr>
+              <a:t>Girl’s Shoes</a:t>
+            </a:r>
+            <a:endParaRPr lang="en-US" sz="1400" dirty="0">
+              <a:solidFill>
+                <a:srgbClr val="000000"/>
+              </a:solidFill>
+            </a:endParaRPr>
+          </a:p>
+        </p:txBody>
+      </p:sp>
+      <p:sp>
+        <p:nvSpPr>
+          <p:cNvPr id="70" name="TextBox 69"/>
+          <p:cNvSpPr txBox="1"/>
+          <p:nvPr/>
+        </p:nvSpPr>
+        <p:spPr>
+          <a:xfrm>
+            <a:off x="7629655" y="1995577"/>
+            <a:ext cx="344039" cy="369332"/>
+          </a:xfrm>
+          <a:prstGeom prst="rect">
+            <a:avLst/>
+          </a:prstGeom>
+          <a:noFill/>
+        </p:spPr>
+        <p:txBody>
+          <a:bodyPr wrap="none" rtlCol="0">
+            <a:spAutoFit/>
+          </a:bodyPr>
+          <a:lstStyle/>
+          <a:p>
+            <a:r>
+              <a:rPr lang="is-IS" dirty="0" smtClean="0"/>
+              <a:t>…</a:t>
+            </a:r>
+            <a:endParaRPr lang="en-US" dirty="0"/>
+          </a:p>
+        </p:txBody>
+      </p:sp>
+      <p:cxnSp>
+        <p:nvCxnSpPr>
+          <p:cNvPr id="71" name="Straight Arrow Connector 70"/>
+          <p:cNvCxnSpPr>
+            <a:stCxn id="10" idx="0"/>
+            <a:endCxn id="67" idx="0"/>
+          </p:cNvCxnSpPr>
+          <p:nvPr/>
+        </p:nvCxnSpPr>
+        <p:spPr>
+          <a:xfrm>
+            <a:off x="5508771" y="1416678"/>
+            <a:ext cx="1058154" cy="580416"/>
+          </a:xfrm>
+          <a:prstGeom prst="straightConnector1">
+            <a:avLst/>
+          </a:prstGeom>
+          <a:ln>
+            <a:solidFill>
+              <a:srgbClr val="958C06"/>
+            </a:solidFill>
+            <a:tailEnd type="arrow"/>
+          </a:ln>
+        </p:spPr>
+        <p:style>
+          <a:lnRef idx="2">
+            <a:schemeClr val="accent2"/>
+          </a:lnRef>
+          <a:fillRef idx="0">
+            <a:schemeClr val="accent2"/>
+          </a:fillRef>
+          <a:effectRef idx="1">
+            <a:schemeClr val="accent2"/>
+          </a:effectRef>
+          <a:fontRef idx="minor">
+            <a:schemeClr val="tx1"/>
+          </a:fontRef>
+        </p:style>
+      </p:cxnSp>
+      <p:cxnSp>
+        <p:nvCxnSpPr>
+          <p:cNvPr id="74" name="Straight Arrow Connector 73"/>
+          <p:cNvCxnSpPr>
+            <a:stCxn id="10" idx="0"/>
+            <a:endCxn id="70" idx="0"/>
+          </p:cNvCxnSpPr>
+          <p:nvPr/>
+        </p:nvCxnSpPr>
+        <p:spPr>
+          <a:xfrm>
+            <a:off x="5508771" y="1416678"/>
+            <a:ext cx="2292904" cy="578899"/>
+          </a:xfrm>
+          <a:prstGeom prst="straightConnector1">
+            <a:avLst/>
+          </a:prstGeom>
+          <a:ln>
+            <a:solidFill>
+              <a:srgbClr val="958C06"/>
+            </a:solidFill>
+            <a:tailEnd type="arrow"/>
+          </a:ln>
+        </p:spPr>
+        <p:style>
+          <a:lnRef idx="2">
+            <a:schemeClr val="accent2"/>
+          </a:lnRef>
+          <a:fillRef idx="0">
+            <a:schemeClr val="accent2"/>
+          </a:fillRef>
+          <a:effectRef idx="1">
+            <a:schemeClr val="accent2"/>
+          </a:effectRef>
+          <a:fontRef idx="minor">
+            <a:schemeClr val="tx1"/>
+          </a:fontRef>
+        </p:style>
+      </p:cxnSp>
+      <p:cxnSp>
+        <p:nvCxnSpPr>
+          <p:cNvPr id="77" name="Straight Arrow Connector 76"/>
+          <p:cNvCxnSpPr>
+            <a:stCxn id="10" idx="0"/>
+            <a:endCxn id="68" idx="0"/>
+          </p:cNvCxnSpPr>
+          <p:nvPr/>
+        </p:nvCxnSpPr>
+        <p:spPr>
+          <a:xfrm>
+            <a:off x="5508771" y="1416678"/>
+            <a:ext cx="3511585" cy="565551"/>
+          </a:xfrm>
+          <a:prstGeom prst="straightConnector1">
+            <a:avLst/>
+          </a:prstGeom>
+          <a:ln>
+            <a:solidFill>
+              <a:srgbClr val="958C06"/>
+            </a:solidFill>
+            <a:tailEnd type="arrow"/>
+          </a:ln>
+        </p:spPr>
+        <p:style>
+          <a:lnRef idx="2">
+            <a:schemeClr val="accent2"/>
+          </a:lnRef>
+          <a:fillRef idx="0">
+            <a:schemeClr val="accent2"/>
+          </a:fillRef>
+          <a:effectRef idx="1">
+            <a:schemeClr val="accent2"/>
+          </a:effectRef>
+          <a:fontRef idx="minor">
+            <a:schemeClr val="tx1"/>
+          </a:fontRef>
+        </p:style>
+      </p:cxnSp>
+      <p:cxnSp>
+        <p:nvCxnSpPr>
+          <p:cNvPr id="7" name="Straight Arrow Connector 6"/>
+          <p:cNvCxnSpPr>
+            <a:stCxn id="10" idx="0"/>
+            <a:endCxn id="8" idx="0"/>
+          </p:cNvCxnSpPr>
+          <p:nvPr/>
+        </p:nvCxnSpPr>
+        <p:spPr>
+          <a:xfrm flipH="1">
+            <a:off x="4764429" y="1416678"/>
+            <a:ext cx="744342" cy="560253"/>
+          </a:xfrm>
+          <a:prstGeom prst="straightConnector1">
+            <a:avLst/>
+          </a:prstGeom>
+          <a:ln>
+            <a:solidFill>
+              <a:srgbClr val="958C06"/>
+            </a:solidFill>
+            <a:tailEnd type="arrow"/>
+          </a:ln>
+        </p:spPr>
+        <p:style>
+          <a:lnRef idx="2">
+            <a:schemeClr val="accent2"/>
+          </a:lnRef>
+          <a:fillRef idx="0">
+            <a:schemeClr val="accent2"/>
+          </a:fillRef>
+          <a:effectRef idx="1">
+            <a:schemeClr val="accent2"/>
+          </a:effectRef>
+          <a:fontRef idx="minor">
+            <a:schemeClr val="tx1"/>
+          </a:fontRef>
+        </p:style>
+      </p:cxnSp>
+      <p:sp>
+        <p:nvSpPr>
+          <p:cNvPr id="10" name="Rounded Rectangle 9"/>
+          <p:cNvSpPr/>
+          <p:nvPr/>
+        </p:nvSpPr>
+        <p:spPr>
+          <a:xfrm>
+            <a:off x="4818062" y="1416678"/>
+            <a:ext cx="1381418" cy="360040"/>
+          </a:xfrm>
+          <a:prstGeom prst="roundRect">
+            <a:avLst/>
+          </a:prstGeom>
+          <a:solidFill>
+            <a:schemeClr val="accent3">
+              <a:lumMod val="40000"/>
+              <a:lumOff val="60000"/>
+            </a:schemeClr>
+          </a:solidFill>
+          <a:ln>
+            <a:solidFill>
+              <a:srgbClr val="FFFF00"/>
+            </a:solidFill>
+          </a:ln>
+        </p:spPr>
+        <p:style>
+          <a:lnRef idx="1">
+            <a:schemeClr val="accent6"/>
+          </a:lnRef>
+          <a:fillRef idx="3">
+            <a:schemeClr val="accent6"/>
+          </a:fillRef>
+          <a:effectRef idx="2">
+            <a:schemeClr val="accent6"/>
+          </a:effectRef>
+          <a:fontRef idx="minor">
+            <a:schemeClr val="lt1"/>
+          </a:fontRef>
+        </p:style>
+        <p:txBody>
+          <a:bodyPr rtlCol="0" anchor="ctr"/>
+          <a:lstStyle/>
+          <a:p>
+            <a:pPr algn="ctr"/>
+            <a:r>
+              <a:rPr lang="en-US" sz="1400" dirty="0" smtClean="0">
+                <a:solidFill>
+                  <a:srgbClr val="000000"/>
+                </a:solidFill>
+              </a:rPr>
+              <a:t>Shoes</a:t>
+            </a:r>
+            <a:endParaRPr lang="en-US" sz="1400" dirty="0">
+              <a:solidFill>
+                <a:srgbClr val="000000"/>
+              </a:solidFill>
+            </a:endParaRPr>
           </a:p>
         </p:txBody>
       </p:sp>

</xml_diff>

<commit_message>
Added the figure on feature improvements and some more references
</commit_message>
<xml_diff>
--- a/coling2016/images/illustrations-all.pptx
+++ b/coling2016/images/illustrations-all.pptx
@@ -5,7 +5,7 @@
     <p:sldMasterId id="2147483648" r:id="rId1"/>
   </p:sldMasterIdLst>
   <p:notesMasterIdLst>
-    <p:notesMasterId r:id="rId9"/>
+    <p:notesMasterId r:id="rId10"/>
   </p:notesMasterIdLst>
   <p:sldIdLst>
     <p:sldId id="256" r:id="rId2"/>
@@ -15,6 +15,7 @@
     <p:sldId id="261" r:id="rId6"/>
     <p:sldId id="262" r:id="rId7"/>
     <p:sldId id="263" r:id="rId8"/>
+    <p:sldId id="264" r:id="rId9"/>
   </p:sldIdLst>
   <p:sldSz cx="12801600" cy="6858000"/>
   <p:notesSz cx="6858000" cy="9144000"/>
@@ -816,12 +817,12 @@
         </c:dLbls>
         <c:gapWidth val="150"/>
         <c:shape val="box"/>
-        <c:axId val="-2111707832"/>
-        <c:axId val="2108632104"/>
+        <c:axId val="2105603272"/>
+        <c:axId val="2020261736"/>
         <c:axId val="0"/>
       </c:bar3DChart>
       <c:catAx>
-        <c:axId val="-2111707832"/>
+        <c:axId val="2105603272"/>
         <c:scaling>
           <c:orientation val="minMax"/>
         </c:scaling>
@@ -831,7 +832,7 @@
         <c:majorTickMark val="out"/>
         <c:minorTickMark val="none"/>
         <c:tickLblPos val="nextTo"/>
-        <c:crossAx val="2108632104"/>
+        <c:crossAx val="2020261736"/>
         <c:crosses val="autoZero"/>
         <c:auto val="1"/>
         <c:lblAlgn val="ctr"/>
@@ -839,7 +840,7 @@
         <c:noMultiLvlLbl val="0"/>
       </c:catAx>
       <c:valAx>
-        <c:axId val="2108632104"/>
+        <c:axId val="2020261736"/>
         <c:scaling>
           <c:orientation val="minMax"/>
           <c:max val="1.505E7"/>
@@ -872,7 +873,7 @@
             <a:endParaRPr lang="en-US"/>
           </a:p>
         </c:txPr>
-        <c:crossAx val="-2111707832"/>
+        <c:crossAx val="2105603272"/>
         <c:crosses val="autoZero"/>
         <c:crossBetween val="between"/>
         <c:majorUnit val="1.0E6"/>
@@ -939,6 +940,348 @@
 </c:chartSpace>
 </file>
 
+<file path=ppt/charts/chart10.xml><?xml version="1.0" encoding="utf-8"?>
+<c:chartSpace xmlns:c="http://schemas.openxmlformats.org/drawingml/2006/chart" xmlns:a="http://schemas.openxmlformats.org/drawingml/2006/main" xmlns:r="http://schemas.openxmlformats.org/officeDocument/2006/relationships">
+  <c:date1904 val="0"/>
+  <c:lang val="en-US"/>
+  <c:roundedCorners val="0"/>
+  <mc:AlternateContent xmlns:mc="http://schemas.openxmlformats.org/markup-compatibility/2006">
+    <mc:Choice xmlns:c14="http://schemas.microsoft.com/office/drawing/2007/8/2/chart" Requires="c14">
+      <c14:style val="118"/>
+    </mc:Choice>
+    <mc:Fallback>
+      <c:style val="18"/>
+    </mc:Fallback>
+  </mc:AlternateContent>
+  <c:chart>
+    <c:autoTitleDeleted val="0"/>
+    <c:plotArea>
+      <c:layout>
+        <c:manualLayout>
+          <c:layoutTarget val="inner"/>
+          <c:xMode val="edge"/>
+          <c:yMode val="edge"/>
+          <c:x val="0.0493177363620914"/>
+          <c:y val="0.0334190231362468"/>
+          <c:w val="0.420883049731143"/>
+          <c:h val="0.343466402839541"/>
+        </c:manualLayout>
+      </c:layout>
+      <c:barChart>
+        <c:barDir val="col"/>
+        <c:grouping val="clustered"/>
+        <c:varyColors val="0"/>
+        <c:ser>
+          <c:idx val="0"/>
+          <c:order val="0"/>
+          <c:tx>
+            <c:strRef>
+              <c:f>'list price improvements'!$A$2</c:f>
+              <c:strCache>
+                <c:ptCount val="1"/>
+                <c:pt idx="0">
+                  <c:v>Precision</c:v>
+                </c:pt>
+              </c:strCache>
+            </c:strRef>
+          </c:tx>
+          <c:spPr>
+            <a:solidFill>
+              <a:schemeClr val="accent6">
+                <a:lumMod val="60000"/>
+                <a:lumOff val="40000"/>
+              </a:schemeClr>
+            </a:solidFill>
+            <a:ln>
+              <a:solidFill>
+                <a:schemeClr val="accent6">
+                  <a:lumMod val="75000"/>
+                  <a:alpha val="87000"/>
+                </a:schemeClr>
+              </a:solidFill>
+            </a:ln>
+          </c:spPr>
+          <c:invertIfNegative val="0"/>
+          <c:cat>
+            <c:strRef>
+              <c:f>'list price improvements'!$B$1:$G$1</c:f>
+              <c:strCache>
+                <c:ptCount val="6"/>
+                <c:pt idx="0">
+                  <c:v>title words</c:v>
+                </c:pt>
+                <c:pt idx="1">
+                  <c:v>title words</c:v>
+                </c:pt>
+                <c:pt idx="2">
+                  <c:v>title words [remove rare &amp; stop words]</c:v>
+                </c:pt>
+                <c:pt idx="3">
+                  <c:v>title words with breadcrumb leaves [remove rare &amp; stop words]</c:v>
+                </c:pt>
+                <c:pt idx="4">
+                  <c:v>title words with list prices [remove rare &amp; stop words</c:v>
+                </c:pt>
+                <c:pt idx="5">
+                  <c:v>title words with breadcrumb leaves &amp; list prices [remove rare &amp; stop words]</c:v>
+                </c:pt>
+              </c:strCache>
+            </c:strRef>
+          </c:cat>
+          <c:val>
+            <c:numRef>
+              <c:f>'list price improvements'!$B$2:$G$2</c:f>
+              <c:numCache>
+                <c:formatCode>General</c:formatCode>
+                <c:ptCount val="6"/>
+                <c:pt idx="0">
+                  <c:v>85.468</c:v>
+                </c:pt>
+                <c:pt idx="1">
+                  <c:v>87.341</c:v>
+                </c:pt>
+                <c:pt idx="2">
+                  <c:v>86.964</c:v>
+                </c:pt>
+                <c:pt idx="3">
+                  <c:v>89.1468</c:v>
+                </c:pt>
+                <c:pt idx="4">
+                  <c:v>90.60820000000001</c:v>
+                </c:pt>
+                <c:pt idx="5">
+                  <c:v>91.7336</c:v>
+                </c:pt>
+              </c:numCache>
+            </c:numRef>
+          </c:val>
+        </c:ser>
+        <c:ser>
+          <c:idx val="1"/>
+          <c:order val="1"/>
+          <c:tx>
+            <c:strRef>
+              <c:f>'list price improvements'!$A$3</c:f>
+              <c:strCache>
+                <c:ptCount val="1"/>
+                <c:pt idx="0">
+                  <c:v>F1</c:v>
+                </c:pt>
+              </c:strCache>
+            </c:strRef>
+          </c:tx>
+          <c:spPr>
+            <a:solidFill>
+              <a:schemeClr val="accent4">
+                <a:lumMod val="40000"/>
+                <a:lumOff val="60000"/>
+                <a:alpha val="86000"/>
+              </a:schemeClr>
+            </a:solidFill>
+            <a:ln>
+              <a:solidFill>
+                <a:schemeClr val="accent4">
+                  <a:lumMod val="75000"/>
+                </a:schemeClr>
+              </a:solidFill>
+            </a:ln>
+          </c:spPr>
+          <c:invertIfNegative val="0"/>
+          <c:cat>
+            <c:strRef>
+              <c:f>'list price improvements'!$B$1:$G$1</c:f>
+              <c:strCache>
+                <c:ptCount val="6"/>
+                <c:pt idx="0">
+                  <c:v>title words</c:v>
+                </c:pt>
+                <c:pt idx="1">
+                  <c:v>title words</c:v>
+                </c:pt>
+                <c:pt idx="2">
+                  <c:v>title words [remove rare &amp; stop words]</c:v>
+                </c:pt>
+                <c:pt idx="3">
+                  <c:v>title words with breadcrumb leaves [remove rare &amp; stop words]</c:v>
+                </c:pt>
+                <c:pt idx="4">
+                  <c:v>title words with list prices [remove rare &amp; stop words</c:v>
+                </c:pt>
+                <c:pt idx="5">
+                  <c:v>title words with breadcrumb leaves &amp; list prices [remove rare &amp; stop words]</c:v>
+                </c:pt>
+              </c:strCache>
+            </c:strRef>
+          </c:cat>
+          <c:val>
+            <c:numRef>
+              <c:f>'list price improvements'!$B$3:$G$3</c:f>
+              <c:numCache>
+                <c:formatCode>General</c:formatCode>
+                <c:ptCount val="6"/>
+                <c:pt idx="0">
+                  <c:v>85.468</c:v>
+                </c:pt>
+                <c:pt idx="1">
+                  <c:v>87.3655</c:v>
+                </c:pt>
+                <c:pt idx="2">
+                  <c:v>86.978</c:v>
+                </c:pt>
+                <c:pt idx="3">
+                  <c:v>89.15140000000001</c:v>
+                </c:pt>
+                <c:pt idx="4">
+                  <c:v>90.6119</c:v>
+                </c:pt>
+                <c:pt idx="5">
+                  <c:v>91.7276</c:v>
+                </c:pt>
+              </c:numCache>
+            </c:numRef>
+          </c:val>
+        </c:ser>
+        <c:dLbls>
+          <c:showLegendKey val="0"/>
+          <c:showVal val="0"/>
+          <c:showCatName val="0"/>
+          <c:showSerName val="0"/>
+          <c:showPercent val="0"/>
+          <c:showBubbleSize val="0"/>
+        </c:dLbls>
+        <c:gapWidth val="150"/>
+        <c:axId val="-2081786920"/>
+        <c:axId val="-2081797176"/>
+      </c:barChart>
+      <c:catAx>
+        <c:axId val="-2081786920"/>
+        <c:scaling>
+          <c:orientation val="minMax"/>
+        </c:scaling>
+        <c:delete val="0"/>
+        <c:axPos val="b"/>
+        <c:majorTickMark val="in"/>
+        <c:minorTickMark val="none"/>
+        <c:tickLblPos val="nextTo"/>
+        <c:spPr>
+          <a:effectLst>
+            <a:outerShdw blurRad="53975" dist="63500" dir="1680000" algn="tl" rotWithShape="0">
+              <a:schemeClr val="bg1">
+                <a:lumMod val="75000"/>
+                <a:alpha val="47000"/>
+              </a:schemeClr>
+            </a:outerShdw>
+            <a:softEdge rad="38100"/>
+          </a:effectLst>
+        </c:spPr>
+        <c:txPr>
+          <a:bodyPr rot="-5400000" vert="horz" lIns="2">
+            <a:spAutoFit/>
+          </a:bodyPr>
+          <a:lstStyle/>
+          <a:p>
+            <a:pPr>
+              <a:defRPr sz="1600">
+                <a:effectLst/>
+              </a:defRPr>
+            </a:pPr>
+            <a:endParaRPr lang="en-US"/>
+          </a:p>
+        </c:txPr>
+        <c:crossAx val="-2081797176"/>
+        <c:crosses val="autoZero"/>
+        <c:auto val="1"/>
+        <c:lblAlgn val="ctr"/>
+        <c:lblOffset val="100"/>
+        <c:noMultiLvlLbl val="0"/>
+      </c:catAx>
+      <c:valAx>
+        <c:axId val="-2081797176"/>
+        <c:scaling>
+          <c:orientation val="minMax"/>
+        </c:scaling>
+        <c:delete val="0"/>
+        <c:axPos val="l"/>
+        <c:majorGridlines>
+          <c:spPr>
+            <a:ln w="1270">
+              <a:solidFill>
+                <a:schemeClr val="bg1">
+                  <a:lumMod val="85000"/>
+                  <a:alpha val="86000"/>
+                </a:schemeClr>
+              </a:solidFill>
+              <a:prstDash val="sysDot"/>
+            </a:ln>
+            <a:effectLst/>
+          </c:spPr>
+        </c:majorGridlines>
+        <c:numFmt formatCode="General" sourceLinked="1"/>
+        <c:majorTickMark val="in"/>
+        <c:minorTickMark val="none"/>
+        <c:tickLblPos val="nextTo"/>
+        <c:spPr>
+          <a:effectLst/>
+        </c:spPr>
+        <c:txPr>
+          <a:bodyPr/>
+          <a:lstStyle/>
+          <a:p>
+            <a:pPr>
+              <a:defRPr sz="1400"/>
+            </a:pPr>
+            <a:endParaRPr lang="en-US"/>
+          </a:p>
+        </c:txPr>
+        <c:crossAx val="-2081786920"/>
+        <c:crosses val="autoZero"/>
+        <c:crossBetween val="between"/>
+        <c:majorUnit val="2.0"/>
+      </c:valAx>
+      <c:spPr>
+        <a:solidFill>
+          <a:schemeClr val="bg1">
+            <a:lumMod val="95000"/>
+          </a:schemeClr>
+        </a:solidFill>
+        <a:effectLst/>
+      </c:spPr>
+    </c:plotArea>
+    <c:legend>
+      <c:legendPos val="r"/>
+      <c:layout>
+        <c:manualLayout>
+          <c:xMode val="edge"/>
+          <c:yMode val="edge"/>
+          <c:x val="0.0554066275423437"/>
+          <c:y val="0.0350040798009057"/>
+          <c:w val="0.224562898738781"/>
+          <c:h val="0.0955801476887928"/>
+        </c:manualLayout>
+      </c:layout>
+      <c:overlay val="0"/>
+      <c:txPr>
+        <a:bodyPr/>
+        <a:lstStyle/>
+        <a:p>
+          <a:pPr>
+            <a:defRPr sz="1800"/>
+          </a:pPr>
+          <a:endParaRPr lang="en-US"/>
+        </a:p>
+      </c:txPr>
+    </c:legend>
+    <c:plotVisOnly val="1"/>
+    <c:dispBlanksAs val="gap"/>
+    <c:showDLblsOverMax val="0"/>
+  </c:chart>
+  <c:externalData r:id="rId1">
+    <c:autoUpdate val="0"/>
+  </c:externalData>
+  <c:userShapes r:id="rId2"/>
+</c:chartSpace>
+</file>
+
 <file path=ppt/charts/chart2.xml><?xml version="1.0" encoding="utf-8"?>
 <c:chartSpace xmlns:c="http://schemas.openxmlformats.org/drawingml/2006/chart" xmlns:a="http://schemas.openxmlformats.org/drawingml/2006/main" xmlns:r="http://schemas.openxmlformats.org/officeDocument/2006/relationships">
   <c:date1904 val="0"/>
@@ -1717,12 +2060,12 @@
         </c:dLbls>
         <c:gapWidth val="150"/>
         <c:shape val="box"/>
-        <c:axId val="-2087354680"/>
-        <c:axId val="-2070903928"/>
+        <c:axId val="-2082333608"/>
+        <c:axId val="-2081930424"/>
         <c:axId val="0"/>
       </c:bar3DChart>
       <c:catAx>
-        <c:axId val="-2087354680"/>
+        <c:axId val="-2082333608"/>
         <c:scaling>
           <c:orientation val="minMax"/>
         </c:scaling>
@@ -1731,7 +2074,7 @@
         <c:majorTickMark val="out"/>
         <c:minorTickMark val="none"/>
         <c:tickLblPos val="nextTo"/>
-        <c:crossAx val="-2070903928"/>
+        <c:crossAx val="-2081930424"/>
         <c:crosses val="autoZero"/>
         <c:auto val="1"/>
         <c:lblAlgn val="ctr"/>
@@ -1739,7 +2082,7 @@
         <c:noMultiLvlLbl val="0"/>
       </c:catAx>
       <c:valAx>
-        <c:axId val="-2070903928"/>
+        <c:axId val="-2081930424"/>
         <c:scaling>
           <c:orientation val="minMax"/>
           <c:min val="50000.0"/>
@@ -1767,7 +2110,7 @@
             </a:outerShdw>
           </a:effectLst>
         </c:spPr>
-        <c:crossAx val="-2087354680"/>
+        <c:crossAx val="-2082333608"/>
         <c:crosses val="autoZero"/>
         <c:crossBetween val="between"/>
         <c:dispUnits>
@@ -1874,8 +2217,8 @@
           <c:spPr>
             <a:solidFill>
               <a:schemeClr val="accent6">
-                <a:lumMod val="40000"/>
-                <a:lumOff val="60000"/>
+                <a:lumMod val="60000"/>
+                <a:lumOff val="40000"/>
                 <a:alpha val="70000"/>
               </a:schemeClr>
             </a:solidFill>
@@ -1897,28 +2240,28 @@
                   <c:v>Toys</c:v>
                 </c:pt>
                 <c:pt idx="1">
-                  <c:v>Home, Patio and Furniture</c:v>
+                  <c:v>Home &amp; Furniture</c:v>
                 </c:pt>
                 <c:pt idx="2">
-                  <c:v>Jewelry and Watches</c:v>
+                  <c:v>Jewelry &amp; Watches</c:v>
                 </c:pt>
                 <c:pt idx="3">
-                  <c:v>Bags, Handbags and Accessories</c:v>
+                  <c:v>Bags &amp; Accessories</c:v>
                 </c:pt>
                 <c:pt idx="4">
-                  <c:v>Health, Beauty and Fragrance</c:v>
+                  <c:v>Health &amp; Beauty</c:v>
                 </c:pt>
                 <c:pt idx="5">
                   <c:v>Shoes</c:v>
                 </c:pt>
                 <c:pt idx="6">
-                  <c:v>Electronics and Computers</c:v>
+                  <c:v>Electronics &amp; Comp.</c:v>
                 </c:pt>
                 <c:pt idx="7">
                   <c:v>Office</c:v>
                 </c:pt>
                 <c:pt idx="8">
-                  <c:v>Sports and Fitness</c:v>
+                  <c:v>Sports &amp; Fitness</c:v>
                 </c:pt>
                 <c:pt idx="9">
                   <c:v>Automotive</c:v>
@@ -1930,7 +2273,7 @@
                   <c:v>Baby Products</c:v>
                 </c:pt>
                 <c:pt idx="12">
-                  <c:v>Baby and Kids Clothes</c:v>
+                  <c:v>Baby &amp; Kids Clothes</c:v>
                 </c:pt>
                 <c:pt idx="13">
                   <c:v>Men's Clothing</c:v>
@@ -1957,7 +2300,7 @@
                   <c:v>80.894</c:v>
                 </c:pt>
                 <c:pt idx="3">
-                  <c:v>81.67599999999989</c:v>
+                  <c:v>81.67599999999996</c:v>
                 </c:pt>
                 <c:pt idx="4">
                   <c:v>82.17799999999998</c:v>
@@ -2013,8 +2356,8 @@
           <c:spPr>
             <a:solidFill>
               <a:schemeClr val="accent4">
-                <a:lumMod val="40000"/>
-                <a:lumOff val="60000"/>
+                <a:lumMod val="60000"/>
+                <a:lumOff val="40000"/>
                 <a:alpha val="72000"/>
               </a:schemeClr>
             </a:solidFill>
@@ -2036,28 +2379,28 @@
                   <c:v>Toys</c:v>
                 </c:pt>
                 <c:pt idx="1">
-                  <c:v>Home, Patio and Furniture</c:v>
+                  <c:v>Home &amp; Furniture</c:v>
                 </c:pt>
                 <c:pt idx="2">
-                  <c:v>Jewelry and Watches</c:v>
+                  <c:v>Jewelry &amp; Watches</c:v>
                 </c:pt>
                 <c:pt idx="3">
-                  <c:v>Bags, Handbags and Accessories</c:v>
+                  <c:v>Bags &amp; Accessories</c:v>
                 </c:pt>
                 <c:pt idx="4">
-                  <c:v>Health, Beauty and Fragrance</c:v>
+                  <c:v>Health &amp; Beauty</c:v>
                 </c:pt>
                 <c:pt idx="5">
                   <c:v>Shoes</c:v>
                 </c:pt>
                 <c:pt idx="6">
-                  <c:v>Electronics and Computers</c:v>
+                  <c:v>Electronics &amp; Comp.</c:v>
                 </c:pt>
                 <c:pt idx="7">
                   <c:v>Office</c:v>
                 </c:pt>
                 <c:pt idx="8">
-                  <c:v>Sports and Fitness</c:v>
+                  <c:v>Sports &amp; Fitness</c:v>
                 </c:pt>
                 <c:pt idx="9">
                   <c:v>Automotive</c:v>
@@ -2069,7 +2412,7 @@
                   <c:v>Baby Products</c:v>
                 </c:pt>
                 <c:pt idx="12">
-                  <c:v>Baby and Kids Clothes</c:v>
+                  <c:v>Baby &amp; Kids Clothes</c:v>
                 </c:pt>
                 <c:pt idx="13">
                   <c:v>Men's Clothing</c:v>
@@ -2096,7 +2439,7 @@
                   <c:v>80.894</c:v>
                 </c:pt>
                 <c:pt idx="3">
-                  <c:v>81.67599999999989</c:v>
+                  <c:v>81.67599999999996</c:v>
                 </c:pt>
                 <c:pt idx="4">
                   <c:v>82.17799999999998</c:v>
@@ -2144,11 +2487,11 @@
           <c:showBubbleSize val="0"/>
         </c:dLbls>
         <c:gapWidth val="150"/>
-        <c:axId val="-2111791544"/>
-        <c:axId val="-2087394968"/>
+        <c:axId val="-2069665064"/>
+        <c:axId val="-2069000792"/>
       </c:barChart>
       <c:catAx>
-        <c:axId val="-2111791544"/>
+        <c:axId val="-2069665064"/>
         <c:scaling>
           <c:orientation val="minMax"/>
         </c:scaling>
@@ -2169,9 +2512,10 @@
           </a:ln>
           <a:effectLst>
             <a:outerShdw blurRad="165100" dist="25400" dir="2700000" sx="93000" sy="93000" algn="tl" rotWithShape="0">
-              <a:srgbClr val="000000">
+              <a:schemeClr val="bg1">
+                <a:lumMod val="50000"/>
                 <a:alpha val="13000"/>
-              </a:srgbClr>
+              </a:schemeClr>
             </a:outerShdw>
           </a:effectLst>
         </c:spPr>
@@ -2182,7 +2526,7 @@
           <a:lstStyle/>
           <a:p>
             <a:pPr>
-              <a:defRPr sz="1200" kern="1200" cap="none" spc="0">
+              <a:defRPr sz="1400" kern="1200" cap="none" spc="0" baseline="0">
                 <a:solidFill>
                   <a:schemeClr val="tx1"/>
                 </a:solidFill>
@@ -2191,7 +2535,7 @@
             <a:endParaRPr lang="en-US"/>
           </a:p>
         </c:txPr>
-        <c:crossAx val="-2087394968"/>
+        <c:crossAx val="-2069000792"/>
         <c:crosses val="autoZero"/>
         <c:auto val="1"/>
         <c:lblAlgn val="ctr"/>
@@ -2199,7 +2543,7 @@
         <c:noMultiLvlLbl val="0"/>
       </c:catAx>
       <c:valAx>
-        <c:axId val="-2087394968"/>
+        <c:axId val="-2069000792"/>
         <c:scaling>
           <c:orientation val="minMax"/>
           <c:max val="100.0"/>
@@ -2224,25 +2568,20 @@
         <c:minorTickMark val="none"/>
         <c:tickLblPos val="nextTo"/>
         <c:spPr>
-          <a:effectLst>
-            <a:outerShdw blurRad="95250" dist="38100" dir="2700000" algn="tl" rotWithShape="0">
-              <a:srgbClr val="000000">
-                <a:alpha val="22000"/>
-              </a:srgbClr>
-            </a:outerShdw>
-          </a:effectLst>
+          <a:noFill/>
+          <a:effectLst/>
         </c:spPr>
         <c:txPr>
           <a:bodyPr/>
           <a:lstStyle/>
           <a:p>
             <a:pPr>
-              <a:defRPr sz="1200" baseline="0"/>
+              <a:defRPr sz="1400" baseline="0"/>
             </a:pPr>
             <a:endParaRPr lang="en-US"/>
           </a:p>
         </c:txPr>
-        <c:crossAx val="-2111791544"/>
+        <c:crossAx val="-2069665064"/>
         <c:crosses val="autoZero"/>
         <c:crossBetween val="between"/>
         <c:majorUnit val="5.0"/>
@@ -2265,10 +2604,10 @@
         <c:manualLayout>
           <c:xMode val="edge"/>
           <c:yMode val="edge"/>
-          <c:x val="0.12427570634553"/>
-          <c:y val="0.105590771125676"/>
-          <c:w val="0.41114694302918"/>
-          <c:h val="0.0893771169665244"/>
+          <c:x val="0.121334529874942"/>
+          <c:y val="0.122350547661989"/>
+          <c:w val="0.412617531264474"/>
+          <c:h val="0.0865838208771389"/>
         </c:manualLayout>
       </c:layout>
       <c:overlay val="0"/>
@@ -2314,8 +2653,8 @@
           <c:layoutTarget val="inner"/>
           <c:xMode val="edge"/>
           <c:yMode val="edge"/>
-          <c:x val="0.191934043538675"/>
-          <c:y val="0.140006397637795"/>
+          <c:x val="0.118992867068087"/>
+          <c:y val="0.0587563976377953"/>
           <c:w val="0.728907480314961"/>
           <c:h val="0.409053505683803"/>
         </c:manualLayout>
@@ -2329,7 +2668,7 @@
           <c:order val="0"/>
           <c:tx>
             <c:strRef>
-              <c:f>DatasetStats!$D$2</c:f>
+              <c:f>SliceDatasetStats!$D$2</c:f>
               <c:strCache>
                 <c:ptCount val="1"/>
                 <c:pt idx="0">
@@ -2349,11 +2688,11 @@
           <c:invertIfNegative val="0"/>
           <c:cat>
             <c:strRef>
-              <c:f>DatasetStats!$B$3:$B$18</c:f>
+              <c:f>SliceDatasetStats!$B$3:$B$18</c:f>
               <c:strCache>
                 <c:ptCount val="16"/>
                 <c:pt idx="0">
-                  <c:v>apparel &amp; accessories</c:v>
+                  <c:v>apparel &amp; acc.</c:v>
                 </c:pt>
                 <c:pt idx="1">
                   <c:v>appliances</c:v>
@@ -2365,10 +2704,10 @@
                   <c:v>baby products</c:v>
                 </c:pt>
                 <c:pt idx="4">
-                  <c:v>electronics &amp; accessories</c:v>
+                  <c:v>electronics &amp; acc.</c:v>
                 </c:pt>
                 <c:pt idx="5">
-                  <c:v>grocery &amp; gourmet food</c:v>
+                  <c:v>grocery &amp; food</c:v>
                 </c:pt>
                 <c:pt idx="6">
                   <c:v>health &amp; beauty</c:v>
@@ -2395,7 +2734,7 @@
                   <c:v>tickets &amp; events</c:v>
                 </c:pt>
                 <c:pt idx="14">
-                  <c:v>tools &amp; home improvement</c:v>
+                  <c:v>home improvement</c:v>
                 </c:pt>
                 <c:pt idx="15">
                   <c:v>toys &amp; games</c:v>
@@ -2405,7 +2744,7 @@
           </c:cat>
           <c:val>
             <c:numRef>
-              <c:f>DatasetStats!$D$3:$D$18</c:f>
+              <c:f>SliceDatasetStats!$D$3:$D$18</c:f>
               <c:numCache>
                 <c:formatCode>General</c:formatCode>
                 <c:ptCount val="16"/>
@@ -2470,11 +2809,11 @@
           <c:showBubbleSize val="0"/>
         </c:dLbls>
         <c:gapWidth val="150"/>
-        <c:axId val="-2069950808"/>
-        <c:axId val="-2111206552"/>
+        <c:axId val="-2081486776"/>
+        <c:axId val="-2081498760"/>
       </c:barChart>
       <c:catAx>
-        <c:axId val="-2069950808"/>
+        <c:axId val="-2081486776"/>
         <c:scaling>
           <c:orientation val="minMax"/>
         </c:scaling>
@@ -2483,7 +2822,7 @@
         <c:majorTickMark val="in"/>
         <c:minorTickMark val="none"/>
         <c:tickLblPos val="nextTo"/>
-        <c:crossAx val="-2111206552"/>
+        <c:crossAx val="-2081498760"/>
         <c:crosses val="autoZero"/>
         <c:auto val="1"/>
         <c:lblAlgn val="ctr"/>
@@ -2491,10 +2830,10 @@
         <c:noMultiLvlLbl val="0"/>
       </c:catAx>
       <c:valAx>
-        <c:axId val="-2111206552"/>
+        <c:axId val="-2081498760"/>
         <c:scaling>
           <c:orientation val="minMax"/>
-          <c:max val="160.0"/>
+          <c:max val="260.0"/>
           <c:min val="0.0"/>
         </c:scaling>
         <c:delete val="0"/>
@@ -2524,9 +2863,10 @@
             <a:endParaRPr lang="en-US"/>
           </a:p>
         </c:txPr>
-        <c:crossAx val="-2069950808"/>
+        <c:crossAx val="-2081486776"/>
         <c:crosses val="autoZero"/>
         <c:crossBetween val="between"/>
+        <c:majorUnit val="50.0"/>
       </c:valAx>
     </c:plotArea>
     <c:plotVisOnly val="1"/>
@@ -2565,8 +2905,8 @@
           <c:layoutTarget val="inner"/>
           <c:xMode val="edge"/>
           <c:yMode val="edge"/>
-          <c:x val="0.195260768874479"/>
-          <c:y val="0.0356314960629921"/>
+          <c:x val="0.117062826163123"/>
+          <c:y val="0.0279997375328084"/>
           <c:w val="0.72805699287589"/>
           <c:h val="0.415658696332683"/>
         </c:manualLayout>
@@ -2580,7 +2920,7 @@
           <c:order val="0"/>
           <c:tx>
             <c:strRef>
-              <c:f>DatasetStats!$C$2</c:f>
+              <c:f>SliceDatasetStats!$C$2</c:f>
               <c:strCache>
                 <c:ptCount val="1"/>
                 <c:pt idx="0">
@@ -2599,11 +2939,11 @@
           <c:invertIfNegative val="0"/>
           <c:cat>
             <c:strRef>
-              <c:f>DatasetStats!$B$3:$B$18</c:f>
+              <c:f>SliceDatasetStats!$B$3:$B$18</c:f>
               <c:strCache>
                 <c:ptCount val="16"/>
                 <c:pt idx="0">
-                  <c:v>apparel &amp; accessories</c:v>
+                  <c:v>apparel &amp; acc.</c:v>
                 </c:pt>
                 <c:pt idx="1">
                   <c:v>appliances</c:v>
@@ -2615,10 +2955,10 @@
                   <c:v>baby products</c:v>
                 </c:pt>
                 <c:pt idx="4">
-                  <c:v>electronics &amp; accessories</c:v>
+                  <c:v>electronics &amp; acc.</c:v>
                 </c:pt>
                 <c:pt idx="5">
-                  <c:v>grocery &amp; gourmet food</c:v>
+                  <c:v>grocery &amp; food</c:v>
                 </c:pt>
                 <c:pt idx="6">
                   <c:v>health &amp; beauty</c:v>
@@ -2645,7 +2985,7 @@
                   <c:v>tickets &amp; events</c:v>
                 </c:pt>
                 <c:pt idx="14">
-                  <c:v>tools &amp; home improvement</c:v>
+                  <c:v>home improvement</c:v>
                 </c:pt>
                 <c:pt idx="15">
                   <c:v>toys &amp; games</c:v>
@@ -2655,7 +2995,7 @@
           </c:cat>
           <c:val>
             <c:numRef>
-              <c:f>DatasetStats!$C$3:$C$18</c:f>
+              <c:f>SliceDatasetStats!$C$3:$C$18</c:f>
               <c:numCache>
                 <c:formatCode>0.00</c:formatCode>
                 <c:ptCount val="16"/>
@@ -2720,11 +3060,11 @@
           <c:showBubbleSize val="0"/>
         </c:dLbls>
         <c:gapWidth val="150"/>
-        <c:axId val="2108512888"/>
-        <c:axId val="-2087082152"/>
+        <c:axId val="-2081575544"/>
+        <c:axId val="-2081580104"/>
       </c:barChart>
       <c:catAx>
-        <c:axId val="2108512888"/>
+        <c:axId val="-2081575544"/>
         <c:scaling>
           <c:orientation val="minMax"/>
         </c:scaling>
@@ -2753,7 +3093,7 @@
             <a:endParaRPr lang="en-US"/>
           </a:p>
         </c:txPr>
-        <c:crossAx val="-2087082152"/>
+        <c:crossAx val="-2081580104"/>
         <c:crosses val="autoZero"/>
         <c:auto val="1"/>
         <c:lblAlgn val="ctr"/>
@@ -2761,9 +3101,10 @@
         <c:noMultiLvlLbl val="0"/>
       </c:catAx>
       <c:valAx>
-        <c:axId val="-2087082152"/>
+        <c:axId val="-2081580104"/>
         <c:scaling>
           <c:orientation val="minMax"/>
+          <c:max val="6.0"/>
         </c:scaling>
         <c:delete val="0"/>
         <c:axPos val="l"/>
@@ -2792,7 +3133,7 @@
             <a:endParaRPr lang="en-US"/>
           </a:p>
         </c:txPr>
-        <c:crossAx val="2108512888"/>
+        <c:crossAx val="-2081575544"/>
         <c:crosses val="autoZero"/>
         <c:crossBetween val="between"/>
       </c:valAx>
@@ -2833,9 +3174,9 @@
           <c:layoutTarget val="inner"/>
           <c:xMode val="edge"/>
           <c:yMode val="edge"/>
-          <c:x val="0.113830353685298"/>
-          <c:y val="0.0678126742655751"/>
-          <c:w val="0.864153381954305"/>
+          <c:x val="0.101165128436814"/>
+          <c:y val="0.0488898964876581"/>
+          <c:w val="0.883044242932748"/>
           <c:h val="0.409053505683803"/>
         </c:manualLayout>
       </c:layout>
@@ -2848,7 +3189,7 @@
           <c:order val="0"/>
           <c:tx>
             <c:strRef>
-              <c:f>DatasetStats!$E$1</c:f>
+              <c:f>AmazonJDatasetStats!$E$1</c:f>
               <c:strCache>
                 <c:ptCount val="1"/>
                 <c:pt idx="0">
@@ -2860,7 +3201,7 @@
           <c:invertIfNegative val="0"/>
           <c:cat>
             <c:strRef>
-              <c:f>DatasetStats!$C$2:$C$26</c:f>
+              <c:f>AmazonJDatasetStats!$C$2:$C$26</c:f>
               <c:strCache>
                 <c:ptCount val="25"/>
                 <c:pt idx="0">
@@ -2897,7 +3238,7 @@
                   <c:v>electronics</c:v>
                 </c:pt>
                 <c:pt idx="11">
-                  <c:v>grocery &amp; gourmet food</c:v>
+                  <c:v>grocery &amp; food</c:v>
                 </c:pt>
                 <c:pt idx="12">
                   <c:v>health &amp; personal care</c:v>
@@ -2930,7 +3271,7 @@
                   <c:v>sports &amp; outdoors</c:v>
                 </c:pt>
                 <c:pt idx="22">
-                  <c:v>tools &amp; home improvement</c:v>
+                  <c:v>home improvement</c:v>
                 </c:pt>
                 <c:pt idx="23">
                   <c:v>toys &amp; games</c:v>
@@ -2943,7 +3284,7 @@
           </c:cat>
           <c:val>
             <c:numRef>
-              <c:f>DatasetStats!$E$2:$E$26</c:f>
+              <c:f>AmazonJDatasetStats!$E$2:$E$26</c:f>
               <c:numCache>
                 <c:formatCode>General</c:formatCode>
                 <c:ptCount val="25"/>
@@ -3035,11 +3376,11 @@
           <c:showBubbleSize val="0"/>
         </c:dLbls>
         <c:gapWidth val="150"/>
-        <c:axId val="-2110499288"/>
-        <c:axId val="-2070808504"/>
+        <c:axId val="-2081631752"/>
+        <c:axId val="-2081633240"/>
       </c:barChart>
       <c:catAx>
-        <c:axId val="-2110499288"/>
+        <c:axId val="-2081631752"/>
         <c:scaling>
           <c:orientation val="minMax"/>
         </c:scaling>
@@ -3048,7 +3389,7 @@
         <c:majorTickMark val="in"/>
         <c:minorTickMark val="none"/>
         <c:tickLblPos val="nextTo"/>
-        <c:crossAx val="-2070808504"/>
+        <c:crossAx val="-2081633240"/>
         <c:crosses val="autoZero"/>
         <c:auto val="1"/>
         <c:lblAlgn val="ctr"/>
@@ -3056,7 +3397,7 @@
         <c:noMultiLvlLbl val="0"/>
       </c:catAx>
       <c:valAx>
-        <c:axId val="-2070808504"/>
+        <c:axId val="-2081633240"/>
         <c:scaling>
           <c:orientation val="minMax"/>
           <c:max val="2600.0"/>
@@ -3089,7 +3430,7 @@
             <a:endParaRPr lang="en-US"/>
           </a:p>
         </c:txPr>
-        <c:crossAx val="-2110499288"/>
+        <c:crossAx val="-2081631752"/>
         <c:crosses val="autoZero"/>
         <c:crossBetween val="between"/>
       </c:valAx>
@@ -3130,9 +3471,9 @@
           <c:layoutTarget val="inner"/>
           <c:xMode val="edge"/>
           <c:yMode val="edge"/>
-          <c:x val="0.114381761731003"/>
-          <c:y val="0.0271911194586915"/>
-          <c:w val="0.855154439536521"/>
+          <c:x val="0.0995646885602714"/>
+          <c:y val="0.0256878325989068"/>
+          <c:w val="0.877051885282632"/>
           <c:h val="0.415658696332683"/>
         </c:manualLayout>
       </c:layout>
@@ -3145,7 +3486,7 @@
           <c:order val="0"/>
           <c:tx>
             <c:strRef>
-              <c:f>DatasetStats!$D$1</c:f>
+              <c:f>AmazonJDatasetStats!$D$1</c:f>
               <c:strCache>
                 <c:ptCount val="1"/>
                 <c:pt idx="0">
@@ -3164,7 +3505,7 @@
           <c:invertIfNegative val="0"/>
           <c:cat>
             <c:strRef>
-              <c:f>DatasetStats!$C$2:$C$26</c:f>
+              <c:f>AmazonJDatasetStats!$C$2:$C$26</c:f>
               <c:strCache>
                 <c:ptCount val="25"/>
                 <c:pt idx="0">
@@ -3201,7 +3542,7 @@
                   <c:v>electronics</c:v>
                 </c:pt>
                 <c:pt idx="11">
-                  <c:v>grocery &amp; gourmet food</c:v>
+                  <c:v>grocery &amp; food</c:v>
                 </c:pt>
                 <c:pt idx="12">
                   <c:v>health &amp; personal care</c:v>
@@ -3234,7 +3575,7 @@
                   <c:v>sports &amp; outdoors</c:v>
                 </c:pt>
                 <c:pt idx="22">
-                  <c:v>tools &amp; home improvement</c:v>
+                  <c:v>home improvement</c:v>
                 </c:pt>
                 <c:pt idx="23">
                   <c:v>toys &amp; games</c:v>
@@ -3247,7 +3588,7 @@
           </c:cat>
           <c:val>
             <c:numRef>
-              <c:f>DatasetStats!$D$2:$D$26</c:f>
+              <c:f>AmazonJDatasetStats!$D$2:$D$26</c:f>
               <c:numCache>
                 <c:formatCode>0.00</c:formatCode>
                 <c:ptCount val="25"/>
@@ -3285,7 +3626,7 @@
                   <c:v>1.25504863089823</c:v>
                 </c:pt>
                 <c:pt idx="11">
-                  <c:v>5.655575245367741</c:v>
+                  <c:v>5.655575245367743</c:v>
                 </c:pt>
                 <c:pt idx="12">
                   <c:v>0.979500127210511</c:v>
@@ -3339,11 +3680,11 @@
           <c:showBubbleSize val="0"/>
         </c:dLbls>
         <c:gapWidth val="150"/>
-        <c:axId val="2140483128"/>
-        <c:axId val="-2070274760"/>
+        <c:axId val="-2081662680"/>
+        <c:axId val="-2081667304"/>
       </c:barChart>
       <c:catAx>
-        <c:axId val="2140483128"/>
+        <c:axId val="-2081662680"/>
         <c:scaling>
           <c:orientation val="minMax"/>
         </c:scaling>
@@ -3372,7 +3713,7 @@
             <a:endParaRPr lang="en-US"/>
           </a:p>
         </c:txPr>
-        <c:crossAx val="-2070274760"/>
+        <c:crossAx val="-2081667304"/>
         <c:crosses val="autoZero"/>
         <c:auto val="1"/>
         <c:lblAlgn val="ctr"/>
@@ -3380,7 +3721,7 @@
         <c:noMultiLvlLbl val="0"/>
       </c:catAx>
       <c:valAx>
-        <c:axId val="-2070274760"/>
+        <c:axId val="-2081667304"/>
         <c:scaling>
           <c:orientation val="minMax"/>
         </c:scaling>
@@ -3411,7 +3752,7 @@
             <a:endParaRPr lang="en-US"/>
           </a:p>
         </c:txPr>
-        <c:crossAx val="2140483128"/>
+        <c:crossAx val="-2081662680"/>
         <c:crosses val="autoZero"/>
         <c:crossBetween val="between"/>
       </c:valAx>
@@ -3452,9 +3793,9 @@
           <c:layoutTarget val="inner"/>
           <c:xMode val="edge"/>
           <c:yMode val="edge"/>
-          <c:x val="0.168120791201368"/>
-          <c:y val="0.119266612252737"/>
-          <c:w val="0.736950454919677"/>
+          <c:x val="0.137460893795782"/>
+          <c:y val="0.0582910024966391"/>
+          <c:w val="0.728907480314961"/>
           <c:h val="0.363321730362973"/>
         </c:manualLayout>
       </c:layout>
@@ -3467,7 +3808,7 @@
           <c:order val="0"/>
           <c:tx>
             <c:strRef>
-              <c:f>DatasetStats!$D$2</c:f>
+              <c:f>EbatesDatasetStats!$D$2</c:f>
               <c:strCache>
                 <c:ptCount val="1"/>
                 <c:pt idx="0">
@@ -3487,29 +3828,29 @@
           <c:invertIfNegative val="0"/>
           <c:cat>
             <c:strRef>
-              <c:f>DatasetStats!$B$3:$B$17</c:f>
+              <c:f>EbatesDatasetStats!$B$3:$B$17</c:f>
               <c:strCache>
                 <c:ptCount val="15"/>
                 <c:pt idx="0">
                   <c:v>Toys</c:v>
                 </c:pt>
                 <c:pt idx="1">
-                  <c:v>Home Furniture &amp; Patio</c:v>
+                  <c:v>Home &amp; Furniture</c:v>
                 </c:pt>
                 <c:pt idx="2">
                   <c:v>Jewelry &amp; Watches</c:v>
                 </c:pt>
                 <c:pt idx="3">
-                  <c:v>Bag Handbags &amp; Accessories</c:v>
+                  <c:v>Bag &amp; Accessories</c:v>
                 </c:pt>
                 <c:pt idx="4">
-                  <c:v>Health Beauty &amp; Fragrance</c:v>
+                  <c:v>Health &amp; Beauty</c:v>
                 </c:pt>
                 <c:pt idx="5">
                   <c:v>Shoes</c:v>
                 </c:pt>
                 <c:pt idx="6">
-                  <c:v>Electronics &amp; Computers</c:v>
+                  <c:v>Electronics &amp; Comp.</c:v>
                 </c:pt>
                 <c:pt idx="7">
                   <c:v>Office</c:v>
@@ -3540,7 +3881,7 @@
           </c:cat>
           <c:val>
             <c:numRef>
-              <c:f>DatasetStats!$D$3:$D$17</c:f>
+              <c:f>EbatesDatasetStats!$D$3:$D$17</c:f>
               <c:numCache>
                 <c:formatCode>General</c:formatCode>
                 <c:ptCount val="15"/>
@@ -3602,11 +3943,11 @@
           <c:showBubbleSize val="0"/>
         </c:dLbls>
         <c:gapWidth val="150"/>
-        <c:axId val="2143570216"/>
-        <c:axId val="-2070691080"/>
+        <c:axId val="-2081706696"/>
+        <c:axId val="-2081716248"/>
       </c:barChart>
       <c:catAx>
-        <c:axId val="2143570216"/>
+        <c:axId val="-2081706696"/>
         <c:scaling>
           <c:orientation val="minMax"/>
         </c:scaling>
@@ -3615,7 +3956,7 @@
         <c:majorTickMark val="in"/>
         <c:minorTickMark val="none"/>
         <c:tickLblPos val="nextTo"/>
-        <c:crossAx val="-2070691080"/>
+        <c:crossAx val="-2081716248"/>
         <c:crosses val="autoZero"/>
         <c:auto val="1"/>
         <c:lblAlgn val="ctr"/>
@@ -3623,10 +3964,10 @@
         <c:noMultiLvlLbl val="0"/>
       </c:catAx>
       <c:valAx>
-        <c:axId val="-2070691080"/>
+        <c:axId val="-2081716248"/>
         <c:scaling>
           <c:orientation val="minMax"/>
-          <c:max val="80.0"/>
+          <c:max val="260.0"/>
           <c:min val="0.0"/>
         </c:scaling>
         <c:delete val="0"/>
@@ -3656,7 +3997,7 @@
             <a:endParaRPr lang="en-US"/>
           </a:p>
         </c:txPr>
-        <c:crossAx val="2143570216"/>
+        <c:crossAx val="-2081706696"/>
         <c:crosses val="autoZero"/>
         <c:crossBetween val="between"/>
       </c:valAx>
@@ -3697,10 +4038,10 @@
           <c:layoutTarget val="inner"/>
           <c:xMode val="edge"/>
           <c:yMode val="edge"/>
-          <c:x val="0.169773117982894"/>
-          <c:y val="0.0376897302730776"/>
+          <c:x val="0.130123522295562"/>
+          <c:y val="0.0312770744082522"/>
           <c:w val="0.743365821650342"/>
-          <c:h val="0.411654979297801"/>
+          <c:h val="0.402536438264366"/>
         </c:manualLayout>
       </c:layout>
       <c:barChart>
@@ -3712,7 +4053,7 @@
           <c:order val="0"/>
           <c:tx>
             <c:strRef>
-              <c:f>DatasetStats!$C$2</c:f>
+              <c:f>EbatesDatasetStats!$C$2</c:f>
               <c:strCache>
                 <c:ptCount val="1"/>
                 <c:pt idx="0">
@@ -3731,29 +4072,29 @@
           <c:invertIfNegative val="0"/>
           <c:cat>
             <c:strRef>
-              <c:f>DatasetStats!$B$3:$B$17</c:f>
+              <c:f>EbatesDatasetStats!$B$3:$B$17</c:f>
               <c:strCache>
                 <c:ptCount val="15"/>
                 <c:pt idx="0">
                   <c:v>Toys</c:v>
                 </c:pt>
                 <c:pt idx="1">
-                  <c:v>Home Furniture &amp; Patio</c:v>
+                  <c:v>Home &amp; Furniture</c:v>
                 </c:pt>
                 <c:pt idx="2">
                   <c:v>Jewelry &amp; Watches</c:v>
                 </c:pt>
                 <c:pt idx="3">
-                  <c:v>Bag Handbags &amp; Accessories</c:v>
+                  <c:v>Bag &amp; Accessories</c:v>
                 </c:pt>
                 <c:pt idx="4">
-                  <c:v>Health Beauty &amp; Fragrance</c:v>
+                  <c:v>Health &amp; Beauty</c:v>
                 </c:pt>
                 <c:pt idx="5">
                   <c:v>Shoes</c:v>
                 </c:pt>
                 <c:pt idx="6">
-                  <c:v>Electronics &amp; Computers</c:v>
+                  <c:v>Electronics &amp; Comp.</c:v>
                 </c:pt>
                 <c:pt idx="7">
                   <c:v>Office</c:v>
@@ -3784,7 +4125,7 @@
           </c:cat>
           <c:val>
             <c:numRef>
-              <c:f>DatasetStats!$C$3:$C$17</c:f>
+              <c:f>EbatesDatasetStats!$C$3:$C$17</c:f>
               <c:numCache>
                 <c:formatCode>0.00</c:formatCode>
                 <c:ptCount val="15"/>
@@ -3846,11 +4187,11 @@
           <c:showBubbleSize val="0"/>
         </c:dLbls>
         <c:gapWidth val="150"/>
-        <c:axId val="-2111774728"/>
-        <c:axId val="-2070670920"/>
+        <c:axId val="-2081745672"/>
+        <c:axId val="-2081751240"/>
       </c:barChart>
       <c:catAx>
-        <c:axId val="-2111774728"/>
+        <c:axId val="-2081745672"/>
         <c:scaling>
           <c:orientation val="minMax"/>
         </c:scaling>
@@ -3879,7 +4220,7 @@
             <a:endParaRPr lang="en-US"/>
           </a:p>
         </c:txPr>
-        <c:crossAx val="-2070670920"/>
+        <c:crossAx val="-2081751240"/>
         <c:crosses val="autoZero"/>
         <c:auto val="1"/>
         <c:lblAlgn val="ctr"/>
@@ -3887,9 +4228,10 @@
         <c:noMultiLvlLbl val="0"/>
       </c:catAx>
       <c:valAx>
-        <c:axId val="-2070670920"/>
+        <c:axId val="-2081751240"/>
         <c:scaling>
           <c:orientation val="minMax"/>
+          <c:max val="6.0"/>
         </c:scaling>
         <c:delete val="0"/>
         <c:axPos val="l"/>
@@ -3918,7 +4260,7 @@
             <a:endParaRPr lang="en-US"/>
           </a:p>
         </c:txPr>
-        <c:crossAx val="-2111774728"/>
+        <c:crossAx val="-2081745672"/>
         <c:crosses val="autoZero"/>
         <c:crossBetween val="between"/>
       </c:valAx>
@@ -3936,6 +4278,164 @@
     <c:autoUpdate val="0"/>
   </c:externalData>
 </c:chartSpace>
+</file>
+
+<file path=ppt/drawings/drawing1.xml><?xml version="1.0" encoding="utf-8"?>
+<c:userShapes xmlns:c="http://schemas.openxmlformats.org/drawingml/2006/chart">
+  <cdr:relSizeAnchor xmlns:cdr="http://schemas.openxmlformats.org/drawingml/2006/chartDrawing">
+    <cdr:from>
+      <cdr:x>0.12198</cdr:x>
+      <cdr:y>0.73535</cdr:y>
+    </cdr:from>
+    <cdr:to>
+      <cdr:x>0.18613</cdr:x>
+      <cdr:y>0.86719</cdr:y>
+    </cdr:to>
+    <cdr:sp macro="" textlink="">
+      <cdr:nvSpPr>
+        <cdr:cNvPr id="2" name="TextBox 1"/>
+        <cdr:cNvSpPr txBox="1"/>
+      </cdr:nvSpPr>
+      <cdr:spPr>
+        <a:xfrm xmlns:a="http://schemas.openxmlformats.org/drawingml/2006/main">
+          <a:off x="1240838" y="3604829"/>
+          <a:ext cx="652643" cy="646331"/>
+        </a:xfrm>
+        <a:prstGeom xmlns:a="http://schemas.openxmlformats.org/drawingml/2006/main" prst="rect">
+          <a:avLst/>
+        </a:prstGeom>
+        <a:noFill xmlns:a="http://schemas.openxmlformats.org/drawingml/2006/main"/>
+      </cdr:spPr>
+      <cdr:txBody>
+        <a:bodyPr xmlns:a="http://schemas.openxmlformats.org/drawingml/2006/main" wrap="none" rtlCol="0">
+          <a:spAutoFit/>
+        </a:bodyPr>
+        <a:lstStyle xmlns:a="http://schemas.openxmlformats.org/drawingml/2006/main">
+          <a:defPPr>
+            <a:defRPr lang="en-US"/>
+          </a:defPPr>
+          <a:lvl1pPr marL="0" algn="l" defTabSz="457200" rtl="0" eaLnBrk="1" latinLnBrk="0" hangingPunct="1">
+            <a:defRPr sz="1800" kern="1200">
+              <a:solidFill>
+                <a:schemeClr val="tx1"/>
+              </a:solidFill>
+              <a:latin typeface="+mn-lt"/>
+              <a:ea typeface="+mn-ea"/>
+              <a:cs typeface="+mn-cs"/>
+            </a:defRPr>
+          </a:lvl1pPr>
+          <a:lvl2pPr marL="457200" algn="l" defTabSz="457200" rtl="0" eaLnBrk="1" latinLnBrk="0" hangingPunct="1">
+            <a:defRPr sz="1800" kern="1200">
+              <a:solidFill>
+                <a:schemeClr val="tx1"/>
+              </a:solidFill>
+              <a:latin typeface="+mn-lt"/>
+              <a:ea typeface="+mn-ea"/>
+              <a:cs typeface="+mn-cs"/>
+            </a:defRPr>
+          </a:lvl2pPr>
+          <a:lvl3pPr marL="914400" algn="l" defTabSz="457200" rtl="0" eaLnBrk="1" latinLnBrk="0" hangingPunct="1">
+            <a:defRPr sz="1800" kern="1200">
+              <a:solidFill>
+                <a:schemeClr val="tx1"/>
+              </a:solidFill>
+              <a:latin typeface="+mn-lt"/>
+              <a:ea typeface="+mn-ea"/>
+              <a:cs typeface="+mn-cs"/>
+            </a:defRPr>
+          </a:lvl3pPr>
+          <a:lvl4pPr marL="1371600" algn="l" defTabSz="457200" rtl="0" eaLnBrk="1" latinLnBrk="0" hangingPunct="1">
+            <a:defRPr sz="1800" kern="1200">
+              <a:solidFill>
+                <a:schemeClr val="tx1"/>
+              </a:solidFill>
+              <a:latin typeface="+mn-lt"/>
+              <a:ea typeface="+mn-ea"/>
+              <a:cs typeface="+mn-cs"/>
+            </a:defRPr>
+          </a:lvl4pPr>
+          <a:lvl5pPr marL="1828800" algn="l" defTabSz="457200" rtl="0" eaLnBrk="1" latinLnBrk="0" hangingPunct="1">
+            <a:defRPr sz="1800" kern="1200">
+              <a:solidFill>
+                <a:schemeClr val="tx1"/>
+              </a:solidFill>
+              <a:latin typeface="+mn-lt"/>
+              <a:ea typeface="+mn-ea"/>
+              <a:cs typeface="+mn-cs"/>
+            </a:defRPr>
+          </a:lvl5pPr>
+          <a:lvl6pPr marL="2286000" algn="l" defTabSz="457200" rtl="0" eaLnBrk="1" latinLnBrk="0" hangingPunct="1">
+            <a:defRPr sz="1800" kern="1200">
+              <a:solidFill>
+                <a:schemeClr val="tx1"/>
+              </a:solidFill>
+              <a:latin typeface="+mn-lt"/>
+              <a:ea typeface="+mn-ea"/>
+              <a:cs typeface="+mn-cs"/>
+            </a:defRPr>
+          </a:lvl6pPr>
+          <a:lvl7pPr marL="2743200" algn="l" defTabSz="457200" rtl="0" eaLnBrk="1" latinLnBrk="0" hangingPunct="1">
+            <a:defRPr sz="1800" kern="1200">
+              <a:solidFill>
+                <a:schemeClr val="tx1"/>
+              </a:solidFill>
+              <a:latin typeface="+mn-lt"/>
+              <a:ea typeface="+mn-ea"/>
+              <a:cs typeface="+mn-cs"/>
+            </a:defRPr>
+          </a:lvl7pPr>
+          <a:lvl8pPr marL="3200400" algn="l" defTabSz="457200" rtl="0" eaLnBrk="1" latinLnBrk="0" hangingPunct="1">
+            <a:defRPr sz="1800" kern="1200">
+              <a:solidFill>
+                <a:schemeClr val="tx1"/>
+              </a:solidFill>
+              <a:latin typeface="+mn-lt"/>
+              <a:ea typeface="+mn-ea"/>
+              <a:cs typeface="+mn-cs"/>
+            </a:defRPr>
+          </a:lvl8pPr>
+          <a:lvl9pPr marL="3657600" algn="l" defTabSz="457200" rtl="0" eaLnBrk="1" latinLnBrk="0" hangingPunct="1">
+            <a:defRPr sz="1800" kern="1200">
+              <a:solidFill>
+                <a:schemeClr val="tx1"/>
+              </a:solidFill>
+              <a:latin typeface="+mn-lt"/>
+              <a:ea typeface="+mn-ea"/>
+              <a:cs typeface="+mn-cs"/>
+            </a:defRPr>
+          </a:lvl9pPr>
+        </a:lstStyle>
+        <a:p xmlns:a="http://schemas.openxmlformats.org/drawingml/2006/main">
+          <a:pPr algn="ctr"/>
+          <a:r>
+            <a:rPr lang="en-US" dirty="0" smtClean="0">
+              <a:solidFill>
+                <a:srgbClr val="376092"/>
+              </a:solidFill>
+            </a:rPr>
+            <a:t>Feb </a:t>
+          </a:r>
+        </a:p>
+        <a:p xmlns:a="http://schemas.openxmlformats.org/drawingml/2006/main">
+          <a:pPr algn="ctr"/>
+          <a:r>
+            <a:rPr lang="en-US" dirty="0" smtClean="0">
+              <a:solidFill>
+                <a:srgbClr val="376092"/>
+              </a:solidFill>
+            </a:rPr>
+            <a:t>2015</a:t>
+          </a:r>
+          <a:endParaRPr lang="en-US" dirty="0">
+            <a:solidFill>
+              <a:srgbClr val="376092"/>
+            </a:solidFill>
+          </a:endParaRPr>
+        </a:p>
+      </cdr:txBody>
+    </cdr:sp>
+  </cdr:relSizeAnchor>
+</c:userShapes>
 </file>
 
 <file path=ppt/notesMasters/notesMaster1.xml><?xml version="1.0" encoding="utf-8"?>
@@ -4020,7 +4520,7 @@
           <a:p>
             <a:fld id="{6F9D4AF7-9F9A-5340-BFDE-754FF02738F5}" type="datetimeFigureOut">
               <a:rPr lang="en-US" smtClean="0"/>
-              <a:t>6/28/16</a:t>
+              <a:t>6/30/16</a:t>
             </a:fld>
             <a:endParaRPr lang="en-US"/>
           </a:p>
@@ -4640,6 +5140,94 @@
 </p:notes>
 </file>
 
+<file path=ppt/notesSlides/notesSlide5.xml><?xml version="1.0" encoding="utf-8"?>
+<p:notes xmlns:a="http://schemas.openxmlformats.org/drawingml/2006/main" xmlns:r="http://schemas.openxmlformats.org/officeDocument/2006/relationships" xmlns:p="http://schemas.openxmlformats.org/presentationml/2006/main">
+  <p:cSld>
+    <p:spTree>
+      <p:nvGrpSpPr>
+        <p:cNvPr id="1" name=""/>
+        <p:cNvGrpSpPr/>
+        <p:nvPr/>
+      </p:nvGrpSpPr>
+      <p:grpSpPr>
+        <a:xfrm>
+          <a:off x="0" y="0"/>
+          <a:ext cx="0" cy="0"/>
+          <a:chOff x="0" y="0"/>
+          <a:chExt cx="0" cy="0"/>
+        </a:xfrm>
+      </p:grpSpPr>
+      <p:sp>
+        <p:nvSpPr>
+          <p:cNvPr id="2" name="Slide Image Placeholder 1"/>
+          <p:cNvSpPr>
+            <a:spLocks noGrp="1" noRot="1" noChangeAspect="1"/>
+          </p:cNvSpPr>
+          <p:nvPr>
+            <p:ph type="sldImg"/>
+          </p:nvPr>
+        </p:nvSpPr>
+        <p:spPr/>
+      </p:sp>
+      <p:sp>
+        <p:nvSpPr>
+          <p:cNvPr id="3" name="Notes Placeholder 2"/>
+          <p:cNvSpPr>
+            <a:spLocks noGrp="1"/>
+          </p:cNvSpPr>
+          <p:nvPr>
+            <p:ph type="body" idx="1"/>
+          </p:nvPr>
+        </p:nvSpPr>
+        <p:spPr/>
+        <p:txBody>
+          <a:bodyPr/>
+          <a:lstStyle/>
+          <a:p>
+            <a:r>
+              <a:rPr lang="en-US" dirty="0" err="1" smtClean="0"/>
+              <a:t>AmazonJ</a:t>
+            </a:r>
+            <a:endParaRPr lang="en-US" dirty="0"/>
+          </a:p>
+        </p:txBody>
+      </p:sp>
+      <p:sp>
+        <p:nvSpPr>
+          <p:cNvPr id="4" name="Slide Number Placeholder 3"/>
+          <p:cNvSpPr>
+            <a:spLocks noGrp="1"/>
+          </p:cNvSpPr>
+          <p:nvPr>
+            <p:ph type="sldNum" sz="quarter" idx="10"/>
+          </p:nvPr>
+        </p:nvSpPr>
+        <p:spPr/>
+        <p:txBody>
+          <a:bodyPr/>
+          <a:lstStyle/>
+          <a:p>
+            <a:fld id="{4FF565F4-8E39-F14A-98DF-B19082B92D24}" type="slidenum">
+              <a:rPr lang="en-US" smtClean="0"/>
+              <a:t>6</a:t>
+            </a:fld>
+            <a:endParaRPr lang="en-US"/>
+          </a:p>
+        </p:txBody>
+      </p:sp>
+    </p:spTree>
+    <p:extLst>
+      <p:ext uri="{BB962C8B-B14F-4D97-AF65-F5344CB8AC3E}">
+        <p14:creationId xmlns:p14="http://schemas.microsoft.com/office/powerpoint/2010/main" val="66148567"/>
+      </p:ext>
+    </p:extLst>
+  </p:cSld>
+  <p:clrMapOvr>
+    <a:masterClrMapping/>
+  </p:clrMapOvr>
+</p:notes>
+</file>
+
 <file path=ppt/slideLayouts/slideLayout1.xml><?xml version="1.0" encoding="utf-8"?>
 <p:sldLayout xmlns:a="http://schemas.openxmlformats.org/drawingml/2006/main" xmlns:r="http://schemas.openxmlformats.org/officeDocument/2006/relationships" xmlns:p="http://schemas.openxmlformats.org/presentationml/2006/main" type="title" preserve="1">
   <p:cSld name="Title Slide">
@@ -4821,7 +5409,7 @@
           <a:p>
             <a:fld id="{B9BF62FF-1DE6-9C45-813A-37774CEBB00E}" type="datetimeFigureOut">
               <a:rPr lang="en-US" smtClean="0"/>
-              <a:t>6/28/16</a:t>
+              <a:t>6/30/16</a:t>
             </a:fld>
             <a:endParaRPr lang="en-US"/>
           </a:p>
@@ -4991,7 +5579,7 @@
           <a:p>
             <a:fld id="{B9BF62FF-1DE6-9C45-813A-37774CEBB00E}" type="datetimeFigureOut">
               <a:rPr lang="en-US" smtClean="0"/>
-              <a:t>6/28/16</a:t>
+              <a:t>6/30/16</a:t>
             </a:fld>
             <a:endParaRPr lang="en-US"/>
           </a:p>
@@ -5171,7 +5759,7 @@
           <a:p>
             <a:fld id="{B9BF62FF-1DE6-9C45-813A-37774CEBB00E}" type="datetimeFigureOut">
               <a:rPr lang="en-US" smtClean="0"/>
-              <a:t>6/28/16</a:t>
+              <a:t>6/30/16</a:t>
             </a:fld>
             <a:endParaRPr lang="en-US"/>
           </a:p>
@@ -5341,7 +5929,7 @@
           <a:p>
             <a:fld id="{B9BF62FF-1DE6-9C45-813A-37774CEBB00E}" type="datetimeFigureOut">
               <a:rPr lang="en-US" smtClean="0"/>
-              <a:t>6/28/16</a:t>
+              <a:t>6/30/16</a:t>
             </a:fld>
             <a:endParaRPr lang="en-US"/>
           </a:p>
@@ -5587,7 +6175,7 @@
           <a:p>
             <a:fld id="{B9BF62FF-1DE6-9C45-813A-37774CEBB00E}" type="datetimeFigureOut">
               <a:rPr lang="en-US" smtClean="0"/>
-              <a:t>6/28/16</a:t>
+              <a:t>6/30/16</a:t>
             </a:fld>
             <a:endParaRPr lang="en-US"/>
           </a:p>
@@ -5875,7 +6463,7 @@
           <a:p>
             <a:fld id="{B9BF62FF-1DE6-9C45-813A-37774CEBB00E}" type="datetimeFigureOut">
               <a:rPr lang="en-US" smtClean="0"/>
-              <a:t>6/28/16</a:t>
+              <a:t>6/30/16</a:t>
             </a:fld>
             <a:endParaRPr lang="en-US"/>
           </a:p>
@@ -6302,7 +6890,7 @@
           <a:p>
             <a:fld id="{B9BF62FF-1DE6-9C45-813A-37774CEBB00E}" type="datetimeFigureOut">
               <a:rPr lang="en-US" smtClean="0"/>
-              <a:t>6/28/16</a:t>
+              <a:t>6/30/16</a:t>
             </a:fld>
             <a:endParaRPr lang="en-US"/>
           </a:p>
@@ -6420,7 +7008,7 @@
           <a:p>
             <a:fld id="{B9BF62FF-1DE6-9C45-813A-37774CEBB00E}" type="datetimeFigureOut">
               <a:rPr lang="en-US" smtClean="0"/>
-              <a:t>6/28/16</a:t>
+              <a:t>6/30/16</a:t>
             </a:fld>
             <a:endParaRPr lang="en-US"/>
           </a:p>
@@ -6515,7 +7103,7 @@
           <a:p>
             <a:fld id="{B9BF62FF-1DE6-9C45-813A-37774CEBB00E}" type="datetimeFigureOut">
               <a:rPr lang="en-US" smtClean="0"/>
-              <a:t>6/28/16</a:t>
+              <a:t>6/30/16</a:t>
             </a:fld>
             <a:endParaRPr lang="en-US"/>
           </a:p>
@@ -6792,7 +7380,7 @@
           <a:p>
             <a:fld id="{B9BF62FF-1DE6-9C45-813A-37774CEBB00E}" type="datetimeFigureOut">
               <a:rPr lang="en-US" smtClean="0"/>
-              <a:t>6/28/16</a:t>
+              <a:t>6/30/16</a:t>
             </a:fld>
             <a:endParaRPr lang="en-US"/>
           </a:p>
@@ -7045,7 +7633,7 @@
           <a:p>
             <a:fld id="{B9BF62FF-1DE6-9C45-813A-37774CEBB00E}" type="datetimeFigureOut">
               <a:rPr lang="en-US" smtClean="0"/>
-              <a:t>6/28/16</a:t>
+              <a:t>6/30/16</a:t>
             </a:fld>
             <a:endParaRPr lang="en-US"/>
           </a:p>
@@ -7258,7 +7846,7 @@
           <a:p>
             <a:fld id="{B9BF62FF-1DE6-9C45-813A-37774CEBB00E}" type="datetimeFigureOut">
               <a:rPr lang="en-US" smtClean="0"/>
-              <a:t>6/28/16</a:t>
+              <a:t>6/30/16</a:t>
             </a:fld>
             <a:endParaRPr lang="en-US"/>
           </a:p>
@@ -9826,17 +10414,7 @@
                   </a:schemeClr>
                 </a:solidFill>
               </a:rPr>
-              <a:t>More Women’s Comfort </a:t>
-            </a:r>
-            <a:r>
-              <a:rPr lang="en-US" sz="1200" b="1" dirty="0" smtClean="0">
-                <a:solidFill>
-                  <a:schemeClr val="accent1">
-                    <a:lumMod val="75000"/>
-                  </a:schemeClr>
-                </a:solidFill>
-              </a:rPr>
-              <a:t>Shoes</a:t>
+              <a:t>More Women’s Comfort Shoes</a:t>
             </a:r>
             <a:endParaRPr lang="en-US" sz="1200" b="1" dirty="0">
               <a:solidFill>
@@ -10495,20 +11073,20 @@
       </p:grpSpPr>
       <p:graphicFrame>
         <p:nvGraphicFramePr>
-          <p:cNvPr id="10" name="Chart 9"/>
+          <p:cNvPr id="6" name="Chart 5"/>
           <p:cNvGraphicFramePr>
             <a:graphicFrameLocks/>
           </p:cNvGraphicFramePr>
           <p:nvPr>
             <p:extLst>
               <p:ext uri="{D42A27DB-BD31-4B8C-83A1-F6EECF244321}">
-                <p14:modId xmlns:p14="http://schemas.microsoft.com/office/powerpoint/2010/main" val="2945924551"/>
+                <p14:modId xmlns:p14="http://schemas.microsoft.com/office/powerpoint/2010/main" val="1483932742"/>
               </p:ext>
             </p:extLst>
           </p:nvPr>
         </p:nvGraphicFramePr>
         <p:xfrm>
-          <a:off x="296368" y="932392"/>
+          <a:off x="0" y="32753"/>
           <a:ext cx="8636000" cy="4546600"/>
         </p:xfrm>
         <a:graphic>
@@ -10525,7 +11103,7 @@
         </p:nvCxnSpPr>
         <p:spPr>
           <a:xfrm flipV="1">
-            <a:off x="1367829" y="1881468"/>
+            <a:off x="1060363" y="975351"/>
             <a:ext cx="3586729" cy="1"/>
           </a:xfrm>
           <a:prstGeom prst="line">
@@ -10584,20 +11162,20 @@
       </p:grpSpPr>
       <p:graphicFrame>
         <p:nvGraphicFramePr>
-          <p:cNvPr id="4" name="Chart 3"/>
+          <p:cNvPr id="6" name="Chart 5"/>
           <p:cNvGraphicFramePr>
             <a:graphicFrameLocks/>
           </p:cNvGraphicFramePr>
           <p:nvPr>
             <p:extLst>
               <p:ext uri="{D42A27DB-BD31-4B8C-83A1-F6EECF244321}">
-                <p14:modId xmlns:p14="http://schemas.microsoft.com/office/powerpoint/2010/main" val="3486228116"/>
+                <p14:modId xmlns:p14="http://schemas.microsoft.com/office/powerpoint/2010/main" val="2091687328"/>
               </p:ext>
             </p:extLst>
           </p:nvPr>
         </p:nvGraphicFramePr>
         <p:xfrm>
-          <a:off x="0" y="57152"/>
+          <a:off x="0" y="0"/>
           <a:ext cx="5397500" cy="4064000"/>
         </p:xfrm>
         <a:graphic>
@@ -10608,21 +11186,21 @@
       </p:graphicFrame>
       <p:graphicFrame>
         <p:nvGraphicFramePr>
-          <p:cNvPr id="5" name="Chart 4"/>
+          <p:cNvPr id="7" name="Chart 6"/>
           <p:cNvGraphicFramePr>
             <a:graphicFrameLocks/>
           </p:cNvGraphicFramePr>
           <p:nvPr>
             <p:extLst>
               <p:ext uri="{D42A27DB-BD31-4B8C-83A1-F6EECF244321}">
-                <p14:modId xmlns:p14="http://schemas.microsoft.com/office/powerpoint/2010/main" val="867630314"/>
+                <p14:modId xmlns:p14="http://schemas.microsoft.com/office/powerpoint/2010/main" val="3897598753"/>
               </p:ext>
             </p:extLst>
           </p:nvPr>
         </p:nvGraphicFramePr>
         <p:xfrm>
-          <a:off x="0" y="2397591"/>
-          <a:ext cx="5397500" cy="3810000"/>
+          <a:off x="0" y="2011947"/>
+          <a:ext cx="5422900" cy="3810000"/>
         </p:xfrm>
         <a:graphic>
           <a:graphicData uri="http://schemas.openxmlformats.org/drawingml/2006/chart">
@@ -10662,49 +11240,49 @@
       </p:grpSpPr>
       <p:graphicFrame>
         <p:nvGraphicFramePr>
-          <p:cNvPr id="4" name="Chart 3"/>
+          <p:cNvPr id="6" name="Chart 5"/>
           <p:cNvGraphicFramePr>
             <a:graphicFrameLocks/>
           </p:cNvGraphicFramePr>
           <p:nvPr>
             <p:extLst>
               <p:ext uri="{D42A27DB-BD31-4B8C-83A1-F6EECF244321}">
-                <p14:modId xmlns:p14="http://schemas.microsoft.com/office/powerpoint/2010/main" val="1971640493"/>
+                <p14:modId xmlns:p14="http://schemas.microsoft.com/office/powerpoint/2010/main" val="1567222764"/>
               </p:ext>
             </p:extLst>
           </p:nvPr>
         </p:nvGraphicFramePr>
         <p:xfrm>
-          <a:off x="0" y="15083"/>
-          <a:ext cx="6197600" cy="4483100"/>
+          <a:off x="0" y="32084"/>
+          <a:ext cx="6197600" cy="4521200"/>
         </p:xfrm>
         <a:graphic>
           <a:graphicData uri="http://schemas.openxmlformats.org/drawingml/2006/chart">
-            <c:chart xmlns:c="http://schemas.openxmlformats.org/drawingml/2006/chart" xmlns:r="http://schemas.openxmlformats.org/officeDocument/2006/relationships" r:id="rId2"/>
+            <c:chart xmlns:c="http://schemas.openxmlformats.org/drawingml/2006/chart" xmlns:r="http://schemas.openxmlformats.org/officeDocument/2006/relationships" r:id="rId3"/>
           </a:graphicData>
         </a:graphic>
       </p:graphicFrame>
       <p:graphicFrame>
         <p:nvGraphicFramePr>
-          <p:cNvPr id="5" name="Chart 4"/>
+          <p:cNvPr id="7" name="Chart 6"/>
           <p:cNvGraphicFramePr>
             <a:graphicFrameLocks/>
           </p:cNvGraphicFramePr>
           <p:nvPr>
             <p:extLst>
               <p:ext uri="{D42A27DB-BD31-4B8C-83A1-F6EECF244321}">
-                <p14:modId xmlns:p14="http://schemas.microsoft.com/office/powerpoint/2010/main" val="2111096372"/>
+                <p14:modId xmlns:p14="http://schemas.microsoft.com/office/powerpoint/2010/main" val="836956478"/>
               </p:ext>
             </p:extLst>
           </p:nvPr>
         </p:nvGraphicFramePr>
         <p:xfrm>
-          <a:off x="0" y="2271186"/>
+          <a:off x="0" y="2210468"/>
           <a:ext cx="6248400" cy="4152900"/>
         </p:xfrm>
         <a:graphic>
           <a:graphicData uri="http://schemas.openxmlformats.org/drawingml/2006/chart">
-            <c:chart xmlns:c="http://schemas.openxmlformats.org/drawingml/2006/chart" xmlns:r="http://schemas.openxmlformats.org/officeDocument/2006/relationships" r:id="rId3"/>
+            <c:chart xmlns:c="http://schemas.openxmlformats.org/drawingml/2006/chart" xmlns:r="http://schemas.openxmlformats.org/officeDocument/2006/relationships" r:id="rId4"/>
           </a:graphicData>
         </a:graphic>
       </p:graphicFrame>
@@ -10740,14 +11318,14 @@
       </p:grpSpPr>
       <p:graphicFrame>
         <p:nvGraphicFramePr>
-          <p:cNvPr id="2" name="Chart 1"/>
+          <p:cNvPr id="4" name="Chart 3"/>
           <p:cNvGraphicFramePr>
             <a:graphicFrameLocks/>
           </p:cNvGraphicFramePr>
           <p:nvPr>
             <p:extLst>
               <p:ext uri="{D42A27DB-BD31-4B8C-83A1-F6EECF244321}">
-                <p14:modId xmlns:p14="http://schemas.microsoft.com/office/powerpoint/2010/main" val="2076171381"/>
+                <p14:modId xmlns:p14="http://schemas.microsoft.com/office/powerpoint/2010/main" val="493511305"/>
               </p:ext>
             </p:extLst>
           </p:nvPr>
@@ -10764,20 +11342,20 @@
       </p:graphicFrame>
       <p:graphicFrame>
         <p:nvGraphicFramePr>
-          <p:cNvPr id="5" name="Chart 4"/>
+          <p:cNvPr id="6" name="Chart 5"/>
           <p:cNvGraphicFramePr>
             <a:graphicFrameLocks/>
           </p:cNvGraphicFramePr>
           <p:nvPr>
             <p:extLst>
               <p:ext uri="{D42A27DB-BD31-4B8C-83A1-F6EECF244321}">
-                <p14:modId xmlns:p14="http://schemas.microsoft.com/office/powerpoint/2010/main" val="3510400325"/>
+                <p14:modId xmlns:p14="http://schemas.microsoft.com/office/powerpoint/2010/main" val="787040360"/>
               </p:ext>
             </p:extLst>
           </p:nvPr>
         </p:nvGraphicFramePr>
         <p:xfrm>
-          <a:off x="0" y="2129171"/>
+          <a:off x="25400" y="1864227"/>
           <a:ext cx="4711700" cy="4178300"/>
         </p:xfrm>
         <a:graphic>
@@ -10790,6 +11368,203 @@
     <p:extLst>
       <p:ext uri="{BB962C8B-B14F-4D97-AF65-F5344CB8AC3E}">
         <p14:creationId xmlns:p14="http://schemas.microsoft.com/office/powerpoint/2010/main" val="118008185"/>
+      </p:ext>
+    </p:extLst>
+  </p:cSld>
+  <p:clrMapOvr>
+    <a:masterClrMapping/>
+  </p:clrMapOvr>
+</p:sld>
+</file>
+
+<file path=ppt/slides/slide8.xml><?xml version="1.0" encoding="utf-8"?>
+<p:sld xmlns:a="http://schemas.openxmlformats.org/drawingml/2006/main" xmlns:r="http://schemas.openxmlformats.org/officeDocument/2006/relationships" xmlns:p="http://schemas.openxmlformats.org/presentationml/2006/main">
+  <p:cSld>
+    <p:spTree>
+      <p:nvGrpSpPr>
+        <p:cNvPr id="1" name=""/>
+        <p:cNvGrpSpPr/>
+        <p:nvPr/>
+      </p:nvGrpSpPr>
+      <p:grpSpPr>
+        <a:xfrm>
+          <a:off x="0" y="0"/>
+          <a:ext cx="0" cy="0"/>
+          <a:chOff x="0" y="0"/>
+          <a:chExt cx="0" cy="0"/>
+        </a:xfrm>
+      </p:grpSpPr>
+      <p:graphicFrame>
+        <p:nvGraphicFramePr>
+          <p:cNvPr id="4" name="Chart 3"/>
+          <p:cNvGraphicFramePr>
+            <a:graphicFrameLocks/>
+          </p:cNvGraphicFramePr>
+          <p:nvPr>
+            <p:extLst>
+              <p:ext uri="{D42A27DB-BD31-4B8C-83A1-F6EECF244321}">
+                <p14:modId xmlns:p14="http://schemas.microsoft.com/office/powerpoint/2010/main" val="2202691056"/>
+              </p:ext>
+            </p:extLst>
+          </p:nvPr>
+        </p:nvGraphicFramePr>
+        <p:xfrm>
+          <a:off x="133681" y="173789"/>
+          <a:ext cx="10172700" cy="4902200"/>
+        </p:xfrm>
+        <a:graphic>
+          <a:graphicData uri="http://schemas.openxmlformats.org/drawingml/2006/chart">
+            <c:chart xmlns:c="http://schemas.openxmlformats.org/drawingml/2006/chart" xmlns:r="http://schemas.openxmlformats.org/officeDocument/2006/relationships" r:id="rId2"/>
+          </a:graphicData>
+        </a:graphic>
+      </p:graphicFrame>
+      <p:sp>
+        <p:nvSpPr>
+          <p:cNvPr id="2" name="TextBox 1"/>
+          <p:cNvSpPr txBox="1"/>
+          <p:nvPr/>
+        </p:nvSpPr>
+        <p:spPr>
+          <a:xfrm>
+            <a:off x="721876" y="3778618"/>
+            <a:ext cx="652643" cy="646331"/>
+          </a:xfrm>
+          <a:prstGeom prst="rect">
+            <a:avLst/>
+          </a:prstGeom>
+          <a:noFill/>
+        </p:spPr>
+        <p:txBody>
+          <a:bodyPr wrap="none" rtlCol="0">
+            <a:spAutoFit/>
+          </a:bodyPr>
+          <a:lstStyle/>
+          <a:p>
+            <a:pPr algn="ctr"/>
+            <a:r>
+              <a:rPr lang="en-US" dirty="0" smtClean="0">
+                <a:solidFill>
+                  <a:srgbClr val="376092"/>
+                </a:solidFill>
+              </a:rPr>
+              <a:t>Dec </a:t>
+            </a:r>
+          </a:p>
+          <a:p>
+            <a:pPr algn="ctr"/>
+            <a:r>
+              <a:rPr lang="en-US" dirty="0" smtClean="0">
+                <a:solidFill>
+                  <a:srgbClr val="376092"/>
+                </a:solidFill>
+              </a:rPr>
+              <a:t>2015</a:t>
+            </a:r>
+            <a:endParaRPr lang="en-US" dirty="0">
+              <a:solidFill>
+                <a:srgbClr val="376092"/>
+              </a:solidFill>
+            </a:endParaRPr>
+          </a:p>
+        </p:txBody>
+      </p:sp>
+      <p:cxnSp>
+        <p:nvCxnSpPr>
+          <p:cNvPr id="5" name="Straight Connector 4"/>
+          <p:cNvCxnSpPr/>
+          <p:nvPr/>
+        </p:nvCxnSpPr>
+        <p:spPr>
+          <a:xfrm>
+            <a:off x="1374519" y="2072108"/>
+            <a:ext cx="0" cy="2352841"/>
+          </a:xfrm>
+          <a:prstGeom prst="line">
+            <a:avLst/>
+          </a:prstGeom>
+          <a:effectLst/>
+        </p:spPr>
+        <p:style>
+          <a:lnRef idx="2">
+            <a:schemeClr val="accent2"/>
+          </a:lnRef>
+          <a:fillRef idx="0">
+            <a:schemeClr val="accent2"/>
+          </a:fillRef>
+          <a:effectRef idx="1">
+            <a:schemeClr val="accent2"/>
+          </a:effectRef>
+          <a:fontRef idx="minor">
+            <a:schemeClr val="tx1"/>
+          </a:fontRef>
+        </p:style>
+      </p:cxnSp>
+      <p:cxnSp>
+        <p:nvCxnSpPr>
+          <p:cNvPr id="6" name="Straight Connector 5"/>
+          <p:cNvCxnSpPr/>
+          <p:nvPr/>
+        </p:nvCxnSpPr>
+        <p:spPr>
+          <a:xfrm>
+            <a:off x="668404" y="4424949"/>
+            <a:ext cx="1430383" cy="0"/>
+          </a:xfrm>
+          <a:prstGeom prst="line">
+            <a:avLst/>
+          </a:prstGeom>
+          <a:effectLst/>
+        </p:spPr>
+        <p:style>
+          <a:lnRef idx="2">
+            <a:schemeClr val="accent2"/>
+          </a:lnRef>
+          <a:fillRef idx="0">
+            <a:schemeClr val="accent2"/>
+          </a:fillRef>
+          <a:effectRef idx="1">
+            <a:schemeClr val="accent2"/>
+          </a:effectRef>
+          <a:fontRef idx="minor">
+            <a:schemeClr val="tx1"/>
+          </a:fontRef>
+        </p:style>
+      </p:cxnSp>
+      <p:cxnSp>
+        <p:nvCxnSpPr>
+          <p:cNvPr id="10" name="Straight Connector 9"/>
+          <p:cNvCxnSpPr/>
+          <p:nvPr/>
+        </p:nvCxnSpPr>
+        <p:spPr>
+          <a:xfrm>
+            <a:off x="668404" y="2072108"/>
+            <a:ext cx="1430383" cy="0"/>
+          </a:xfrm>
+          <a:prstGeom prst="line">
+            <a:avLst/>
+          </a:prstGeom>
+          <a:effectLst/>
+        </p:spPr>
+        <p:style>
+          <a:lnRef idx="2">
+            <a:schemeClr val="accent2"/>
+          </a:lnRef>
+          <a:fillRef idx="0">
+            <a:schemeClr val="accent2"/>
+          </a:fillRef>
+          <a:effectRef idx="1">
+            <a:schemeClr val="accent2"/>
+          </a:effectRef>
+          <a:fontRef idx="minor">
+            <a:schemeClr val="tx1"/>
+          </a:fontRef>
+        </p:style>
+      </p:cxnSp>
+    </p:spTree>
+    <p:extLst>
+      <p:ext uri="{BB962C8B-B14F-4D97-AF65-F5344CB8AC3E}">
+        <p14:creationId xmlns:p14="http://schemas.microsoft.com/office/powerpoint/2010/main" val="4182446611"/>
       </p:ext>
     </p:extLst>
   </p:cSld>

</xml_diff>

<commit_message>
Cleaned up the images a bit
</commit_message>
<xml_diff>
--- a/coling2016/images/illustrations-all.pptx
+++ b/coling2016/images/illustrations-all.pptx
@@ -817,12 +817,12 @@
         </c:dLbls>
         <c:gapWidth val="150"/>
         <c:shape val="box"/>
-        <c:axId val="2105603272"/>
-        <c:axId val="2020261736"/>
+        <c:axId val="-2070883912"/>
+        <c:axId val="-2070384072"/>
         <c:axId val="0"/>
       </c:bar3DChart>
       <c:catAx>
-        <c:axId val="2105603272"/>
+        <c:axId val="-2070883912"/>
         <c:scaling>
           <c:orientation val="minMax"/>
         </c:scaling>
@@ -832,7 +832,7 @@
         <c:majorTickMark val="out"/>
         <c:minorTickMark val="none"/>
         <c:tickLblPos val="nextTo"/>
-        <c:crossAx val="2020261736"/>
+        <c:crossAx val="-2070384072"/>
         <c:crosses val="autoZero"/>
         <c:auto val="1"/>
         <c:lblAlgn val="ctr"/>
@@ -840,7 +840,7 @@
         <c:noMultiLvlLbl val="0"/>
       </c:catAx>
       <c:valAx>
-        <c:axId val="2020261736"/>
+        <c:axId val="-2070384072"/>
         <c:scaling>
           <c:orientation val="minMax"/>
           <c:max val="1.505E7"/>
@@ -873,7 +873,7 @@
             <a:endParaRPr lang="en-US"/>
           </a:p>
         </c:txPr>
-        <c:crossAx val="2105603272"/>
+        <c:crossAx val="-2070883912"/>
         <c:crosses val="autoZero"/>
         <c:crossBetween val="between"/>
         <c:majorUnit val="1.0E6"/>
@@ -1020,7 +1020,7 @@
                   <c:v>title words with breadcrumb leaves [remove rare &amp; stop words]</c:v>
                 </c:pt>
                 <c:pt idx="4">
-                  <c:v>title words with list prices [remove rare &amp; stop words</c:v>
+                  <c:v>title words with list prices [remove rare &amp; stop words]</c:v>
                 </c:pt>
                 <c:pt idx="5">
                   <c:v>title words with breadcrumb leaves &amp; list prices [remove rare &amp; stop words]</c:v>
@@ -1105,7 +1105,7 @@
                   <c:v>title words with breadcrumb leaves [remove rare &amp; stop words]</c:v>
                 </c:pt>
                 <c:pt idx="4">
-                  <c:v>title words with list prices [remove rare &amp; stop words</c:v>
+                  <c:v>title words with list prices [remove rare &amp; stop words]</c:v>
                 </c:pt>
                 <c:pt idx="5">
                   <c:v>title words with breadcrumb leaves &amp; list prices [remove rare &amp; stop words]</c:v>
@@ -1150,11 +1150,11 @@
           <c:showBubbleSize val="0"/>
         </c:dLbls>
         <c:gapWidth val="150"/>
-        <c:axId val="-2081786920"/>
-        <c:axId val="-2081797176"/>
+        <c:axId val="2139367048"/>
+        <c:axId val="-2054255000"/>
       </c:barChart>
       <c:catAx>
-        <c:axId val="-2081786920"/>
+        <c:axId val="2139367048"/>
         <c:scaling>
           <c:orientation val="minMax"/>
         </c:scaling>
@@ -1181,14 +1181,14 @@
           <a:lstStyle/>
           <a:p>
             <a:pPr>
-              <a:defRPr sz="1600">
+              <a:defRPr sz="1400">
                 <a:effectLst/>
               </a:defRPr>
             </a:pPr>
             <a:endParaRPr lang="en-US"/>
           </a:p>
         </c:txPr>
-        <c:crossAx val="-2081797176"/>
+        <c:crossAx val="-2054255000"/>
         <c:crosses val="autoZero"/>
         <c:auto val="1"/>
         <c:lblAlgn val="ctr"/>
@@ -1196,7 +1196,7 @@
         <c:noMultiLvlLbl val="0"/>
       </c:catAx>
       <c:valAx>
-        <c:axId val="-2081797176"/>
+        <c:axId val="-2054255000"/>
         <c:scaling>
           <c:orientation val="minMax"/>
         </c:scaling>
@@ -1233,7 +1233,7 @@
             <a:endParaRPr lang="en-US"/>
           </a:p>
         </c:txPr>
-        <c:crossAx val="-2081786920"/>
+        <c:crossAx val="2139367048"/>
         <c:crosses val="autoZero"/>
         <c:crossBetween val="between"/>
         <c:majorUnit val="2.0"/>
@@ -1278,7 +1278,6 @@
   <c:externalData r:id="rId1">
     <c:autoUpdate val="0"/>
   </c:externalData>
-  <c:userShapes r:id="rId2"/>
 </c:chartSpace>
 </file>
 
@@ -2060,12 +2059,12 @@
         </c:dLbls>
         <c:gapWidth val="150"/>
         <c:shape val="box"/>
-        <c:axId val="-2082333608"/>
-        <c:axId val="-2081930424"/>
+        <c:axId val="-2054888008"/>
+        <c:axId val="-2054885000"/>
         <c:axId val="0"/>
       </c:bar3DChart>
       <c:catAx>
-        <c:axId val="-2082333608"/>
+        <c:axId val="-2054888008"/>
         <c:scaling>
           <c:orientation val="minMax"/>
         </c:scaling>
@@ -2074,7 +2073,7 @@
         <c:majorTickMark val="out"/>
         <c:minorTickMark val="none"/>
         <c:tickLblPos val="nextTo"/>
-        <c:crossAx val="-2081930424"/>
+        <c:crossAx val="-2054885000"/>
         <c:crosses val="autoZero"/>
         <c:auto val="1"/>
         <c:lblAlgn val="ctr"/>
@@ -2082,7 +2081,7 @@
         <c:noMultiLvlLbl val="0"/>
       </c:catAx>
       <c:valAx>
-        <c:axId val="-2081930424"/>
+        <c:axId val="-2054885000"/>
         <c:scaling>
           <c:orientation val="minMax"/>
           <c:min val="50000.0"/>
@@ -2110,7 +2109,7 @@
             </a:outerShdw>
           </a:effectLst>
         </c:spPr>
-        <c:crossAx val="-2082333608"/>
+        <c:crossAx val="-2054888008"/>
         <c:crosses val="autoZero"/>
         <c:crossBetween val="between"/>
         <c:dispUnits>
@@ -2300,7 +2299,7 @@
                   <c:v>80.894</c:v>
                 </c:pt>
                 <c:pt idx="3">
-                  <c:v>81.67599999999996</c:v>
+                  <c:v>81.67599999999994</c:v>
                 </c:pt>
                 <c:pt idx="4">
                   <c:v>82.17799999999998</c:v>
@@ -2439,7 +2438,7 @@
                   <c:v>80.894</c:v>
                 </c:pt>
                 <c:pt idx="3">
-                  <c:v>81.67599999999996</c:v>
+                  <c:v>81.67599999999994</c:v>
                 </c:pt>
                 <c:pt idx="4">
                   <c:v>82.17799999999998</c:v>
@@ -2487,11 +2486,11 @@
           <c:showBubbleSize val="0"/>
         </c:dLbls>
         <c:gapWidth val="150"/>
-        <c:axId val="-2069665064"/>
-        <c:axId val="-2069000792"/>
+        <c:axId val="-2087120728"/>
+        <c:axId val="2107810696"/>
       </c:barChart>
       <c:catAx>
-        <c:axId val="-2069665064"/>
+        <c:axId val="-2087120728"/>
         <c:scaling>
           <c:orientation val="minMax"/>
         </c:scaling>
@@ -2535,7 +2534,7 @@
             <a:endParaRPr lang="en-US"/>
           </a:p>
         </c:txPr>
-        <c:crossAx val="-2069000792"/>
+        <c:crossAx val="2107810696"/>
         <c:crosses val="autoZero"/>
         <c:auto val="1"/>
         <c:lblAlgn val="ctr"/>
@@ -2543,7 +2542,7 @@
         <c:noMultiLvlLbl val="0"/>
       </c:catAx>
       <c:valAx>
-        <c:axId val="-2069000792"/>
+        <c:axId val="2107810696"/>
         <c:scaling>
           <c:orientation val="minMax"/>
           <c:max val="100.0"/>
@@ -2581,7 +2580,7 @@
             <a:endParaRPr lang="en-US"/>
           </a:p>
         </c:txPr>
-        <c:crossAx val="-2069665064"/>
+        <c:crossAx val="-2087120728"/>
         <c:crosses val="autoZero"/>
         <c:crossBetween val="between"/>
         <c:majorUnit val="5.0"/>
@@ -2809,11 +2808,11 @@
           <c:showBubbleSize val="0"/>
         </c:dLbls>
         <c:gapWidth val="150"/>
-        <c:axId val="-2081486776"/>
-        <c:axId val="-2081498760"/>
+        <c:axId val="-2068050232"/>
+        <c:axId val="-2112375496"/>
       </c:barChart>
       <c:catAx>
-        <c:axId val="-2081486776"/>
+        <c:axId val="-2068050232"/>
         <c:scaling>
           <c:orientation val="minMax"/>
         </c:scaling>
@@ -2822,7 +2821,7 @@
         <c:majorTickMark val="in"/>
         <c:minorTickMark val="none"/>
         <c:tickLblPos val="nextTo"/>
-        <c:crossAx val="-2081498760"/>
+        <c:crossAx val="-2112375496"/>
         <c:crosses val="autoZero"/>
         <c:auto val="1"/>
         <c:lblAlgn val="ctr"/>
@@ -2830,7 +2829,7 @@
         <c:noMultiLvlLbl val="0"/>
       </c:catAx>
       <c:valAx>
-        <c:axId val="-2081498760"/>
+        <c:axId val="-2112375496"/>
         <c:scaling>
           <c:orientation val="minMax"/>
           <c:max val="260.0"/>
@@ -2863,7 +2862,7 @@
             <a:endParaRPr lang="en-US"/>
           </a:p>
         </c:txPr>
-        <c:crossAx val="-2081486776"/>
+        <c:crossAx val="-2068050232"/>
         <c:crosses val="autoZero"/>
         <c:crossBetween val="between"/>
         <c:majorUnit val="50.0"/>
@@ -3060,11 +3059,11 @@
           <c:showBubbleSize val="0"/>
         </c:dLbls>
         <c:gapWidth val="150"/>
-        <c:axId val="-2081575544"/>
-        <c:axId val="-2081580104"/>
+        <c:axId val="2107687384"/>
+        <c:axId val="2020782088"/>
       </c:barChart>
       <c:catAx>
-        <c:axId val="-2081575544"/>
+        <c:axId val="2107687384"/>
         <c:scaling>
           <c:orientation val="minMax"/>
         </c:scaling>
@@ -3093,7 +3092,7 @@
             <a:endParaRPr lang="en-US"/>
           </a:p>
         </c:txPr>
-        <c:crossAx val="-2081580104"/>
+        <c:crossAx val="2020782088"/>
         <c:crosses val="autoZero"/>
         <c:auto val="1"/>
         <c:lblAlgn val="ctr"/>
@@ -3101,7 +3100,7 @@
         <c:noMultiLvlLbl val="0"/>
       </c:catAx>
       <c:valAx>
-        <c:axId val="-2081580104"/>
+        <c:axId val="2020782088"/>
         <c:scaling>
           <c:orientation val="minMax"/>
           <c:max val="6.0"/>
@@ -3133,7 +3132,7 @@
             <a:endParaRPr lang="en-US"/>
           </a:p>
         </c:txPr>
-        <c:crossAx val="-2081575544"/>
+        <c:crossAx val="2107687384"/>
         <c:crosses val="autoZero"/>
         <c:crossBetween val="between"/>
       </c:valAx>
@@ -3376,11 +3375,11 @@
           <c:showBubbleSize val="0"/>
         </c:dLbls>
         <c:gapWidth val="150"/>
-        <c:axId val="-2081631752"/>
-        <c:axId val="-2081633240"/>
+        <c:axId val="-2069942776"/>
+        <c:axId val="2143641608"/>
       </c:barChart>
       <c:catAx>
-        <c:axId val="-2081631752"/>
+        <c:axId val="-2069942776"/>
         <c:scaling>
           <c:orientation val="minMax"/>
         </c:scaling>
@@ -3389,7 +3388,7 @@
         <c:majorTickMark val="in"/>
         <c:minorTickMark val="none"/>
         <c:tickLblPos val="nextTo"/>
-        <c:crossAx val="-2081633240"/>
+        <c:crossAx val="2143641608"/>
         <c:crosses val="autoZero"/>
         <c:auto val="1"/>
         <c:lblAlgn val="ctr"/>
@@ -3397,7 +3396,7 @@
         <c:noMultiLvlLbl val="0"/>
       </c:catAx>
       <c:valAx>
-        <c:axId val="-2081633240"/>
+        <c:axId val="2143641608"/>
         <c:scaling>
           <c:orientation val="minMax"/>
           <c:max val="2600.0"/>
@@ -3430,7 +3429,7 @@
             <a:endParaRPr lang="en-US"/>
           </a:p>
         </c:txPr>
-        <c:crossAx val="-2081631752"/>
+        <c:crossAx val="-2069942776"/>
         <c:crosses val="autoZero"/>
         <c:crossBetween val="between"/>
       </c:valAx>
@@ -3626,7 +3625,7 @@
                   <c:v>1.25504863089823</c:v>
                 </c:pt>
                 <c:pt idx="11">
-                  <c:v>5.655575245367743</c:v>
+                  <c:v>5.655575245367741</c:v>
                 </c:pt>
                 <c:pt idx="12">
                   <c:v>0.979500127210511</c:v>
@@ -3680,11 +3679,11 @@
           <c:showBubbleSize val="0"/>
         </c:dLbls>
         <c:gapWidth val="150"/>
-        <c:axId val="-2081662680"/>
-        <c:axId val="-2081667304"/>
+        <c:axId val="-2110049128"/>
+        <c:axId val="-2110416600"/>
       </c:barChart>
       <c:catAx>
-        <c:axId val="-2081662680"/>
+        <c:axId val="-2110049128"/>
         <c:scaling>
           <c:orientation val="minMax"/>
         </c:scaling>
@@ -3713,7 +3712,7 @@
             <a:endParaRPr lang="en-US"/>
           </a:p>
         </c:txPr>
-        <c:crossAx val="-2081667304"/>
+        <c:crossAx val="-2110416600"/>
         <c:crosses val="autoZero"/>
         <c:auto val="1"/>
         <c:lblAlgn val="ctr"/>
@@ -3721,7 +3720,7 @@
         <c:noMultiLvlLbl val="0"/>
       </c:catAx>
       <c:valAx>
-        <c:axId val="-2081667304"/>
+        <c:axId val="-2110416600"/>
         <c:scaling>
           <c:orientation val="minMax"/>
         </c:scaling>
@@ -3752,7 +3751,7 @@
             <a:endParaRPr lang="en-US"/>
           </a:p>
         </c:txPr>
-        <c:crossAx val="-2081662680"/>
+        <c:crossAx val="-2110049128"/>
         <c:crosses val="autoZero"/>
         <c:crossBetween val="between"/>
       </c:valAx>
@@ -3943,11 +3942,11 @@
           <c:showBubbleSize val="0"/>
         </c:dLbls>
         <c:gapWidth val="150"/>
-        <c:axId val="-2081706696"/>
-        <c:axId val="-2081716248"/>
+        <c:axId val="-2087170888"/>
+        <c:axId val="2140322168"/>
       </c:barChart>
       <c:catAx>
-        <c:axId val="-2081706696"/>
+        <c:axId val="-2087170888"/>
         <c:scaling>
           <c:orientation val="minMax"/>
         </c:scaling>
@@ -3956,7 +3955,7 @@
         <c:majorTickMark val="in"/>
         <c:minorTickMark val="none"/>
         <c:tickLblPos val="nextTo"/>
-        <c:crossAx val="-2081716248"/>
+        <c:crossAx val="2140322168"/>
         <c:crosses val="autoZero"/>
         <c:auto val="1"/>
         <c:lblAlgn val="ctr"/>
@@ -3964,7 +3963,7 @@
         <c:noMultiLvlLbl val="0"/>
       </c:catAx>
       <c:valAx>
-        <c:axId val="-2081716248"/>
+        <c:axId val="2140322168"/>
         <c:scaling>
           <c:orientation val="minMax"/>
           <c:max val="260.0"/>
@@ -3997,7 +3996,7 @@
             <a:endParaRPr lang="en-US"/>
           </a:p>
         </c:txPr>
-        <c:crossAx val="-2081706696"/>
+        <c:crossAx val="-2087170888"/>
         <c:crosses val="autoZero"/>
         <c:crossBetween val="between"/>
       </c:valAx>
@@ -4187,11 +4186,11 @@
           <c:showBubbleSize val="0"/>
         </c:dLbls>
         <c:gapWidth val="150"/>
-        <c:axId val="-2081745672"/>
-        <c:axId val="-2081751240"/>
+        <c:axId val="-2107402152"/>
+        <c:axId val="2020789448"/>
       </c:barChart>
       <c:catAx>
-        <c:axId val="-2081745672"/>
+        <c:axId val="-2107402152"/>
         <c:scaling>
           <c:orientation val="minMax"/>
         </c:scaling>
@@ -4220,7 +4219,7 @@
             <a:endParaRPr lang="en-US"/>
           </a:p>
         </c:txPr>
-        <c:crossAx val="-2081751240"/>
+        <c:crossAx val="2020789448"/>
         <c:crosses val="autoZero"/>
         <c:auto val="1"/>
         <c:lblAlgn val="ctr"/>
@@ -4228,7 +4227,7 @@
         <c:noMultiLvlLbl val="0"/>
       </c:catAx>
       <c:valAx>
-        <c:axId val="-2081751240"/>
+        <c:axId val="2020789448"/>
         <c:scaling>
           <c:orientation val="minMax"/>
           <c:max val="6.0"/>
@@ -4260,7 +4259,7 @@
             <a:endParaRPr lang="en-US"/>
           </a:p>
         </c:txPr>
-        <c:crossAx val="-2081745672"/>
+        <c:crossAx val="-2107402152"/>
         <c:crosses val="autoZero"/>
         <c:crossBetween val="between"/>
       </c:valAx>
@@ -4278,164 +4277,6 @@
     <c:autoUpdate val="0"/>
   </c:externalData>
 </c:chartSpace>
-</file>
-
-<file path=ppt/drawings/drawing1.xml><?xml version="1.0" encoding="utf-8"?>
-<c:userShapes xmlns:c="http://schemas.openxmlformats.org/drawingml/2006/chart">
-  <cdr:relSizeAnchor xmlns:cdr="http://schemas.openxmlformats.org/drawingml/2006/chartDrawing">
-    <cdr:from>
-      <cdr:x>0.12198</cdr:x>
-      <cdr:y>0.73535</cdr:y>
-    </cdr:from>
-    <cdr:to>
-      <cdr:x>0.18613</cdr:x>
-      <cdr:y>0.86719</cdr:y>
-    </cdr:to>
-    <cdr:sp macro="" textlink="">
-      <cdr:nvSpPr>
-        <cdr:cNvPr id="2" name="TextBox 1"/>
-        <cdr:cNvSpPr txBox="1"/>
-      </cdr:nvSpPr>
-      <cdr:spPr>
-        <a:xfrm xmlns:a="http://schemas.openxmlformats.org/drawingml/2006/main">
-          <a:off x="1240838" y="3604829"/>
-          <a:ext cx="652643" cy="646331"/>
-        </a:xfrm>
-        <a:prstGeom xmlns:a="http://schemas.openxmlformats.org/drawingml/2006/main" prst="rect">
-          <a:avLst/>
-        </a:prstGeom>
-        <a:noFill xmlns:a="http://schemas.openxmlformats.org/drawingml/2006/main"/>
-      </cdr:spPr>
-      <cdr:txBody>
-        <a:bodyPr xmlns:a="http://schemas.openxmlformats.org/drawingml/2006/main" wrap="none" rtlCol="0">
-          <a:spAutoFit/>
-        </a:bodyPr>
-        <a:lstStyle xmlns:a="http://schemas.openxmlformats.org/drawingml/2006/main">
-          <a:defPPr>
-            <a:defRPr lang="en-US"/>
-          </a:defPPr>
-          <a:lvl1pPr marL="0" algn="l" defTabSz="457200" rtl="0" eaLnBrk="1" latinLnBrk="0" hangingPunct="1">
-            <a:defRPr sz="1800" kern="1200">
-              <a:solidFill>
-                <a:schemeClr val="tx1"/>
-              </a:solidFill>
-              <a:latin typeface="+mn-lt"/>
-              <a:ea typeface="+mn-ea"/>
-              <a:cs typeface="+mn-cs"/>
-            </a:defRPr>
-          </a:lvl1pPr>
-          <a:lvl2pPr marL="457200" algn="l" defTabSz="457200" rtl="0" eaLnBrk="1" latinLnBrk="0" hangingPunct="1">
-            <a:defRPr sz="1800" kern="1200">
-              <a:solidFill>
-                <a:schemeClr val="tx1"/>
-              </a:solidFill>
-              <a:latin typeface="+mn-lt"/>
-              <a:ea typeface="+mn-ea"/>
-              <a:cs typeface="+mn-cs"/>
-            </a:defRPr>
-          </a:lvl2pPr>
-          <a:lvl3pPr marL="914400" algn="l" defTabSz="457200" rtl="0" eaLnBrk="1" latinLnBrk="0" hangingPunct="1">
-            <a:defRPr sz="1800" kern="1200">
-              <a:solidFill>
-                <a:schemeClr val="tx1"/>
-              </a:solidFill>
-              <a:latin typeface="+mn-lt"/>
-              <a:ea typeface="+mn-ea"/>
-              <a:cs typeface="+mn-cs"/>
-            </a:defRPr>
-          </a:lvl3pPr>
-          <a:lvl4pPr marL="1371600" algn="l" defTabSz="457200" rtl="0" eaLnBrk="1" latinLnBrk="0" hangingPunct="1">
-            <a:defRPr sz="1800" kern="1200">
-              <a:solidFill>
-                <a:schemeClr val="tx1"/>
-              </a:solidFill>
-              <a:latin typeface="+mn-lt"/>
-              <a:ea typeface="+mn-ea"/>
-              <a:cs typeface="+mn-cs"/>
-            </a:defRPr>
-          </a:lvl4pPr>
-          <a:lvl5pPr marL="1828800" algn="l" defTabSz="457200" rtl="0" eaLnBrk="1" latinLnBrk="0" hangingPunct="1">
-            <a:defRPr sz="1800" kern="1200">
-              <a:solidFill>
-                <a:schemeClr val="tx1"/>
-              </a:solidFill>
-              <a:latin typeface="+mn-lt"/>
-              <a:ea typeface="+mn-ea"/>
-              <a:cs typeface="+mn-cs"/>
-            </a:defRPr>
-          </a:lvl5pPr>
-          <a:lvl6pPr marL="2286000" algn="l" defTabSz="457200" rtl="0" eaLnBrk="1" latinLnBrk="0" hangingPunct="1">
-            <a:defRPr sz="1800" kern="1200">
-              <a:solidFill>
-                <a:schemeClr val="tx1"/>
-              </a:solidFill>
-              <a:latin typeface="+mn-lt"/>
-              <a:ea typeface="+mn-ea"/>
-              <a:cs typeface="+mn-cs"/>
-            </a:defRPr>
-          </a:lvl6pPr>
-          <a:lvl7pPr marL="2743200" algn="l" defTabSz="457200" rtl="0" eaLnBrk="1" latinLnBrk="0" hangingPunct="1">
-            <a:defRPr sz="1800" kern="1200">
-              <a:solidFill>
-                <a:schemeClr val="tx1"/>
-              </a:solidFill>
-              <a:latin typeface="+mn-lt"/>
-              <a:ea typeface="+mn-ea"/>
-              <a:cs typeface="+mn-cs"/>
-            </a:defRPr>
-          </a:lvl7pPr>
-          <a:lvl8pPr marL="3200400" algn="l" defTabSz="457200" rtl="0" eaLnBrk="1" latinLnBrk="0" hangingPunct="1">
-            <a:defRPr sz="1800" kern="1200">
-              <a:solidFill>
-                <a:schemeClr val="tx1"/>
-              </a:solidFill>
-              <a:latin typeface="+mn-lt"/>
-              <a:ea typeface="+mn-ea"/>
-              <a:cs typeface="+mn-cs"/>
-            </a:defRPr>
-          </a:lvl8pPr>
-          <a:lvl9pPr marL="3657600" algn="l" defTabSz="457200" rtl="0" eaLnBrk="1" latinLnBrk="0" hangingPunct="1">
-            <a:defRPr sz="1800" kern="1200">
-              <a:solidFill>
-                <a:schemeClr val="tx1"/>
-              </a:solidFill>
-              <a:latin typeface="+mn-lt"/>
-              <a:ea typeface="+mn-ea"/>
-              <a:cs typeface="+mn-cs"/>
-            </a:defRPr>
-          </a:lvl9pPr>
-        </a:lstStyle>
-        <a:p xmlns:a="http://schemas.openxmlformats.org/drawingml/2006/main">
-          <a:pPr algn="ctr"/>
-          <a:r>
-            <a:rPr lang="en-US" dirty="0" smtClean="0">
-              <a:solidFill>
-                <a:srgbClr val="376092"/>
-              </a:solidFill>
-            </a:rPr>
-            <a:t>Feb </a:t>
-          </a:r>
-        </a:p>
-        <a:p xmlns:a="http://schemas.openxmlformats.org/drawingml/2006/main">
-          <a:pPr algn="ctr"/>
-          <a:r>
-            <a:rPr lang="en-US" dirty="0" smtClean="0">
-              <a:solidFill>
-                <a:srgbClr val="376092"/>
-              </a:solidFill>
-            </a:rPr>
-            <a:t>2015</a:t>
-          </a:r>
-          <a:endParaRPr lang="en-US" dirty="0">
-            <a:solidFill>
-              <a:srgbClr val="376092"/>
-            </a:solidFill>
-          </a:endParaRPr>
-        </a:p>
-      </cdr:txBody>
-    </cdr:sp>
-  </cdr:relSizeAnchor>
-</c:userShapes>
 </file>
 
 <file path=ppt/notesMasters/notesMaster1.xml><?xml version="1.0" encoding="utf-8"?>
@@ -11396,20 +11237,20 @@
       </p:grpSpPr>
       <p:graphicFrame>
         <p:nvGraphicFramePr>
-          <p:cNvPr id="4" name="Chart 3"/>
+          <p:cNvPr id="7" name="Chart 6"/>
           <p:cNvGraphicFramePr>
             <a:graphicFrameLocks/>
           </p:cNvGraphicFramePr>
           <p:nvPr>
             <p:extLst>
               <p:ext uri="{D42A27DB-BD31-4B8C-83A1-F6EECF244321}">
-                <p14:modId xmlns:p14="http://schemas.microsoft.com/office/powerpoint/2010/main" val="2202691056"/>
+                <p14:modId xmlns:p14="http://schemas.microsoft.com/office/powerpoint/2010/main" val="3311660128"/>
               </p:ext>
             </p:extLst>
           </p:nvPr>
         </p:nvGraphicFramePr>
         <p:xfrm>
-          <a:off x="133681" y="173789"/>
+          <a:off x="160417" y="200526"/>
           <a:ext cx="10172700" cy="4902200"/>
         </p:xfrm>
         <a:graphic>
@@ -11426,7 +11267,7 @@
         </p:nvSpPr>
         <p:spPr>
           <a:xfrm>
-            <a:off x="721876" y="3778618"/>
+            <a:off x="721876" y="3791986"/>
             <a:ext cx="652643" cy="646331"/>
           </a:xfrm>
           <a:prstGeom prst="rect">
@@ -11444,7 +11285,9 @@
             <a:r>
               <a:rPr lang="en-US" dirty="0" smtClean="0">
                 <a:solidFill>
-                  <a:srgbClr val="376092"/>
+                  <a:schemeClr val="accent2">
+                    <a:lumMod val="75000"/>
+                  </a:schemeClr>
                 </a:solidFill>
               </a:rPr>
               <a:t>Dec </a:t>
@@ -11455,14 +11298,18 @@
             <a:r>
               <a:rPr lang="en-US" dirty="0" smtClean="0">
                 <a:solidFill>
-                  <a:srgbClr val="376092"/>
+                  <a:schemeClr val="accent2">
+                    <a:lumMod val="75000"/>
+                  </a:schemeClr>
                 </a:solidFill>
               </a:rPr>
               <a:t>2015</a:t>
             </a:r>
             <a:endParaRPr lang="en-US" dirty="0">
               <a:solidFill>
-                <a:srgbClr val="376092"/>
+                <a:schemeClr val="accent2">
+                  <a:lumMod val="75000"/>
+                </a:schemeClr>
               </a:solidFill>
             </a:endParaRPr>
           </a:p>
@@ -11476,7 +11323,7 @@
         </p:nvCxnSpPr>
         <p:spPr>
           <a:xfrm>
-            <a:off x="1374519" y="2072108"/>
+            <a:off x="1374519" y="2085476"/>
             <a:ext cx="0" cy="2352841"/>
           </a:xfrm>
           <a:prstGeom prst="line">
@@ -11507,7 +11354,7 @@
         </p:nvCxnSpPr>
         <p:spPr>
           <a:xfrm>
-            <a:off x="668404" y="4424949"/>
+            <a:off x="668404" y="4438317"/>
             <a:ext cx="1430383" cy="0"/>
           </a:xfrm>
           <a:prstGeom prst="line">
@@ -11538,7 +11385,7 @@
         </p:nvCxnSpPr>
         <p:spPr>
           <a:xfrm>
-            <a:off x="668404" y="2072108"/>
+            <a:off x="668404" y="2085476"/>
             <a:ext cx="1430383" cy="0"/>
           </a:xfrm>
           <a:prstGeom prst="line">
@@ -11561,6 +11408,79 @@
           </a:fontRef>
         </p:style>
       </p:cxnSp>
+      <p:sp>
+        <p:nvSpPr>
+          <p:cNvPr id="8" name="TextBox 7"/>
+          <p:cNvSpPr txBox="1"/>
+          <p:nvPr/>
+        </p:nvSpPr>
+        <p:spPr>
+          <a:xfrm>
+            <a:off x="1382260" y="3797338"/>
+            <a:ext cx="652643" cy="646331"/>
+          </a:xfrm>
+          <a:prstGeom prst="rect">
+            <a:avLst/>
+          </a:prstGeom>
+          <a:noFill/>
+        </p:spPr>
+        <p:txBody>
+          <a:bodyPr wrap="none" rtlCol="0">
+            <a:spAutoFit/>
+          </a:bodyPr>
+          <a:lstStyle/>
+          <a:p>
+            <a:pPr algn="ctr"/>
+            <a:r>
+              <a:rPr lang="en-US" dirty="0" smtClean="0">
+                <a:solidFill>
+                  <a:schemeClr val="accent2">
+                    <a:lumMod val="75000"/>
+                  </a:schemeClr>
+                </a:solidFill>
+              </a:rPr>
+              <a:t>Feb</a:t>
+            </a:r>
+            <a:r>
+              <a:rPr lang="en-US" dirty="0" smtClean="0">
+                <a:solidFill>
+                  <a:schemeClr val="accent2">
+                    <a:lumMod val="75000"/>
+                  </a:schemeClr>
+                </a:solidFill>
+              </a:rPr>
+              <a:t> </a:t>
+            </a:r>
+            <a:endParaRPr lang="en-US" dirty="0" smtClean="0">
+              <a:solidFill>
+                <a:schemeClr val="accent2">
+                  <a:lumMod val="75000"/>
+                </a:schemeClr>
+              </a:solidFill>
+            </a:endParaRPr>
+          </a:p>
+          <a:p>
+            <a:pPr algn="ctr"/>
+            <a:r>
+              <a:rPr lang="en-US" dirty="0" smtClean="0">
+                <a:solidFill>
+                  <a:schemeClr val="accent2">
+                    <a:lumMod val="75000"/>
+                  </a:schemeClr>
+                </a:solidFill>
+              </a:rPr>
+              <a:t>2016</a:t>
+            </a:r>
+            <a:endParaRPr lang="en-US" dirty="0">
+              <a:solidFill>
+                <a:schemeClr val="accent2">
+                  <a:lumMod val="75000"/>
+                </a:schemeClr>
+              </a:solidFill>
+            </a:endParaRPr>
+          </a:p>
+        </p:txBody>
+      </p:sp>
     </p:spTree>
     <p:extLst>
       <p:ext uri="{BB962C8B-B14F-4D97-AF65-F5344CB8AC3E}">

</xml_diff>

<commit_message>
Into the Results section - also broke off introduction into two sections
</commit_message>
<xml_diff>
--- a/coling2016/images/illustrations-all.pptx
+++ b/coling2016/images/illustrations-all.pptx
@@ -819,12 +819,12 @@
         </c:dLbls>
         <c:gapWidth val="150"/>
         <c:shape val="box"/>
-        <c:axId val="-2110232296"/>
-        <c:axId val="2107870312"/>
+        <c:axId val="-2080791048"/>
+        <c:axId val="-2083062312"/>
         <c:axId val="0"/>
       </c:bar3DChart>
       <c:catAx>
-        <c:axId val="-2110232296"/>
+        <c:axId val="-2080791048"/>
         <c:scaling>
           <c:orientation val="minMax"/>
         </c:scaling>
@@ -834,7 +834,7 @@
         <c:majorTickMark val="out"/>
         <c:minorTickMark val="none"/>
         <c:tickLblPos val="nextTo"/>
-        <c:crossAx val="2107870312"/>
+        <c:crossAx val="-2083062312"/>
         <c:crosses val="autoZero"/>
         <c:auto val="1"/>
         <c:lblAlgn val="ctr"/>
@@ -842,7 +842,7 @@
         <c:noMultiLvlLbl val="0"/>
       </c:catAx>
       <c:valAx>
-        <c:axId val="2107870312"/>
+        <c:axId val="-2083062312"/>
         <c:scaling>
           <c:orientation val="minMax"/>
           <c:max val="1.505E7"/>
@@ -875,7 +875,7 @@
             <a:endParaRPr lang="en-US"/>
           </a:p>
         </c:txPr>
-        <c:crossAx val="-2110232296"/>
+        <c:crossAx val="-2080791048"/>
         <c:crosses val="autoZero"/>
         <c:crossBetween val="between"/>
         <c:majorUnit val="1.0E6"/>
@@ -1152,11 +1152,11 @@
           <c:showBubbleSize val="0"/>
         </c:dLbls>
         <c:gapWidth val="150"/>
-        <c:axId val="-2070855336"/>
-        <c:axId val="-2071488312"/>
+        <c:axId val="-2063731080"/>
+        <c:axId val="-2064476648"/>
       </c:barChart>
       <c:catAx>
-        <c:axId val="-2070855336"/>
+        <c:axId val="-2063731080"/>
         <c:scaling>
           <c:orientation val="minMax"/>
         </c:scaling>
@@ -1190,7 +1190,7 @@
             <a:endParaRPr lang="en-US"/>
           </a:p>
         </c:txPr>
-        <c:crossAx val="-2071488312"/>
+        <c:crossAx val="-2064476648"/>
         <c:crosses val="autoZero"/>
         <c:auto val="1"/>
         <c:lblAlgn val="ctr"/>
@@ -1198,7 +1198,7 @@
         <c:noMultiLvlLbl val="0"/>
       </c:catAx>
       <c:valAx>
-        <c:axId val="-2071488312"/>
+        <c:axId val="-2064476648"/>
         <c:scaling>
           <c:orientation val="minMax"/>
         </c:scaling>
@@ -1235,7 +1235,7 @@
             <a:endParaRPr lang="en-US"/>
           </a:p>
         </c:txPr>
-        <c:crossAx val="-2070855336"/>
+        <c:crossAx val="-2063731080"/>
         <c:crosses val="autoZero"/>
         <c:crossBetween val="between"/>
         <c:majorUnit val="2.0"/>
@@ -2061,12 +2061,12 @@
         </c:dLbls>
         <c:gapWidth val="150"/>
         <c:shape val="box"/>
-        <c:axId val="-2111082520"/>
-        <c:axId val="-2070905640"/>
+        <c:axId val="-2083246152"/>
+        <c:axId val="-2064375320"/>
         <c:axId val="0"/>
       </c:bar3DChart>
       <c:catAx>
-        <c:axId val="-2111082520"/>
+        <c:axId val="-2083246152"/>
         <c:scaling>
           <c:orientation val="minMax"/>
         </c:scaling>
@@ -2075,7 +2075,7 @@
         <c:majorTickMark val="out"/>
         <c:minorTickMark val="none"/>
         <c:tickLblPos val="nextTo"/>
-        <c:crossAx val="-2070905640"/>
+        <c:crossAx val="-2064375320"/>
         <c:crosses val="autoZero"/>
         <c:auto val="1"/>
         <c:lblAlgn val="ctr"/>
@@ -2083,7 +2083,7 @@
         <c:noMultiLvlLbl val="0"/>
       </c:catAx>
       <c:valAx>
-        <c:axId val="-2070905640"/>
+        <c:axId val="-2064375320"/>
         <c:scaling>
           <c:orientation val="minMax"/>
           <c:min val="50000.0"/>
@@ -2111,7 +2111,7 @@
             </a:outerShdw>
           </a:effectLst>
         </c:spPr>
-        <c:crossAx val="-2111082520"/>
+        <c:crossAx val="-2083246152"/>
         <c:crosses val="autoZero"/>
         <c:crossBetween val="between"/>
         <c:dispUnits>
@@ -2301,7 +2301,7 @@
                   <c:v>80.894</c:v>
                 </c:pt>
                 <c:pt idx="3">
-                  <c:v>81.67599999999989</c:v>
+                  <c:v>81.67599999999986</c:v>
                 </c:pt>
                 <c:pt idx="4">
                   <c:v>82.17799999999998</c:v>
@@ -2440,7 +2440,7 @@
                   <c:v>80.894</c:v>
                 </c:pt>
                 <c:pt idx="3">
-                  <c:v>81.67599999999989</c:v>
+                  <c:v>81.67599999999986</c:v>
                 </c:pt>
                 <c:pt idx="4">
                   <c:v>82.17799999999998</c:v>
@@ -2488,11 +2488,11 @@
           <c:showBubbleSize val="0"/>
         </c:dLbls>
         <c:gapWidth val="150"/>
-        <c:axId val="-2071348888"/>
-        <c:axId val="-2068490632"/>
+        <c:axId val="-2068713864"/>
+        <c:axId val="-2070422456"/>
       </c:barChart>
       <c:catAx>
-        <c:axId val="-2071348888"/>
+        <c:axId val="-2068713864"/>
         <c:scaling>
           <c:orientation val="minMax"/>
         </c:scaling>
@@ -2536,7 +2536,7 @@
             <a:endParaRPr lang="en-US"/>
           </a:p>
         </c:txPr>
-        <c:crossAx val="-2068490632"/>
+        <c:crossAx val="-2070422456"/>
         <c:crosses val="autoZero"/>
         <c:auto val="1"/>
         <c:lblAlgn val="ctr"/>
@@ -2544,7 +2544,7 @@
         <c:noMultiLvlLbl val="0"/>
       </c:catAx>
       <c:valAx>
-        <c:axId val="-2068490632"/>
+        <c:axId val="-2070422456"/>
         <c:scaling>
           <c:orientation val="minMax"/>
           <c:max val="100.0"/>
@@ -2582,7 +2582,7 @@
             <a:endParaRPr lang="en-US"/>
           </a:p>
         </c:txPr>
-        <c:crossAx val="-2071348888"/>
+        <c:crossAx val="-2068713864"/>
         <c:crosses val="autoZero"/>
         <c:crossBetween val="between"/>
         <c:majorUnit val="5.0"/>
@@ -2810,11 +2810,11 @@
           <c:showBubbleSize val="0"/>
         </c:dLbls>
         <c:gapWidth val="150"/>
-        <c:axId val="-2110542584"/>
-        <c:axId val="-2087300488"/>
+        <c:axId val="-2070165208"/>
+        <c:axId val="-2071422664"/>
       </c:barChart>
       <c:catAx>
-        <c:axId val="-2110542584"/>
+        <c:axId val="-2070165208"/>
         <c:scaling>
           <c:orientation val="minMax"/>
         </c:scaling>
@@ -2823,7 +2823,7 @@
         <c:majorTickMark val="in"/>
         <c:minorTickMark val="none"/>
         <c:tickLblPos val="nextTo"/>
-        <c:crossAx val="-2087300488"/>
+        <c:crossAx val="-2071422664"/>
         <c:crosses val="autoZero"/>
         <c:auto val="1"/>
         <c:lblAlgn val="ctr"/>
@@ -2831,7 +2831,7 @@
         <c:noMultiLvlLbl val="0"/>
       </c:catAx>
       <c:valAx>
-        <c:axId val="-2087300488"/>
+        <c:axId val="-2071422664"/>
         <c:scaling>
           <c:orientation val="minMax"/>
           <c:max val="260.0"/>
@@ -2864,7 +2864,7 @@
             <a:endParaRPr lang="en-US"/>
           </a:p>
         </c:txPr>
-        <c:crossAx val="-2110542584"/>
+        <c:crossAx val="-2070165208"/>
         <c:crosses val="autoZero"/>
         <c:crossBetween val="between"/>
         <c:majorUnit val="50.0"/>
@@ -3061,11 +3061,11 @@
           <c:showBubbleSize val="0"/>
         </c:dLbls>
         <c:gapWidth val="150"/>
-        <c:axId val="2140179656"/>
-        <c:axId val="-2070590728"/>
+        <c:axId val="-2071933256"/>
+        <c:axId val="-2086707384"/>
       </c:barChart>
       <c:catAx>
-        <c:axId val="2140179656"/>
+        <c:axId val="-2071933256"/>
         <c:scaling>
           <c:orientation val="minMax"/>
         </c:scaling>
@@ -3094,7 +3094,7 @@
             <a:endParaRPr lang="en-US"/>
           </a:p>
         </c:txPr>
-        <c:crossAx val="-2070590728"/>
+        <c:crossAx val="-2086707384"/>
         <c:crosses val="autoZero"/>
         <c:auto val="1"/>
         <c:lblAlgn val="ctr"/>
@@ -3102,7 +3102,7 @@
         <c:noMultiLvlLbl val="0"/>
       </c:catAx>
       <c:valAx>
-        <c:axId val="-2070590728"/>
+        <c:axId val="-2086707384"/>
         <c:scaling>
           <c:orientation val="minMax"/>
           <c:max val="6.0"/>
@@ -3134,7 +3134,7 @@
             <a:endParaRPr lang="en-US"/>
           </a:p>
         </c:txPr>
-        <c:crossAx val="2140179656"/>
+        <c:crossAx val="-2071933256"/>
         <c:crosses val="autoZero"/>
         <c:crossBetween val="between"/>
       </c:valAx>
@@ -3377,11 +3377,11 @@
           <c:showBubbleSize val="0"/>
         </c:dLbls>
         <c:gapWidth val="150"/>
-        <c:axId val="-2107578376"/>
-        <c:axId val="-2087410824"/>
+        <c:axId val="-2050367352"/>
+        <c:axId val="-2070342248"/>
       </c:barChart>
       <c:catAx>
-        <c:axId val="-2107578376"/>
+        <c:axId val="-2050367352"/>
         <c:scaling>
           <c:orientation val="minMax"/>
         </c:scaling>
@@ -3390,7 +3390,7 @@
         <c:majorTickMark val="in"/>
         <c:minorTickMark val="none"/>
         <c:tickLblPos val="nextTo"/>
-        <c:crossAx val="-2087410824"/>
+        <c:crossAx val="-2070342248"/>
         <c:crosses val="autoZero"/>
         <c:auto val="1"/>
         <c:lblAlgn val="ctr"/>
@@ -3398,7 +3398,7 @@
         <c:noMultiLvlLbl val="0"/>
       </c:catAx>
       <c:valAx>
-        <c:axId val="-2087410824"/>
+        <c:axId val="-2070342248"/>
         <c:scaling>
           <c:orientation val="minMax"/>
           <c:max val="2600.0"/>
@@ -3431,7 +3431,7 @@
             <a:endParaRPr lang="en-US"/>
           </a:p>
         </c:txPr>
-        <c:crossAx val="-2107578376"/>
+        <c:crossAx val="-2050367352"/>
         <c:crosses val="autoZero"/>
         <c:crossBetween val="between"/>
       </c:valAx>
@@ -3627,7 +3627,7 @@
                   <c:v>1.25504863089823</c:v>
                 </c:pt>
                 <c:pt idx="11">
-                  <c:v>5.655575245367735</c:v>
+                  <c:v>5.655575245367733</c:v>
                 </c:pt>
                 <c:pt idx="12">
                   <c:v>0.979500127210511</c:v>
@@ -3681,11 +3681,11 @@
           <c:showBubbleSize val="0"/>
         </c:dLbls>
         <c:gapWidth val="150"/>
-        <c:axId val="-2050137864"/>
-        <c:axId val="2142120616"/>
+        <c:axId val="-2070712056"/>
+        <c:axId val="-2070467288"/>
       </c:barChart>
       <c:catAx>
-        <c:axId val="-2050137864"/>
+        <c:axId val="-2070712056"/>
         <c:scaling>
           <c:orientation val="minMax"/>
         </c:scaling>
@@ -3714,7 +3714,7 @@
             <a:endParaRPr lang="en-US"/>
           </a:p>
         </c:txPr>
-        <c:crossAx val="2142120616"/>
+        <c:crossAx val="-2070467288"/>
         <c:crosses val="autoZero"/>
         <c:auto val="1"/>
         <c:lblAlgn val="ctr"/>
@@ -3722,7 +3722,7 @@
         <c:noMultiLvlLbl val="0"/>
       </c:catAx>
       <c:valAx>
-        <c:axId val="2142120616"/>
+        <c:axId val="-2070467288"/>
         <c:scaling>
           <c:orientation val="minMax"/>
         </c:scaling>
@@ -3753,7 +3753,7 @@
             <a:endParaRPr lang="en-US"/>
           </a:p>
         </c:txPr>
-        <c:crossAx val="-2050137864"/>
+        <c:crossAx val="-2070712056"/>
         <c:crosses val="autoZero"/>
         <c:crossBetween val="between"/>
       </c:valAx>
@@ -3944,11 +3944,11 @@
           <c:showBubbleSize val="0"/>
         </c:dLbls>
         <c:gapWidth val="150"/>
-        <c:axId val="2079341512"/>
-        <c:axId val="-2068373064"/>
+        <c:axId val="2112310472"/>
+        <c:axId val="-2064577592"/>
       </c:barChart>
       <c:catAx>
-        <c:axId val="2079341512"/>
+        <c:axId val="2112310472"/>
         <c:scaling>
           <c:orientation val="minMax"/>
         </c:scaling>
@@ -3957,7 +3957,7 @@
         <c:majorTickMark val="in"/>
         <c:minorTickMark val="none"/>
         <c:tickLblPos val="nextTo"/>
-        <c:crossAx val="-2068373064"/>
+        <c:crossAx val="-2064577592"/>
         <c:crosses val="autoZero"/>
         <c:auto val="1"/>
         <c:lblAlgn val="ctr"/>
@@ -3965,7 +3965,7 @@
         <c:noMultiLvlLbl val="0"/>
       </c:catAx>
       <c:valAx>
-        <c:axId val="-2068373064"/>
+        <c:axId val="-2064577592"/>
         <c:scaling>
           <c:orientation val="minMax"/>
           <c:max val="260.0"/>
@@ -3998,7 +3998,7 @@
             <a:endParaRPr lang="en-US"/>
           </a:p>
         </c:txPr>
-        <c:crossAx val="2079341512"/>
+        <c:crossAx val="2112310472"/>
         <c:crosses val="autoZero"/>
         <c:crossBetween val="between"/>
       </c:valAx>
@@ -4188,11 +4188,11 @@
           <c:showBubbleSize val="0"/>
         </c:dLbls>
         <c:gapWidth val="150"/>
-        <c:axId val="-2071244744"/>
-        <c:axId val="-2111186952"/>
+        <c:axId val="-2063665528"/>
+        <c:axId val="-2063670264"/>
       </c:barChart>
       <c:catAx>
-        <c:axId val="-2071244744"/>
+        <c:axId val="-2063665528"/>
         <c:scaling>
           <c:orientation val="minMax"/>
         </c:scaling>
@@ -4221,7 +4221,7 @@
             <a:endParaRPr lang="en-US"/>
           </a:p>
         </c:txPr>
-        <c:crossAx val="-2111186952"/>
+        <c:crossAx val="-2063670264"/>
         <c:crosses val="autoZero"/>
         <c:auto val="1"/>
         <c:lblAlgn val="ctr"/>
@@ -4229,7 +4229,7 @@
         <c:noMultiLvlLbl val="0"/>
       </c:catAx>
       <c:valAx>
-        <c:axId val="-2111186952"/>
+        <c:axId val="-2063670264"/>
         <c:scaling>
           <c:orientation val="minMax"/>
           <c:max val="6.0"/>
@@ -4261,7 +4261,7 @@
             <a:endParaRPr lang="en-US"/>
           </a:p>
         </c:txPr>
-        <c:crossAx val="-2071244744"/>
+        <c:crossAx val="-2063665528"/>
         <c:crosses val="autoZero"/>
         <c:crossBetween val="between"/>
       </c:valAx>
@@ -4363,7 +4363,7 @@
           <a:p>
             <a:fld id="{6F9D4AF7-9F9A-5340-BFDE-754FF02738F5}" type="datetimeFigureOut">
               <a:rPr lang="en-US" smtClean="0"/>
-              <a:t>7/3/16</a:t>
+              <a:t>7/4/16</a:t>
             </a:fld>
             <a:endParaRPr lang="en-US"/>
           </a:p>
@@ -5428,7 +5428,7 @@
           <a:p>
             <a:fld id="{B9BF62FF-1DE6-9C45-813A-37774CEBB00E}" type="datetimeFigureOut">
               <a:rPr lang="en-US" smtClean="0"/>
-              <a:t>7/3/16</a:t>
+              <a:t>7/4/16</a:t>
             </a:fld>
             <a:endParaRPr lang="en-US"/>
           </a:p>
@@ -5598,7 +5598,7 @@
           <a:p>
             <a:fld id="{B9BF62FF-1DE6-9C45-813A-37774CEBB00E}" type="datetimeFigureOut">
               <a:rPr lang="en-US" smtClean="0"/>
-              <a:t>7/3/16</a:t>
+              <a:t>7/4/16</a:t>
             </a:fld>
             <a:endParaRPr lang="en-US"/>
           </a:p>
@@ -5778,7 +5778,7 @@
           <a:p>
             <a:fld id="{B9BF62FF-1DE6-9C45-813A-37774CEBB00E}" type="datetimeFigureOut">
               <a:rPr lang="en-US" smtClean="0"/>
-              <a:t>7/3/16</a:t>
+              <a:t>7/4/16</a:t>
             </a:fld>
             <a:endParaRPr lang="en-US"/>
           </a:p>
@@ -5948,7 +5948,7 @@
           <a:p>
             <a:fld id="{B9BF62FF-1DE6-9C45-813A-37774CEBB00E}" type="datetimeFigureOut">
               <a:rPr lang="en-US" smtClean="0"/>
-              <a:t>7/3/16</a:t>
+              <a:t>7/4/16</a:t>
             </a:fld>
             <a:endParaRPr lang="en-US"/>
           </a:p>
@@ -6194,7 +6194,7 @@
           <a:p>
             <a:fld id="{B9BF62FF-1DE6-9C45-813A-37774CEBB00E}" type="datetimeFigureOut">
               <a:rPr lang="en-US" smtClean="0"/>
-              <a:t>7/3/16</a:t>
+              <a:t>7/4/16</a:t>
             </a:fld>
             <a:endParaRPr lang="en-US"/>
           </a:p>
@@ -6482,7 +6482,7 @@
           <a:p>
             <a:fld id="{B9BF62FF-1DE6-9C45-813A-37774CEBB00E}" type="datetimeFigureOut">
               <a:rPr lang="en-US" smtClean="0"/>
-              <a:t>7/3/16</a:t>
+              <a:t>7/4/16</a:t>
             </a:fld>
             <a:endParaRPr lang="en-US"/>
           </a:p>
@@ -6909,7 +6909,7 @@
           <a:p>
             <a:fld id="{B9BF62FF-1DE6-9C45-813A-37774CEBB00E}" type="datetimeFigureOut">
               <a:rPr lang="en-US" smtClean="0"/>
-              <a:t>7/3/16</a:t>
+              <a:t>7/4/16</a:t>
             </a:fld>
             <a:endParaRPr lang="en-US"/>
           </a:p>
@@ -7027,7 +7027,7 @@
           <a:p>
             <a:fld id="{B9BF62FF-1DE6-9C45-813A-37774CEBB00E}" type="datetimeFigureOut">
               <a:rPr lang="en-US" smtClean="0"/>
-              <a:t>7/3/16</a:t>
+              <a:t>7/4/16</a:t>
             </a:fld>
             <a:endParaRPr lang="en-US"/>
           </a:p>
@@ -7122,7 +7122,7 @@
           <a:p>
             <a:fld id="{B9BF62FF-1DE6-9C45-813A-37774CEBB00E}" type="datetimeFigureOut">
               <a:rPr lang="en-US" smtClean="0"/>
-              <a:t>7/3/16</a:t>
+              <a:t>7/4/16</a:t>
             </a:fld>
             <a:endParaRPr lang="en-US"/>
           </a:p>
@@ -7399,7 +7399,7 @@
           <a:p>
             <a:fld id="{B9BF62FF-1DE6-9C45-813A-37774CEBB00E}" type="datetimeFigureOut">
               <a:rPr lang="en-US" smtClean="0"/>
-              <a:t>7/3/16</a:t>
+              <a:t>7/4/16</a:t>
             </a:fld>
             <a:endParaRPr lang="en-US"/>
           </a:p>
@@ -7652,7 +7652,7 @@
           <a:p>
             <a:fld id="{B9BF62FF-1DE6-9C45-813A-37774CEBB00E}" type="datetimeFigureOut">
               <a:rPr lang="en-US" smtClean="0"/>
-              <a:t>7/3/16</a:t>
+              <a:t>7/4/16</a:t>
             </a:fld>
             <a:endParaRPr lang="en-US"/>
           </a:p>
@@ -7865,7 +7865,7 @@
           <a:p>
             <a:fld id="{B9BF62FF-1DE6-9C45-813A-37774CEBB00E}" type="datetimeFigureOut">
               <a:rPr lang="en-US" smtClean="0"/>
-              <a:t>7/3/16</a:t>
+              <a:t>7/4/16</a:t>
             </a:fld>
             <a:endParaRPr lang="en-US"/>
           </a:p>
@@ -10914,7 +10914,7 @@
           <p:nvPr>
             <p:extLst>
               <p:ext uri="{D42A27DB-BD31-4B8C-83A1-F6EECF244321}">
-                <p14:modId xmlns:p14="http://schemas.microsoft.com/office/powerpoint/2010/main" val="2312675110"/>
+                <p14:modId xmlns:p14="http://schemas.microsoft.com/office/powerpoint/2010/main" val="3896185538"/>
               </p:ext>
             </p:extLst>
           </p:nvPr>
@@ -11082,15 +11082,11 @@
                       </a:r>
                       <a:r>
                         <a:rPr lang="en-US" sz="1600" kern="1200" dirty="0" smtClean="0"/>
-                        <a:t>&gt; Shoes | </a:t>
-                      </a:r>
-                      <a:r>
-                        <a:rPr lang="en-US" sz="1600" kern="1200" dirty="0" err="1" smtClean="0"/>
-                        <a:t>Conf</a:t>
+                        <a:t>&gt; </a:t>
                       </a:r>
                       <a:r>
                         <a:rPr lang="en-US" sz="1600" kern="1200" dirty="0" smtClean="0"/>
-                        <a:t>: 36.91</a:t>
+                        <a:t>Shoes</a:t>
                       </a:r>
                       <a:endParaRPr lang="en-US" sz="1600" b="1" kern="1200" dirty="0" smtClean="0">
                         <a:solidFill>
@@ -11234,15 +11230,11 @@
                       </a:r>
                       <a:r>
                         <a:rPr lang="en-US" sz="1600" dirty="0" smtClean="0"/>
-                        <a:t>&gt; Shoes | </a:t>
-                      </a:r>
-                      <a:r>
-                        <a:rPr lang="en-US" sz="1600" dirty="0" err="1" smtClean="0"/>
-                        <a:t>Conf</a:t>
+                        <a:t>&gt; </a:t>
                       </a:r>
                       <a:r>
                         <a:rPr lang="en-US" sz="1600" dirty="0" smtClean="0"/>
-                        <a:t>: 44.4</a:t>
+                        <a:t>Shoes</a:t>
                       </a:r>
                       <a:endParaRPr lang="en-US" sz="1600" b="1" dirty="0" smtClean="0">
                         <a:solidFill>
@@ -11332,15 +11324,11 @@
                     <a:p>
                       <a:r>
                         <a:rPr lang="en-US" sz="1600" kern="1200" dirty="0" smtClean="0"/>
-                        <a:t>Flats &gt; Women’s Shoes &gt; Shoes | </a:t>
-                      </a:r>
-                      <a:r>
-                        <a:rPr lang="en-US" sz="1600" kern="1200" dirty="0" err="1" smtClean="0"/>
-                        <a:t>Conf</a:t>
+                        <a:t>Flats &gt; Women’s Shoes &gt; </a:t>
                       </a:r>
                       <a:r>
                         <a:rPr lang="en-US" sz="1600" kern="1200" dirty="0" smtClean="0"/>
-                        <a:t>: 29.48</a:t>
+                        <a:t>Shoes</a:t>
                       </a:r>
                       <a:endParaRPr lang="en-US" sz="1600" b="1" kern="1200" dirty="0" smtClean="0">
                         <a:solidFill>
@@ -11477,15 +11465,11 @@
                       </a:r>
                       <a:r>
                         <a:rPr lang="en-US" sz="1600" kern="1200" dirty="0" smtClean="0"/>
-                        <a:t>&gt; Men’s Shoes &gt; Shoes | </a:t>
-                      </a:r>
-                      <a:r>
-                        <a:rPr lang="en-US" sz="1600" kern="1200" dirty="0" err="1" smtClean="0"/>
-                        <a:t>Conf</a:t>
+                        <a:t>&gt; Men’s Shoes &gt; </a:t>
                       </a:r>
                       <a:r>
                         <a:rPr lang="en-US" sz="1600" kern="1200" dirty="0" smtClean="0"/>
-                        <a:t>: 53.92</a:t>
+                        <a:t>Shoes</a:t>
                       </a:r>
                       <a:endParaRPr lang="en-US" sz="1600" b="1" kern="1200" dirty="0" smtClean="0">
                         <a:solidFill>
@@ -11592,15 +11576,11 @@
                       </a:r>
                       <a:r>
                         <a:rPr lang="en-US" sz="1600" kern="1200" dirty="0" smtClean="0"/>
-                        <a:t>&gt; Men’s Shoes &gt; Shoes | </a:t>
-                      </a:r>
-                      <a:r>
-                        <a:rPr lang="en-US" sz="1600" kern="1200" dirty="0" err="1" smtClean="0"/>
-                        <a:t>Conf</a:t>
+                        <a:t>&gt; Men’s Shoes &gt; </a:t>
                       </a:r>
                       <a:r>
                         <a:rPr lang="en-US" sz="1600" kern="1200" dirty="0" smtClean="0"/>
-                        <a:t>: 57.21</a:t>
+                        <a:t>Shoes</a:t>
                       </a:r>
                       <a:endParaRPr lang="en-US" sz="1600" b="1" kern="1200" dirty="0" smtClean="0">
                         <a:solidFill>
@@ -11662,14 +11642,16 @@
         </p:nvSpPr>
         <p:spPr>
           <a:xfrm>
-            <a:off x="6714767" y="3653179"/>
-            <a:ext cx="1184940" cy="584776"/>
+            <a:off x="5351697" y="3656779"/>
+            <a:ext cx="1434257" cy="707886"/>
           </a:xfrm>
           <a:prstGeom prst="rect">
             <a:avLst/>
           </a:prstGeom>
           <a:solidFill>
-            <a:srgbClr val="FF0000"/>
+            <a:schemeClr val="bg1">
+              <a:lumMod val="50000"/>
+            </a:schemeClr>
           </a:solidFill>
           <a:effectLst>
             <a:outerShdw blurRad="63500" sx="102000" sy="102000" algn="ctr" rotWithShape="0">
@@ -11687,7 +11669,7 @@
           <a:p>
             <a:pPr algn="ctr"/>
             <a:r>
-              <a:rPr lang="en-US" sz="1600" dirty="0" smtClean="0">
+              <a:rPr lang="en-US" sz="2000" dirty="0" smtClean="0">
                 <a:solidFill>
                   <a:schemeClr val="bg1"/>
                 </a:solidFill>
@@ -11698,14 +11680,14 @@
           <a:p>
             <a:pPr algn="ctr"/>
             <a:r>
-              <a:rPr lang="en-US" sz="1600" dirty="0" smtClean="0">
+              <a:rPr lang="en-US" sz="2000" dirty="0" smtClean="0">
                 <a:solidFill>
                   <a:schemeClr val="bg1"/>
                 </a:solidFill>
               </a:rPr>
               <a:t>annotations</a:t>
             </a:r>
-            <a:endParaRPr lang="en-US" sz="1600" dirty="0">
+            <a:endParaRPr lang="en-US" sz="2000" dirty="0">
               <a:solidFill>
                 <a:schemeClr val="bg1"/>
               </a:solidFill>
@@ -12519,14 +12501,14 @@
           <p:nvPr>
             <p:extLst>
               <p:ext uri="{D42A27DB-BD31-4B8C-83A1-F6EECF244321}">
-                <p14:modId xmlns:p14="http://schemas.microsoft.com/office/powerpoint/2010/main" val="2816721700"/>
+                <p14:modId xmlns:p14="http://schemas.microsoft.com/office/powerpoint/2010/main" val="2145736685"/>
               </p:ext>
             </p:extLst>
           </p:nvPr>
         </p:nvGraphicFramePr>
         <p:xfrm>
-          <a:off x="221387" y="451885"/>
-          <a:ext cx="4871848" cy="6126480"/>
+          <a:off x="387674" y="502717"/>
+          <a:ext cx="7165287" cy="2468880"/>
         </p:xfrm>
         <a:graphic>
           <a:graphicData uri="http://schemas.openxmlformats.org/drawingml/2006/table">
@@ -12535,30 +12517,52 @@
                 <a:tableStyleId>{ED083AE6-46FA-4A59-8FB0-9F97EB10719F}</a:tableStyleId>
               </a:tblPr>
               <a:tblGrid>
-                <a:gridCol w="4871848"/>
+                <a:gridCol w="2388429"/>
+                <a:gridCol w="2388429"/>
+                <a:gridCol w="2388429"/>
               </a:tblGrid>
-              <a:tr h="345533">
+              <a:tr h="564441">
                 <a:tc>
                   <a:txBody>
                     <a:bodyPr/>
                     <a:lstStyle/>
                     <a:p>
                       <a:pPr algn="ctr"/>
-                      <a:endParaRPr lang="en-US" dirty="0"/>
+                      <a:r>
+                        <a:rPr lang="en-US" sz="1600" b="0" dirty="0" smtClean="0"/>
+                        <a:t>hardcover guide design handbook international health business social law</a:t>
+                      </a:r>
+                      <a:endParaRPr lang="en-US" sz="1600" b="0" dirty="0"/>
                     </a:p>
                   </a:txBody>
                   <a:tcPr>
                     <a:lnL w="12700" cmpd="sng">
                       <a:noFill/>
                     </a:lnL>
-                    <a:lnR w="12700" cmpd="sng">
+                    <a:lnR w="12700" cap="flat" cmpd="sng" algn="ctr">
+                      <a:solidFill>
+                        <a:srgbClr val="8064A2">
+                          <a:lumMod val="75000"/>
+                        </a:srgbClr>
+                      </a:solidFill>
+                      <a:prstDash val="solid"/>
+                      <a:round/>
+                      <a:headEnd type="none" w="med" len="med"/>
+                      <a:tailEnd type="none" w="med" len="med"/>
+                    </a:lnR>
+                    <a:lnT w="12700" cap="flat" cmpd="sng" algn="ctr">
                       <a:noFill/>
-                    </a:lnR>
-                    <a:lnT w="12700" cmpd="sng">
-                      <a:noFill/>
+                      <a:prstDash val="solid"/>
+                      <a:round/>
+                      <a:headEnd type="none" w="med" len="med"/>
+                      <a:tailEnd type="none" w="med" len="med"/>
                     </a:lnT>
                     <a:lnB w="12700" cap="flat" cmpd="sng" algn="ctr">
-                      <a:noFill/>
+                      <a:solidFill>
+                        <a:srgbClr val="8064A2">
+                          <a:lumMod val="75000"/>
+                        </a:srgbClr>
+                      </a:solidFill>
                       <a:prstDash val="solid"/>
                       <a:round/>
                       <a:headEnd type="none" w="med" len="med"/>
@@ -12572,6 +12576,143 @@
                       <a:noFill/>
                       <a:prstDash val="solid"/>
                     </a:lnBlToTr>
+                    <a:solidFill>
+                      <a:schemeClr val="bg1">
+                        <a:lumMod val="85000"/>
+                      </a:schemeClr>
+                    </a:solidFill>
+                  </a:tcPr>
+                </a:tc>
+                <a:tc>
+                  <a:txBody>
+                    <a:bodyPr/>
+                    <a:lstStyle/>
+                    <a:p>
+                      <a:pPr algn="ctr"/>
+                      <a:r>
+                        <a:rPr lang="en-US" sz="1600" b="0" dirty="0" smtClean="0"/>
+                        <a:t>heart diamond pearl 40 ring sterling chain charm 39 14k 47 bracelet watch</a:t>
+                      </a:r>
+                      <a:endParaRPr lang="en-US" sz="1600" b="0" dirty="0"/>
+                    </a:p>
+                  </a:txBody>
+                  <a:tcPr>
+                    <a:lnL w="12700" cap="flat" cmpd="sng" algn="ctr">
+                      <a:solidFill>
+                        <a:srgbClr val="8064A2">
+                          <a:lumMod val="75000"/>
+                        </a:srgbClr>
+                      </a:solidFill>
+                      <a:prstDash val="solid"/>
+                      <a:round/>
+                      <a:headEnd type="none" w="med" len="med"/>
+                      <a:tailEnd type="none" w="med" len="med"/>
+                    </a:lnL>
+                    <a:lnR w="12700" cap="flat" cmpd="sng" algn="ctr">
+                      <a:solidFill>
+                        <a:srgbClr val="8064A2">
+                          <a:lumMod val="75000"/>
+                        </a:srgbClr>
+                      </a:solidFill>
+                      <a:prstDash val="solid"/>
+                      <a:round/>
+                      <a:headEnd type="none" w="med" len="med"/>
+                      <a:tailEnd type="none" w="med" len="med"/>
+                    </a:lnR>
+                    <a:lnT w="12700" cap="flat" cmpd="sng" algn="ctr">
+                      <a:noFill/>
+                      <a:prstDash val="solid"/>
+                      <a:round/>
+                      <a:headEnd type="none" w="med" len="med"/>
+                      <a:tailEnd type="none" w="med" len="med"/>
+                    </a:lnT>
+                    <a:lnB w="12700" cap="flat" cmpd="sng" algn="ctr">
+                      <a:solidFill>
+                        <a:srgbClr val="8064A2">
+                          <a:lumMod val="75000"/>
+                        </a:srgbClr>
+                      </a:solidFill>
+                      <a:prstDash val="solid"/>
+                      <a:round/>
+                      <a:headEnd type="none" w="med" len="med"/>
+                      <a:tailEnd type="none" w="med" len="med"/>
+                    </a:lnB>
+                    <a:lnTlToBr w="12700" cmpd="sng">
+                      <a:noFill/>
+                      <a:prstDash val="solid"/>
+                    </a:lnTlToBr>
+                    <a:lnBlToTr w="12700" cmpd="sng">
+                      <a:noFill/>
+                      <a:prstDash val="solid"/>
+                    </a:lnBlToTr>
+                    <a:solidFill>
+                      <a:schemeClr val="accent6">
+                        <a:lumMod val="20000"/>
+                        <a:lumOff val="80000"/>
+                      </a:schemeClr>
+                    </a:solidFill>
+                  </a:tcPr>
+                </a:tc>
+                <a:tc>
+                  <a:txBody>
+                    <a:bodyPr/>
+                    <a:lstStyle/>
+                    <a:p>
+                      <a:pPr algn="ctr"/>
+                      <a:r>
+                        <a:rPr lang="en-US" sz="1600" b="0" dirty="0" smtClean="0"/>
+                        <a:t>paperback book history god home und soul stories journey bible der die code</a:t>
+                      </a:r>
+                      <a:endParaRPr lang="en-US" sz="1600" b="0" dirty="0"/>
+                    </a:p>
+                  </a:txBody>
+                  <a:tcPr>
+                    <a:lnL w="12700" cap="flat" cmpd="sng" algn="ctr">
+                      <a:solidFill>
+                        <a:srgbClr val="8064A2">
+                          <a:lumMod val="75000"/>
+                        </a:srgbClr>
+                      </a:solidFill>
+                      <a:prstDash val="solid"/>
+                      <a:round/>
+                      <a:headEnd type="none" w="med" len="med"/>
+                      <a:tailEnd type="none" w="med" len="med"/>
+                    </a:lnL>
+                    <a:lnR w="12700" cmpd="sng">
+                      <a:noFill/>
+                    </a:lnR>
+                    <a:lnT w="12700" cap="flat" cmpd="sng" algn="ctr">
+                      <a:noFill/>
+                      <a:prstDash val="solid"/>
+                      <a:round/>
+                      <a:headEnd type="none" w="med" len="med"/>
+                      <a:tailEnd type="none" w="med" len="med"/>
+                    </a:lnT>
+                    <a:lnB w="12700" cap="flat" cmpd="sng" algn="ctr">
+                      <a:solidFill>
+                        <a:srgbClr val="8064A2">
+                          <a:lumMod val="75000"/>
+                        </a:srgbClr>
+                      </a:solidFill>
+                      <a:prstDash val="solid"/>
+                      <a:round/>
+                      <a:headEnd type="none" w="med" len="med"/>
+                      <a:tailEnd type="none" w="med" len="med"/>
+                    </a:lnB>
+                    <a:lnTlToBr w="12700" cmpd="sng">
+                      <a:noFill/>
+                      <a:prstDash val="solid"/>
+                    </a:lnTlToBr>
+                    <a:lnBlToTr w="12700" cmpd="sng">
+                      <a:noFill/>
+                      <a:prstDash val="solid"/>
+                    </a:lnBlToTr>
+                    <a:solidFill>
+                      <a:schemeClr val="accent4">
+                        <a:lumMod val="20000"/>
+                        <a:lumOff val="80000"/>
+                      </a:schemeClr>
+                    </a:solidFill>
                   </a:tcPr>
                 </a:tc>
               </a:tr>
@@ -12583,29 +12724,286 @@
                     <a:p>
                       <a:pPr algn="ctr"/>
                       <a:r>
-                        <a:rPr lang="en-US" sz="1800" dirty="0" smtClean="0"/>
-                        <a:t>hardcover guide design handbook international health business social law science </a:t>
+                        <a:rPr lang="en-US" sz="1600" dirty="0" err="1" smtClean="0"/>
+                        <a:t>vhs</a:t>
                       </a:r>
                       <a:r>
-                        <a:rPr lang="en-US" sz="1800" dirty="0" err="1" smtClean="0"/>
-                        <a:t>english</a:t>
+                        <a:rPr lang="en-US" sz="1600" dirty="0" smtClean="0"/>
+                        <a:t> world series time king war ball house trek </a:t>
                       </a:r>
                       <a:r>
-                        <a:rPr lang="en-US" sz="1800" dirty="0" smtClean="0"/>
-                        <a:t> </a:t>
+                        <a:rPr lang="en-US" sz="1600" dirty="0" err="1" smtClean="0"/>
+                        <a:t>christmas</a:t>
                       </a:r>
-                      <a:endParaRPr lang="en-US" sz="1800" dirty="0"/>
+                      <a:r>
+                        <a:rPr lang="en-US" sz="1600" dirty="0" smtClean="0"/>
+                        <a:t> space dog circle</a:t>
+                      </a:r>
+                      <a:endParaRPr lang="en-US" sz="1600" dirty="0"/>
                     </a:p>
                   </a:txBody>
                   <a:tcPr>
                     <a:lnL w="12700" cmpd="sng">
                       <a:noFill/>
                     </a:lnL>
+                    <a:lnR w="12700" cap="flat" cmpd="sng" algn="ctr">
+                      <a:solidFill>
+                        <a:srgbClr val="8064A2">
+                          <a:lumMod val="75000"/>
+                        </a:srgbClr>
+                      </a:solidFill>
+                      <a:prstDash val="solid"/>
+                      <a:round/>
+                      <a:headEnd type="none" w="med" len="med"/>
+                      <a:tailEnd type="none" w="med" len="med"/>
+                    </a:lnR>
+                    <a:lnT w="12700" cap="flat" cmpd="sng" algn="ctr">
+                      <a:solidFill>
+                        <a:srgbClr val="8064A2">
+                          <a:lumMod val="75000"/>
+                        </a:srgbClr>
+                      </a:solidFill>
+                      <a:prstDash val="solid"/>
+                      <a:round/>
+                      <a:headEnd type="none" w="med" len="med"/>
+                      <a:tailEnd type="none" w="med" len="med"/>
+                    </a:lnT>
+                    <a:lnB w="12700" cap="flat" cmpd="sng" algn="ctr">
+                      <a:solidFill>
+                        <a:srgbClr val="8064A2">
+                          <a:lumMod val="75000"/>
+                        </a:srgbClr>
+                      </a:solidFill>
+                      <a:prstDash val="solid"/>
+                      <a:round/>
+                      <a:headEnd type="none" w="med" len="med"/>
+                      <a:tailEnd type="none" w="med" len="med"/>
+                    </a:lnB>
+                    <a:lnTlToBr w="12700" cmpd="sng">
+                      <a:noFill/>
+                      <a:prstDash val="solid"/>
+                    </a:lnTlToBr>
+                    <a:lnBlToTr w="12700" cmpd="sng">
+                      <a:noFill/>
+                      <a:prstDash val="solid"/>
+                    </a:lnBlToTr>
+                    <a:solidFill>
+                      <a:schemeClr val="bg2">
+                        <a:lumMod val="75000"/>
+                        <a:alpha val="20000"/>
+                      </a:schemeClr>
+                    </a:solidFill>
+                  </a:tcPr>
+                </a:tc>
+                <a:tc>
+                  <a:txBody>
+                    <a:bodyPr/>
+                    <a:lstStyle/>
+                    <a:p>
+                      <a:pPr algn="ctr"/>
+                      <a:r>
+                        <a:rPr lang="en-US" sz="1600" dirty="0" smtClean="0"/>
+                        <a:t>i c love day e night u single lady child woman </a:t>
+                      </a:r>
+                      <a:r>
+                        <a:rPr lang="en-US" sz="1600" dirty="0" err="1" smtClean="0"/>
+                        <a:t>uk</a:t>
+                      </a:r>
+                      <a:r>
+                        <a:rPr lang="en-US" sz="1600" dirty="0" smtClean="0"/>
+                        <a:t> good deluxe park</a:t>
+                      </a:r>
+                      <a:endParaRPr lang="en-US" sz="1600" dirty="0"/>
+                    </a:p>
+                  </a:txBody>
+                  <a:tcPr>
+                    <a:lnL w="12700" cap="flat" cmpd="sng" algn="ctr">
+                      <a:solidFill>
+                        <a:srgbClr val="8064A2">
+                          <a:lumMod val="75000"/>
+                        </a:srgbClr>
+                      </a:solidFill>
+                      <a:prstDash val="solid"/>
+                      <a:round/>
+                      <a:headEnd type="none" w="med" len="med"/>
+                      <a:tailEnd type="none" w="med" len="med"/>
+                    </a:lnL>
+                    <a:lnR w="12700" cap="flat" cmpd="sng" algn="ctr">
+                      <a:solidFill>
+                        <a:srgbClr val="8064A2">
+                          <a:lumMod val="75000"/>
+                        </a:srgbClr>
+                      </a:solidFill>
+                      <a:prstDash val="solid"/>
+                      <a:round/>
+                      <a:headEnd type="none" w="med" len="med"/>
+                      <a:tailEnd type="none" w="med" len="med"/>
+                    </a:lnR>
+                    <a:lnT w="12700" cap="flat" cmpd="sng" algn="ctr">
+                      <a:solidFill>
+                        <a:srgbClr val="8064A2">
+                          <a:lumMod val="75000"/>
+                        </a:srgbClr>
+                      </a:solidFill>
+                      <a:prstDash val="solid"/>
+                      <a:round/>
+                      <a:headEnd type="none" w="med" len="med"/>
+                      <a:tailEnd type="none" w="med" len="med"/>
+                    </a:lnT>
+                    <a:lnB w="12700" cap="flat" cmpd="sng" algn="ctr">
+                      <a:solidFill>
+                        <a:srgbClr val="8064A2">
+                          <a:lumMod val="75000"/>
+                        </a:srgbClr>
+                      </a:solidFill>
+                      <a:prstDash val="solid"/>
+                      <a:round/>
+                      <a:headEnd type="none" w="med" len="med"/>
+                      <a:tailEnd type="none" w="med" len="med"/>
+                    </a:lnB>
+                    <a:lnTlToBr w="12700" cmpd="sng">
+                      <a:noFill/>
+                      <a:prstDash val="solid"/>
+                    </a:lnTlToBr>
+                    <a:lnBlToTr w="12700" cmpd="sng">
+                      <a:noFill/>
+                      <a:prstDash val="solid"/>
+                    </a:lnBlToTr>
+                    <a:solidFill>
+                      <a:schemeClr val="accent1">
+                        <a:lumMod val="40000"/>
+                        <a:lumOff val="60000"/>
+                        <a:alpha val="20000"/>
+                      </a:schemeClr>
+                    </a:solidFill>
+                  </a:tcPr>
+                </a:tc>
+                <a:tc>
+                  <a:txBody>
+                    <a:bodyPr/>
+                    <a:lstStyle/>
+                    <a:p>
+                      <a:pPr algn="ctr"/>
+                      <a:r>
+                        <a:rPr lang="en-US" sz="1600" dirty="0" smtClean="0"/>
+                        <a:t>set 20 100 24 case kit </a:t>
+                      </a:r>
+                      <a:r>
+                        <a:rPr lang="en-US" sz="1600" dirty="0" err="1" smtClean="0"/>
+                        <a:t>oz</a:t>
+                      </a:r>
+                      <a:r>
+                        <a:rPr lang="en-US" sz="1600" dirty="0" smtClean="0"/>
+                        <a:t> 30 hand drive body wall digital </a:t>
+                      </a:r>
+                      <a:r>
+                        <a:rPr lang="en-US" sz="1600" dirty="0" err="1" smtClean="0"/>
+                        <a:t>ft</a:t>
+                      </a:r>
+                      <a:r>
+                        <a:rPr lang="en-US" sz="1600" dirty="0" smtClean="0"/>
+                        <a:t> 48 spray paper</a:t>
+                      </a:r>
+                      <a:endParaRPr lang="en-US" sz="1600" dirty="0"/>
+                    </a:p>
+                  </a:txBody>
+                  <a:tcPr>
+                    <a:lnL w="12700" cap="flat" cmpd="sng" algn="ctr">
+                      <a:solidFill>
+                        <a:srgbClr val="8064A2">
+                          <a:lumMod val="75000"/>
+                        </a:srgbClr>
+                      </a:solidFill>
+                      <a:prstDash val="solid"/>
+                      <a:round/>
+                      <a:headEnd type="none" w="med" len="med"/>
+                      <a:tailEnd type="none" w="med" len="med"/>
+                    </a:lnL>
                     <a:lnR w="12700" cmpd="sng">
                       <a:noFill/>
                     </a:lnR>
                     <a:lnT w="12700" cap="flat" cmpd="sng" algn="ctr">
+                      <a:solidFill>
+                        <a:srgbClr val="8064A2">
+                          <a:lumMod val="75000"/>
+                        </a:srgbClr>
+                      </a:solidFill>
+                      <a:prstDash val="solid"/>
+                      <a:round/>
+                      <a:headEnd type="none" w="med" len="med"/>
+                      <a:tailEnd type="none" w="med" len="med"/>
+                    </a:lnT>
+                    <a:lnB w="12700" cap="flat" cmpd="sng" algn="ctr">
+                      <a:solidFill>
+                        <a:srgbClr val="8064A2">
+                          <a:lumMod val="75000"/>
+                        </a:srgbClr>
+                      </a:solidFill>
+                      <a:prstDash val="solid"/>
+                      <a:round/>
+                      <a:headEnd type="none" w="med" len="med"/>
+                      <a:tailEnd type="none" w="med" len="med"/>
+                    </a:lnB>
+                    <a:lnTlToBr w="12700" cmpd="sng">
                       <a:noFill/>
+                      <a:prstDash val="solid"/>
+                    </a:lnTlToBr>
+                    <a:lnBlToTr w="12700" cmpd="sng">
+                      <a:noFill/>
+                      <a:prstDash val="solid"/>
+                    </a:lnBlToTr>
+                    <a:solidFill>
+                      <a:schemeClr val="accent3">
+                        <a:lumMod val="75000"/>
+                        <a:alpha val="20000"/>
+                      </a:schemeClr>
+                    </a:solidFill>
+                  </a:tcPr>
+                </a:tc>
+              </a:tr>
+              <a:tr h="564441">
+                <a:tc>
+                  <a:txBody>
+                    <a:bodyPr/>
+                    <a:lstStyle/>
+                    <a:p>
+                      <a:pPr algn="ctr"/>
+                      <a:r>
+                        <a:rPr lang="en-US" sz="1600" dirty="0" smtClean="0"/>
+                        <a:t>license standard </a:t>
+                      </a:r>
+                      <a:r>
+                        <a:rPr lang="en-US" sz="1600" dirty="0" err="1" smtClean="0"/>
+                        <a:t>symantec</a:t>
+                      </a:r>
+                      <a:r>
+                        <a:rPr lang="en-US" sz="1600" dirty="0" smtClean="0"/>
+                        <a:t> system service cisco support year essential</a:t>
+                      </a:r>
+                      <a:endParaRPr lang="en-US" sz="1600" dirty="0"/>
+                    </a:p>
+                  </a:txBody>
+                  <a:tcPr>
+                    <a:lnL w="12700" cmpd="sng">
+                      <a:noFill/>
+                    </a:lnL>
+                    <a:lnR w="12700" cap="flat" cmpd="sng" algn="ctr">
+                      <a:solidFill>
+                        <a:srgbClr val="8064A2">
+                          <a:lumMod val="75000"/>
+                        </a:srgbClr>
+                      </a:solidFill>
+                      <a:prstDash val="solid"/>
+                      <a:round/>
+                      <a:headEnd type="none" w="med" len="med"/>
+                      <a:tailEnd type="none" w="med" len="med"/>
+                    </a:lnR>
+                    <a:lnT w="12700" cap="flat" cmpd="sng" algn="ctr">
+                      <a:solidFill>
+                        <a:srgbClr val="8064A2">
+                          <a:lumMod val="75000"/>
+                        </a:srgbClr>
+                      </a:solidFill>
                       <a:prstDash val="solid"/>
                       <a:round/>
                       <a:headEnd type="none" w="med" len="med"/>
@@ -12626,10 +13024,11 @@
                       <a:noFill/>
                       <a:prstDash val="solid"/>
                     </a:lnBlToTr>
+                    <a:solidFill>
+                      <a:srgbClr val="DDF2C5"/>
+                    </a:solidFill>
                   </a:tcPr>
                 </a:tc>
-              </a:tr>
-              <a:tr h="564441">
                 <a:tc>
                   <a:txBody>
                     <a:bodyPr/>
@@ -12637,33 +13036,57 @@
                     <a:p>
                       <a:pPr algn="ctr"/>
                       <a:r>
-                        <a:rPr lang="en-US" sz="1800" dirty="0" err="1" smtClean="0"/>
-                        <a:t>vhs</a:t>
+                        <a:rPr lang="en-US" sz="1600" dirty="0" err="1" smtClean="0"/>
+                        <a:t>dvd</a:t>
                       </a:r>
                       <a:r>
-                        <a:rPr lang="en-US" sz="1800" dirty="0" smtClean="0"/>
-                        <a:t> world series time king war ball house trek </a:t>
+                        <a:rPr lang="en-US" sz="1600" dirty="0" smtClean="0"/>
+                        <a:t> jazz media mixed country artists </a:t>
                       </a:r>
                       <a:r>
-                        <a:rPr lang="en-US" sz="1800" dirty="0" err="1" smtClean="0"/>
-                        <a:t>christmas</a:t>
+                        <a:rPr lang="en-US" sz="1600" dirty="0" err="1" smtClean="0"/>
+                        <a:t>vol</a:t>
                       </a:r>
                       <a:r>
-                        <a:rPr lang="en-US" sz="1800" dirty="0" smtClean="0"/>
-                        <a:t> space dog circle</a:t>
+                        <a:rPr lang="en-US" sz="1600" dirty="0" smtClean="0"/>
+                        <a:t> play music product pop </a:t>
                       </a:r>
-                      <a:endParaRPr lang="en-US" sz="1800" dirty="0"/>
+                      <a:r>
+                        <a:rPr lang="en-US" sz="1600" dirty="0" err="1" smtClean="0"/>
+                        <a:t>ed</a:t>
+                      </a:r>
+                      <a:endParaRPr lang="en-US" sz="1600" dirty="0"/>
                     </a:p>
                   </a:txBody>
                   <a:tcPr>
-                    <a:lnL w="12700" cmpd="sng">
-                      <a:noFill/>
+                    <a:lnL w="12700" cap="flat" cmpd="sng" algn="ctr">
+                      <a:solidFill>
+                        <a:srgbClr val="8064A2">
+                          <a:lumMod val="75000"/>
+                        </a:srgbClr>
+                      </a:solidFill>
+                      <a:prstDash val="solid"/>
+                      <a:round/>
+                      <a:headEnd type="none" w="med" len="med"/>
+                      <a:tailEnd type="none" w="med" len="med"/>
                     </a:lnL>
-                    <a:lnR w="12700" cmpd="sng">
-                      <a:noFill/>
+                    <a:lnR w="12700" cap="flat" cmpd="sng" algn="ctr">
+                      <a:solidFill>
+                        <a:srgbClr val="8064A2">
+                          <a:lumMod val="75000"/>
+                        </a:srgbClr>
+                      </a:solidFill>
+                      <a:prstDash val="solid"/>
+                      <a:round/>
+                      <a:headEnd type="none" w="med" len="med"/>
+                      <a:tailEnd type="none" w="med" len="med"/>
                     </a:lnR>
                     <a:lnT w="12700" cap="flat" cmpd="sng" algn="ctr">
-                      <a:noFill/>
+                      <a:solidFill>
+                        <a:srgbClr val="8064A2">
+                          <a:lumMod val="75000"/>
+                        </a:srgbClr>
+                      </a:solidFill>
                       <a:prstDash val="solid"/>
                       <a:round/>
                       <a:headEnd type="none" w="med" len="med"/>
@@ -12684,10 +13107,11 @@
                       <a:noFill/>
                       <a:prstDash val="solid"/>
                     </a:lnBlToTr>
+                    <a:solidFill>
+                      <a:srgbClr val="F4F1D4"/>
+                    </a:solidFill>
                   </a:tcPr>
                 </a:tc>
-              </a:tr>
-              <a:tr h="564441">
                 <a:tc>
                   <a:txBody>
                     <a:bodyPr/>
@@ -12695,29 +13119,41 @@
                     <a:p>
                       <a:pPr algn="ctr"/>
                       <a:r>
-                        <a:rPr lang="en-US" sz="1800" dirty="0" smtClean="0"/>
-                        <a:t>license standard </a:t>
+                        <a:rPr lang="en-US" sz="1600" dirty="0" smtClean="0"/>
+                        <a:t>de calendar la </a:t>
                       </a:r>
                       <a:r>
-                        <a:rPr lang="en-US" sz="1800" dirty="0" err="1" smtClean="0"/>
-                        <a:t>symantec</a:t>
+                        <a:rPr lang="en-US" sz="1600" dirty="0" err="1" smtClean="0"/>
+                        <a:t>american</a:t>
                       </a:r>
                       <a:r>
-                        <a:rPr lang="en-US" sz="1800" dirty="0" smtClean="0"/>
-                        <a:t> system service cisco support year essential years package upgrade</a:t>
+                        <a:rPr lang="en-US" sz="1600" dirty="0" smtClean="0"/>
+                        <a:t> disc el 2013 art 2009 ray 2012 compact america</a:t>
                       </a:r>
-                      <a:endParaRPr lang="en-US" sz="1800" dirty="0"/>
+                      <a:endParaRPr lang="en-US" sz="1600" dirty="0"/>
                     </a:p>
                   </a:txBody>
                   <a:tcPr>
-                    <a:lnL w="12700" cmpd="sng">
-                      <a:noFill/>
+                    <a:lnL w="12700" cap="flat" cmpd="sng" algn="ctr">
+                      <a:solidFill>
+                        <a:srgbClr val="8064A2">
+                          <a:lumMod val="75000"/>
+                        </a:srgbClr>
+                      </a:solidFill>
+                      <a:prstDash val="solid"/>
+                      <a:round/>
+                      <a:headEnd type="none" w="med" len="med"/>
+                      <a:tailEnd type="none" w="med" len="med"/>
                     </a:lnL>
                     <a:lnR w="12700" cmpd="sng">
                       <a:noFill/>
                     </a:lnR>
                     <a:lnT w="12700" cap="flat" cmpd="sng" algn="ctr">
-                      <a:noFill/>
+                      <a:solidFill>
+                        <a:srgbClr val="8064A2">
+                          <a:lumMod val="75000"/>
+                        </a:srgbClr>
+                      </a:solidFill>
                       <a:prstDash val="solid"/>
                       <a:round/>
                       <a:headEnd type="none" w="med" len="med"/>
@@ -12738,330 +13174,11 @@
                       <a:noFill/>
                       <a:prstDash val="solid"/>
                     </a:lnBlToTr>
-                  </a:tcPr>
-                </a:tc>
-              </a:tr>
-              <a:tr h="564441">
-                <a:tc>
-                  <a:txBody>
-                    <a:bodyPr/>
-                    <a:lstStyle/>
-                    <a:p>
-                      <a:pPr algn="ctr"/>
-                      <a:r>
-                        <a:rPr lang="en-US" sz="1800" dirty="0" smtClean="0"/>
-                        <a:t>heart diamond pearl 40 ring sterling chain charm 39 14k 47 bracelet watch stainless pendant</a:t>
-                      </a:r>
-                      <a:endParaRPr lang="en-US" sz="1800" dirty="0"/>
-                    </a:p>
-                  </a:txBody>
-                  <a:tcPr>
-                    <a:lnL w="12700" cmpd="sng">
-                      <a:noFill/>
-                    </a:lnL>
-                    <a:lnR w="12700" cmpd="sng">
-                      <a:noFill/>
-                    </a:lnR>
-                    <a:lnT w="12700" cap="flat" cmpd="sng" algn="ctr">
-                      <a:noFill/>
-                      <a:prstDash val="solid"/>
-                      <a:round/>
-                      <a:headEnd type="none" w="med" len="med"/>
-                      <a:tailEnd type="none" w="med" len="med"/>
-                    </a:lnT>
-                    <a:lnB w="12700" cap="flat" cmpd="sng" algn="ctr">
-                      <a:noFill/>
-                      <a:prstDash val="solid"/>
-                      <a:round/>
-                      <a:headEnd type="none" w="med" len="med"/>
-                      <a:tailEnd type="none" w="med" len="med"/>
-                    </a:lnB>
-                    <a:lnTlToBr w="12700" cmpd="sng">
-                      <a:noFill/>
-                      <a:prstDash val="solid"/>
-                    </a:lnTlToBr>
-                    <a:lnBlToTr w="12700" cmpd="sng">
-                      <a:noFill/>
-                      <a:prstDash val="solid"/>
-                    </a:lnBlToTr>
-                  </a:tcPr>
-                </a:tc>
-              </a:tr>
-              <a:tr h="564441">
-                <a:tc>
-                  <a:txBody>
-                    <a:bodyPr/>
-                    <a:lstStyle/>
-                    <a:p>
-                      <a:pPr algn="ctr"/>
-                      <a:r>
-                        <a:rPr lang="en-US" sz="1800" dirty="0" smtClean="0"/>
-                        <a:t>i c love day e night u single lady child woman </a:t>
-                      </a:r>
-                      <a:r>
-                        <a:rPr lang="en-US" sz="1800" dirty="0" err="1" smtClean="0"/>
-                        <a:t>uk</a:t>
-                      </a:r>
-                      <a:r>
-                        <a:rPr lang="en-US" sz="1800" dirty="0" smtClean="0"/>
-                        <a:t> good deluxe park</a:t>
-                      </a:r>
-                      <a:endParaRPr lang="en-US" sz="1800" dirty="0"/>
-                    </a:p>
-                  </a:txBody>
-                  <a:tcPr>
-                    <a:lnL w="12700" cmpd="sng">
-                      <a:noFill/>
-                    </a:lnL>
-                    <a:lnR w="12700" cmpd="sng">
-                      <a:noFill/>
-                    </a:lnR>
-                    <a:lnT w="12700" cap="flat" cmpd="sng" algn="ctr">
-                      <a:noFill/>
-                      <a:prstDash val="solid"/>
-                      <a:round/>
-                      <a:headEnd type="none" w="med" len="med"/>
-                      <a:tailEnd type="none" w="med" len="med"/>
-                    </a:lnT>
-                    <a:lnB w="12700" cap="flat" cmpd="sng" algn="ctr">
-                      <a:noFill/>
-                      <a:prstDash val="solid"/>
-                      <a:round/>
-                      <a:headEnd type="none" w="med" len="med"/>
-                      <a:tailEnd type="none" w="med" len="med"/>
-                    </a:lnB>
-                    <a:lnTlToBr w="12700" cmpd="sng">
-                      <a:noFill/>
-                      <a:prstDash val="solid"/>
-                    </a:lnTlToBr>
-                    <a:lnBlToTr w="12700" cmpd="sng">
-                      <a:noFill/>
-                      <a:prstDash val="solid"/>
-                    </a:lnBlToTr>
-                  </a:tcPr>
-                </a:tc>
-              </a:tr>
-              <a:tr h="564441">
-                <a:tc>
-                  <a:txBody>
-                    <a:bodyPr/>
-                    <a:lstStyle/>
-                    <a:p>
-                      <a:pPr algn="ctr"/>
-                      <a:r>
-                        <a:rPr lang="en-US" sz="1800" dirty="0" err="1" smtClean="0"/>
-                        <a:t>dvd</a:t>
-                      </a:r>
-                      <a:r>
-                        <a:rPr lang="en-US" sz="1800" dirty="0" smtClean="0"/>
-                        <a:t> jazz media mixed country artists </a:t>
-                      </a:r>
-                      <a:r>
-                        <a:rPr lang="en-US" sz="1800" dirty="0" err="1" smtClean="0"/>
-                        <a:t>vol</a:t>
-                      </a:r>
-                      <a:r>
-                        <a:rPr lang="en-US" sz="1800" dirty="0" smtClean="0"/>
-                        <a:t> play music product pop </a:t>
-                      </a:r>
-                      <a:r>
-                        <a:rPr lang="en-US" sz="1800" dirty="0" err="1" smtClean="0"/>
-                        <a:t>ed</a:t>
-                      </a:r>
-                      <a:r>
-                        <a:rPr lang="en-US" sz="1800" dirty="0" smtClean="0"/>
-                        <a:t> import john complete club</a:t>
-                      </a:r>
-                      <a:endParaRPr lang="en-US" sz="1800" dirty="0"/>
-                    </a:p>
-                  </a:txBody>
-                  <a:tcPr>
-                    <a:lnL w="12700" cmpd="sng">
-                      <a:noFill/>
-                    </a:lnL>
-                    <a:lnR w="12700" cmpd="sng">
-                      <a:noFill/>
-                    </a:lnR>
-                    <a:lnT w="12700" cap="flat" cmpd="sng" algn="ctr">
-                      <a:noFill/>
-                      <a:prstDash val="solid"/>
-                      <a:round/>
-                      <a:headEnd type="none" w="med" len="med"/>
-                      <a:tailEnd type="none" w="med" len="med"/>
-                    </a:lnT>
-                    <a:lnB w="12700" cap="flat" cmpd="sng" algn="ctr">
-                      <a:noFill/>
-                      <a:prstDash val="solid"/>
-                      <a:round/>
-                      <a:headEnd type="none" w="med" len="med"/>
-                      <a:tailEnd type="none" w="med" len="med"/>
-                    </a:lnB>
-                    <a:lnTlToBr w="12700" cmpd="sng">
-                      <a:noFill/>
-                      <a:prstDash val="solid"/>
-                    </a:lnTlToBr>
-                    <a:lnBlToTr w="12700" cmpd="sng">
-                      <a:noFill/>
-                      <a:prstDash val="solid"/>
-                    </a:lnBlToTr>
-                  </a:tcPr>
-                </a:tc>
-              </a:tr>
-              <a:tr h="564441">
-                <a:tc>
-                  <a:txBody>
-                    <a:bodyPr/>
-                    <a:lstStyle/>
-                    <a:p>
-                      <a:pPr algn="ctr"/>
-                      <a:r>
-                        <a:rPr lang="en-US" sz="1800" dirty="0" smtClean="0"/>
-                        <a:t>paperback book history god home und soul stories journey bible der die code people</a:t>
-                      </a:r>
-                      <a:endParaRPr lang="en-US" sz="1800" dirty="0"/>
-                    </a:p>
-                  </a:txBody>
-                  <a:tcPr>
-                    <a:lnL w="12700" cmpd="sng">
-                      <a:noFill/>
-                    </a:lnL>
-                    <a:lnR w="12700" cmpd="sng">
-                      <a:noFill/>
-                    </a:lnR>
-                    <a:lnT w="12700" cap="flat" cmpd="sng" algn="ctr">
-                      <a:noFill/>
-                      <a:prstDash val="solid"/>
-                      <a:round/>
-                      <a:headEnd type="none" w="med" len="med"/>
-                      <a:tailEnd type="none" w="med" len="med"/>
-                    </a:lnT>
-                    <a:lnB w="12700" cap="flat" cmpd="sng" algn="ctr">
-                      <a:noFill/>
-                      <a:prstDash val="solid"/>
-                      <a:round/>
-                      <a:headEnd type="none" w="med" len="med"/>
-                      <a:tailEnd type="none" w="med" len="med"/>
-                    </a:lnB>
-                    <a:lnTlToBr w="12700" cmpd="sng">
-                      <a:noFill/>
-                      <a:prstDash val="solid"/>
-                    </a:lnTlToBr>
-                    <a:lnBlToTr w="12700" cmpd="sng">
-                      <a:noFill/>
-                      <a:prstDash val="solid"/>
-                    </a:lnBlToTr>
-                  </a:tcPr>
-                </a:tc>
-              </a:tr>
-              <a:tr h="564441">
-                <a:tc>
-                  <a:txBody>
-                    <a:bodyPr/>
-                    <a:lstStyle/>
-                    <a:p>
-                      <a:pPr algn="ctr"/>
-                      <a:r>
-                        <a:rPr lang="en-US" sz="1800" dirty="0" smtClean="0"/>
-                        <a:t>set 20 100 24 case kit </a:t>
-                      </a:r>
-                      <a:r>
-                        <a:rPr lang="en-US" sz="1800" dirty="0" err="1" smtClean="0"/>
-                        <a:t>oz</a:t>
-                      </a:r>
-                      <a:r>
-                        <a:rPr lang="en-US" sz="1800" dirty="0" smtClean="0"/>
-                        <a:t> 30 hand drive body wall digital </a:t>
-                      </a:r>
-                      <a:r>
-                        <a:rPr lang="en-US" sz="1800" dirty="0" err="1" smtClean="0"/>
-                        <a:t>ft</a:t>
-                      </a:r>
-                      <a:r>
-                        <a:rPr lang="en-US" sz="1800" dirty="0" smtClean="0"/>
-                        <a:t> 48 spray paper liquid mount gift</a:t>
-                      </a:r>
-                      <a:endParaRPr lang="en-US" sz="1800" dirty="0"/>
-                    </a:p>
-                  </a:txBody>
-                  <a:tcPr>
-                    <a:lnL w="12700" cmpd="sng">
-                      <a:noFill/>
-                    </a:lnL>
-                    <a:lnR w="12700" cmpd="sng">
-                      <a:noFill/>
-                    </a:lnR>
-                    <a:lnT w="12700" cap="flat" cmpd="sng" algn="ctr">
-                      <a:noFill/>
-                      <a:prstDash val="solid"/>
-                      <a:round/>
-                      <a:headEnd type="none" w="med" len="med"/>
-                      <a:tailEnd type="none" w="med" len="med"/>
-                    </a:lnT>
-                    <a:lnB w="12700" cap="flat" cmpd="sng" algn="ctr">
-                      <a:noFill/>
-                      <a:prstDash val="solid"/>
-                      <a:round/>
-                      <a:headEnd type="none" w="med" len="med"/>
-                      <a:tailEnd type="none" w="med" len="med"/>
-                    </a:lnB>
-                    <a:lnTlToBr w="12700" cmpd="sng">
-                      <a:noFill/>
-                      <a:prstDash val="solid"/>
-                    </a:lnTlToBr>
-                    <a:lnBlToTr w="12700" cmpd="sng">
-                      <a:noFill/>
-                      <a:prstDash val="solid"/>
-                    </a:lnBlToTr>
-                  </a:tcPr>
-                </a:tc>
-              </a:tr>
-              <a:tr h="564441">
-                <a:tc>
-                  <a:txBody>
-                    <a:bodyPr/>
-                    <a:lstStyle/>
-                    <a:p>
-                      <a:pPr algn="ctr"/>
-                      <a:r>
-                        <a:rPr lang="en-US" sz="1800" dirty="0" smtClean="0"/>
-                        <a:t>de calendar la </a:t>
-                      </a:r>
-                      <a:r>
-                        <a:rPr lang="en-US" sz="1800" dirty="0" err="1" smtClean="0"/>
-                        <a:t>american</a:t>
-                      </a:r>
-                      <a:r>
-                        <a:rPr lang="en-US" sz="1800" dirty="0" smtClean="0"/>
-                        <a:t> disc el 2013 art 2009 ray 2012 compact america great 2010</a:t>
-                      </a:r>
-                      <a:endParaRPr lang="en-US" sz="1800" dirty="0"/>
-                    </a:p>
-                  </a:txBody>
-                  <a:tcPr>
-                    <a:lnL w="12700" cmpd="sng">
-                      <a:noFill/>
-                    </a:lnL>
-                    <a:lnR w="12700" cmpd="sng">
-                      <a:noFill/>
-                    </a:lnR>
-                    <a:lnT w="12700" cap="flat" cmpd="sng" algn="ctr">
-                      <a:noFill/>
-                      <a:prstDash val="solid"/>
-                      <a:round/>
-                      <a:headEnd type="none" w="med" len="med"/>
-                      <a:tailEnd type="none" w="med" len="med"/>
-                    </a:lnT>
-                    <a:lnB w="12700" cmpd="sng">
-                      <a:noFill/>
-                    </a:lnB>
-                    <a:lnTlToBr w="12700" cmpd="sng">
-                      <a:noFill/>
-                      <a:prstDash val="solid"/>
-                    </a:lnTlToBr>
-                    <a:lnBlToTr w="12700" cmpd="sng">
-                      <a:noFill/>
-                      <a:prstDash val="solid"/>
-                    </a:lnBlToTr>
+                    <a:solidFill>
+                      <a:schemeClr val="bg1">
+                        <a:lumMod val="95000"/>
+                      </a:schemeClr>
+                    </a:solidFill>
                   </a:tcPr>
                 </a:tc>
               </a:tr>

</xml_diff>